<commit_message>
Update PPT and Doku
</commit_message>
<xml_diff>
--- a/presentation/StreamTogether.pptx
+++ b/presentation/StreamTogether.pptx
@@ -3522,385 +3522,6 @@
       <dsp:cNvGrpSpPr/>
     </dsp:nvGrpSpPr>
     <dsp:grpSpPr/>
-    <dsp:sp modelId="{B55A8299-6907-421D-9B76-27F40FB48D47}">
-      <dsp:nvSpPr>
-        <dsp:cNvPr id="0" name=""/>
-        <dsp:cNvSpPr/>
-      </dsp:nvSpPr>
-      <dsp:spPr>
-        <a:xfrm>
-          <a:off x="4181092" y="2690311"/>
-          <a:ext cx="3288157" cy="3288157"/>
-        </a:xfrm>
-        <a:prstGeom prst="gear9">
-          <a:avLst/>
-        </a:prstGeom>
-        <a:solidFill>
-          <a:schemeClr val="tx1">
-            <a:lumMod val="85000"/>
-            <a:lumOff val="15000"/>
-          </a:schemeClr>
-        </a:solidFill>
-        <a:ln>
-          <a:noFill/>
-        </a:ln>
-        <a:effectLst/>
-        <a:sp3d extrusionH="381000" contourW="38100" prstMaterial="matte">
-          <a:contourClr>
-            <a:schemeClr val="lt1"/>
-          </a:contourClr>
-        </a:sp3d>
-      </dsp:spPr>
-      <dsp:style>
-        <a:lnRef idx="0">
-          <a:scrgbClr r="0" g="0" b="0"/>
-        </a:lnRef>
-        <a:fillRef idx="1">
-          <a:scrgbClr r="0" g="0" b="0"/>
-        </a:fillRef>
-        <a:effectRef idx="0">
-          <a:scrgbClr r="0" g="0" b="0"/>
-        </a:effectRef>
-        <a:fontRef idx="minor">
-          <a:schemeClr val="lt1"/>
-        </a:fontRef>
-      </dsp:style>
-      <dsp:txBody>
-        <a:bodyPr spcFirstLastPara="0" vert="horz" wrap="square" lIns="26670" tIns="26670" rIns="26670" bIns="26670" numCol="1" spcCol="1270" anchor="ctr" anchorCtr="0">
-          <a:noAutofit/>
-        </a:bodyPr>
-        <a:lstStyle/>
-        <a:p>
-          <a:pPr lvl="0" algn="ctr" defTabSz="933450">
-            <a:lnSpc>
-              <a:spcPct val="90000"/>
-            </a:lnSpc>
-            <a:spcBef>
-              <a:spcPct val="0"/>
-            </a:spcBef>
-            <a:spcAft>
-              <a:spcPct val="35000"/>
-            </a:spcAft>
-          </a:pPr>
-          <a:r>
-            <a:rPr lang="de-DE" sz="2100" kern="1200" dirty="0"/>
-            <a:t>Gemeinsam virtuell Zeit </a:t>
-          </a:r>
-          <a:r>
-            <a:rPr lang="de-DE" sz="2100" kern="1200" dirty="0" smtClean="0"/>
-            <a:t>verbringen, Musik und Videos abspielen</a:t>
-          </a:r>
-          <a:endParaRPr lang="de-DE" sz="2100" kern="1200" dirty="0"/>
-        </a:p>
-      </dsp:txBody>
-      <dsp:txXfrm>
-        <a:off x="4842158" y="3460546"/>
-        <a:ext cx="1966025" cy="1690181"/>
-      </dsp:txXfrm>
-    </dsp:sp>
-    <dsp:sp modelId="{D620EC91-7F95-4592-ACD1-65A336BA7A77}">
-      <dsp:nvSpPr>
-        <dsp:cNvPr id="0" name=""/>
-        <dsp:cNvSpPr/>
-      </dsp:nvSpPr>
-      <dsp:spPr>
-        <a:xfrm>
-          <a:off x="2267981" y="1913110"/>
-          <a:ext cx="2391387" cy="2391387"/>
-        </a:xfrm>
-        <a:prstGeom prst="gear6">
-          <a:avLst/>
-        </a:prstGeom>
-        <a:solidFill>
-          <a:schemeClr val="tx1">
-            <a:lumMod val="85000"/>
-            <a:lumOff val="15000"/>
-          </a:schemeClr>
-        </a:solidFill>
-        <a:ln>
-          <a:noFill/>
-        </a:ln>
-        <a:effectLst/>
-        <a:sp3d extrusionH="381000" contourW="38100" prstMaterial="matte">
-          <a:contourClr>
-            <a:schemeClr val="lt1"/>
-          </a:contourClr>
-        </a:sp3d>
-      </dsp:spPr>
-      <dsp:style>
-        <a:lnRef idx="0">
-          <a:scrgbClr r="0" g="0" b="0"/>
-        </a:lnRef>
-        <a:fillRef idx="1">
-          <a:scrgbClr r="0" g="0" b="0"/>
-        </a:fillRef>
-        <a:effectRef idx="0">
-          <a:scrgbClr r="0" g="0" b="0"/>
-        </a:effectRef>
-        <a:fontRef idx="minor">
-          <a:schemeClr val="lt1"/>
-        </a:fontRef>
-      </dsp:style>
-      <dsp:txBody>
-        <a:bodyPr spcFirstLastPara="0" vert="horz" wrap="square" lIns="17780" tIns="17780" rIns="17780" bIns="17780" numCol="1" spcCol="1270" anchor="ctr" anchorCtr="0">
-          <a:noAutofit/>
-        </a:bodyPr>
-        <a:lstStyle/>
-        <a:p>
-          <a:pPr lvl="0" algn="ctr" defTabSz="622300">
-            <a:lnSpc>
-              <a:spcPct val="90000"/>
-            </a:lnSpc>
-            <a:spcBef>
-              <a:spcPct val="0"/>
-            </a:spcBef>
-            <a:spcAft>
-              <a:spcPct val="35000"/>
-            </a:spcAft>
-          </a:pPr>
-          <a:r>
-            <a:rPr lang="de-DE" sz="1400" kern="1200" dirty="0" smtClean="0"/>
-            <a:t>Synchronisierte Wiedergabe</a:t>
-          </a:r>
-          <a:endParaRPr lang="de-DE" sz="1400" kern="1200" dirty="0"/>
-        </a:p>
-      </dsp:txBody>
-      <dsp:txXfrm>
-        <a:off x="2870020" y="2518788"/>
-        <a:ext cx="1187309" cy="1180031"/>
-      </dsp:txXfrm>
-    </dsp:sp>
-    <dsp:sp modelId="{BA7BEE52-6385-4D73-A851-35BE5DF1F097}">
-      <dsp:nvSpPr>
-        <dsp:cNvPr id="0" name=""/>
-        <dsp:cNvSpPr/>
-      </dsp:nvSpPr>
-      <dsp:spPr>
-        <a:xfrm rot="20700000">
-          <a:off x="3607403" y="263296"/>
-          <a:ext cx="2343071" cy="2343071"/>
-        </a:xfrm>
-        <a:prstGeom prst="gear6">
-          <a:avLst/>
-        </a:prstGeom>
-        <a:solidFill>
-          <a:schemeClr val="tx1">
-            <a:lumMod val="85000"/>
-            <a:lumOff val="15000"/>
-          </a:schemeClr>
-        </a:solidFill>
-        <a:ln>
-          <a:noFill/>
-        </a:ln>
-        <a:effectLst/>
-        <a:sp3d extrusionH="381000" contourW="38100" prstMaterial="matte">
-          <a:contourClr>
-            <a:schemeClr val="lt1"/>
-          </a:contourClr>
-        </a:sp3d>
-      </dsp:spPr>
-      <dsp:style>
-        <a:lnRef idx="0">
-          <a:scrgbClr r="0" g="0" b="0"/>
-        </a:lnRef>
-        <a:fillRef idx="1">
-          <a:scrgbClr r="0" g="0" b="0"/>
-        </a:fillRef>
-        <a:effectRef idx="0">
-          <a:scrgbClr r="0" g="0" b="0"/>
-        </a:effectRef>
-        <a:fontRef idx="minor">
-          <a:schemeClr val="lt1"/>
-        </a:fontRef>
-      </dsp:style>
-      <dsp:txBody>
-        <a:bodyPr spcFirstLastPara="0" vert="horz" wrap="square" lIns="22860" tIns="22860" rIns="22860" bIns="22860" numCol="1" spcCol="1270" anchor="ctr" anchorCtr="0">
-          <a:noAutofit/>
-        </a:bodyPr>
-        <a:lstStyle/>
-        <a:p>
-          <a:pPr lvl="0" algn="ctr" defTabSz="800100">
-            <a:lnSpc>
-              <a:spcPct val="90000"/>
-            </a:lnSpc>
-            <a:spcBef>
-              <a:spcPct val="0"/>
-            </a:spcBef>
-            <a:spcAft>
-              <a:spcPct val="35000"/>
-            </a:spcAft>
-          </a:pPr>
-          <a:r>
-            <a:rPr lang="de-DE" sz="1800" kern="1200" dirty="0" smtClean="0"/>
-            <a:t>Chat</a:t>
-          </a:r>
-          <a:endParaRPr lang="de-DE" sz="1800" kern="1200" dirty="0"/>
-        </a:p>
-      </dsp:txBody>
-      <dsp:txXfrm rot="-20700000">
-        <a:off x="4121307" y="777200"/>
-        <a:ext cx="1315263" cy="1315263"/>
-      </dsp:txXfrm>
-    </dsp:sp>
-    <dsp:sp modelId="{5F3C05ED-E5AB-43EF-A2BF-AC54B58E2054}">
-      <dsp:nvSpPr>
-        <dsp:cNvPr id="0" name=""/>
-        <dsp:cNvSpPr/>
-      </dsp:nvSpPr>
-      <dsp:spPr>
-        <a:xfrm>
-          <a:off x="3948311" y="2182643"/>
-          <a:ext cx="4208842" cy="4208842"/>
-        </a:xfrm>
-        <a:prstGeom prst="circularArrow">
-          <a:avLst>
-            <a:gd name="adj1" fmla="val 4687"/>
-            <a:gd name="adj2" fmla="val 299029"/>
-            <a:gd name="adj3" fmla="val 2546984"/>
-            <a:gd name="adj4" fmla="val 15796415"/>
-            <a:gd name="adj5" fmla="val 5469"/>
-          </a:avLst>
-        </a:prstGeom>
-        <a:solidFill>
-          <a:schemeClr val="accent1">
-            <a:tint val="60000"/>
-            <a:hueOff val="0"/>
-            <a:satOff val="0"/>
-            <a:lumOff val="0"/>
-            <a:alphaOff val="0"/>
-          </a:schemeClr>
-        </a:solidFill>
-        <a:ln>
-          <a:noFill/>
-        </a:ln>
-        <a:effectLst/>
-        <a:sp3d z="-52400" extrusionH="181000" contourW="38100" prstMaterial="matte">
-          <a:contourClr>
-            <a:schemeClr val="lt1"/>
-          </a:contourClr>
-        </a:sp3d>
-      </dsp:spPr>
-      <dsp:style>
-        <a:lnRef idx="0">
-          <a:scrgbClr r="0" g="0" b="0"/>
-        </a:lnRef>
-        <a:fillRef idx="1">
-          <a:scrgbClr r="0" g="0" b="0"/>
-        </a:fillRef>
-        <a:effectRef idx="0">
-          <a:scrgbClr r="0" g="0" b="0"/>
-        </a:effectRef>
-        <a:fontRef idx="minor">
-          <a:schemeClr val="lt1"/>
-        </a:fontRef>
-      </dsp:style>
-    </dsp:sp>
-    <dsp:sp modelId="{DEF06A35-324A-4EFB-AB93-F74EA4B58AE1}">
-      <dsp:nvSpPr>
-        <dsp:cNvPr id="0" name=""/>
-        <dsp:cNvSpPr/>
-      </dsp:nvSpPr>
-      <dsp:spPr>
-        <a:xfrm>
-          <a:off x="1844471" y="1376329"/>
-          <a:ext cx="3057986" cy="3057986"/>
-        </a:xfrm>
-        <a:prstGeom prst="leftCircularArrow">
-          <a:avLst>
-            <a:gd name="adj1" fmla="val 6452"/>
-            <a:gd name="adj2" fmla="val 429999"/>
-            <a:gd name="adj3" fmla="val 10489124"/>
-            <a:gd name="adj4" fmla="val 14837806"/>
-            <a:gd name="adj5" fmla="val 7527"/>
-          </a:avLst>
-        </a:prstGeom>
-        <a:solidFill>
-          <a:schemeClr val="accent1">
-            <a:tint val="60000"/>
-            <a:hueOff val="0"/>
-            <a:satOff val="0"/>
-            <a:lumOff val="0"/>
-            <a:alphaOff val="0"/>
-          </a:schemeClr>
-        </a:solidFill>
-        <a:ln>
-          <a:noFill/>
-        </a:ln>
-        <a:effectLst/>
-        <a:sp3d z="-52400" extrusionH="181000" contourW="38100" prstMaterial="matte">
-          <a:contourClr>
-            <a:schemeClr val="lt1"/>
-          </a:contourClr>
-        </a:sp3d>
-      </dsp:spPr>
-      <dsp:style>
-        <a:lnRef idx="0">
-          <a:scrgbClr r="0" g="0" b="0"/>
-        </a:lnRef>
-        <a:fillRef idx="1">
-          <a:scrgbClr r="0" g="0" b="0"/>
-        </a:fillRef>
-        <a:effectRef idx="0">
-          <a:scrgbClr r="0" g="0" b="0"/>
-        </a:effectRef>
-        <a:fontRef idx="minor">
-          <a:schemeClr val="lt1"/>
-        </a:fontRef>
-      </dsp:style>
-    </dsp:sp>
-    <dsp:sp modelId="{823FAB03-33FC-495E-9B30-E62910FE070B}">
-      <dsp:nvSpPr>
-        <dsp:cNvPr id="0" name=""/>
-        <dsp:cNvSpPr/>
-      </dsp:nvSpPr>
-      <dsp:spPr>
-        <a:xfrm>
-          <a:off x="3065426" y="-257580"/>
-          <a:ext cx="3297125" cy="3297125"/>
-        </a:xfrm>
-        <a:prstGeom prst="circularArrow">
-          <a:avLst>
-            <a:gd name="adj1" fmla="val 5984"/>
-            <a:gd name="adj2" fmla="val 394124"/>
-            <a:gd name="adj3" fmla="val 13313824"/>
-            <a:gd name="adj4" fmla="val 10508221"/>
-            <a:gd name="adj5" fmla="val 6981"/>
-          </a:avLst>
-        </a:prstGeom>
-        <a:solidFill>
-          <a:schemeClr val="accent1">
-            <a:tint val="60000"/>
-            <a:hueOff val="0"/>
-            <a:satOff val="0"/>
-            <a:lumOff val="0"/>
-            <a:alphaOff val="0"/>
-          </a:schemeClr>
-        </a:solidFill>
-        <a:ln>
-          <a:noFill/>
-        </a:ln>
-        <a:effectLst/>
-        <a:sp3d z="-52400" extrusionH="181000" contourW="38100" prstMaterial="matte">
-          <a:contourClr>
-            <a:schemeClr val="lt1"/>
-          </a:contourClr>
-        </a:sp3d>
-      </dsp:spPr>
-      <dsp:style>
-        <a:lnRef idx="0">
-          <a:scrgbClr r="0" g="0" b="0"/>
-        </a:lnRef>
-        <a:fillRef idx="1">
-          <a:scrgbClr r="0" g="0" b="0"/>
-        </a:fillRef>
-        <a:effectRef idx="0">
-          <a:scrgbClr r="0" g="0" b="0"/>
-        </a:effectRef>
-        <a:fontRef idx="minor">
-          <a:schemeClr val="lt1"/>
-        </a:fontRef>
-      </dsp:style>
-    </dsp:sp>
   </dsp:spTree>
 </dsp:drawing>
 </file>
@@ -3913,595 +3534,6 @@
       <dsp:cNvGrpSpPr/>
     </dsp:nvGrpSpPr>
     <dsp:grpSpPr/>
-    <dsp:sp modelId="{430324BD-DF46-4B3D-8437-F78676EA525E}">
-      <dsp:nvSpPr>
-        <dsp:cNvPr id="0" name=""/>
-        <dsp:cNvSpPr/>
-      </dsp:nvSpPr>
-      <dsp:spPr>
-        <a:xfrm>
-          <a:off x="1140053" y="2806"/>
-          <a:ext cx="2606675" cy="1945828"/>
-        </a:xfrm>
-        <a:prstGeom prst="round2SameRect">
-          <a:avLst>
-            <a:gd name="adj1" fmla="val 8000"/>
-            <a:gd name="adj2" fmla="val 0"/>
-          </a:avLst>
-        </a:prstGeom>
-        <a:solidFill>
-          <a:schemeClr val="dk1">
-            <a:alpha val="90000"/>
-            <a:tint val="40000"/>
-            <a:hueOff val="0"/>
-            <a:satOff val="0"/>
-            <a:lumOff val="0"/>
-            <a:alphaOff val="0"/>
-          </a:schemeClr>
-        </a:solidFill>
-        <a:ln w="6350" cap="flat" cmpd="sng" algn="ctr">
-          <a:solidFill>
-            <a:schemeClr val="dk1">
-              <a:hueOff val="0"/>
-              <a:satOff val="0"/>
-              <a:lumOff val="0"/>
-              <a:alphaOff val="0"/>
-            </a:schemeClr>
-          </a:solidFill>
-          <a:prstDash val="solid"/>
-          <a:miter lim="800000"/>
-        </a:ln>
-        <a:effectLst/>
-        <a:sp3d z="-400500" extrusionH="63500" prstMaterial="matte"/>
-      </dsp:spPr>
-      <dsp:style>
-        <a:lnRef idx="1">
-          <a:scrgbClr r="0" g="0" b="0"/>
-        </a:lnRef>
-        <a:fillRef idx="1">
-          <a:scrgbClr r="0" g="0" b="0"/>
-        </a:fillRef>
-        <a:effectRef idx="0">
-          <a:scrgbClr r="0" g="0" b="0"/>
-        </a:effectRef>
-        <a:fontRef idx="minor"/>
-      </dsp:style>
-    </dsp:sp>
-    <dsp:sp modelId="{FD063B86-805E-4A3C-ACAC-D3BE10E259D0}">
-      <dsp:nvSpPr>
-        <dsp:cNvPr id="0" name=""/>
-        <dsp:cNvSpPr/>
-      </dsp:nvSpPr>
-      <dsp:spPr>
-        <a:xfrm>
-          <a:off x="1140053" y="1948635"/>
-          <a:ext cx="2606675" cy="836706"/>
-        </a:xfrm>
-        <a:prstGeom prst="rect">
-          <a:avLst/>
-        </a:prstGeom>
-        <a:solidFill>
-          <a:schemeClr val="lt1">
-            <a:hueOff val="0"/>
-            <a:satOff val="0"/>
-            <a:lumOff val="0"/>
-            <a:alphaOff val="0"/>
-          </a:schemeClr>
-        </a:solidFill>
-        <a:ln w="6350" cap="flat" cmpd="sng" algn="ctr">
-          <a:solidFill>
-            <a:schemeClr val="dk1">
-              <a:shade val="80000"/>
-              <a:hueOff val="0"/>
-              <a:satOff val="0"/>
-              <a:lumOff val="0"/>
-              <a:alphaOff val="0"/>
-            </a:schemeClr>
-          </a:solidFill>
-          <a:prstDash val="solid"/>
-          <a:miter lim="800000"/>
-        </a:ln>
-        <a:effectLst/>
-        <a:sp3d extrusionH="381000" contourW="38100" prstMaterial="matte">
-          <a:contourClr>
-            <a:schemeClr val="lt1"/>
-          </a:contourClr>
-        </a:sp3d>
-      </dsp:spPr>
-      <dsp:style>
-        <a:lnRef idx="1">
-          <a:scrgbClr r="0" g="0" b="0"/>
-        </a:lnRef>
-        <a:fillRef idx="1">
-          <a:scrgbClr r="0" g="0" b="0"/>
-        </a:fillRef>
-        <a:effectRef idx="0">
-          <a:scrgbClr r="0" g="0" b="0"/>
-        </a:effectRef>
-        <a:fontRef idx="minor">
-          <a:schemeClr val="lt1"/>
-        </a:fontRef>
-      </dsp:style>
-      <dsp:txBody>
-        <a:bodyPr spcFirstLastPara="0" vert="horz" wrap="square" lIns="213360" tIns="0" rIns="71120" bIns="0" numCol="1" spcCol="1270" anchor="ctr" anchorCtr="0">
-          <a:noAutofit/>
-        </a:bodyPr>
-        <a:lstStyle/>
-        <a:p>
-          <a:pPr lvl="0" algn="l" defTabSz="2489200">
-            <a:lnSpc>
-              <a:spcPct val="90000"/>
-            </a:lnSpc>
-            <a:spcBef>
-              <a:spcPct val="0"/>
-            </a:spcBef>
-            <a:spcAft>
-              <a:spcPct val="35000"/>
-            </a:spcAft>
-          </a:pPr>
-          <a:r>
-            <a:rPr lang="de-DE" sz="5600" kern="1200" dirty="0"/>
-            <a:t>Arian</a:t>
-          </a:r>
-        </a:p>
-      </dsp:txBody>
-      <dsp:txXfrm>
-        <a:off x="1140053" y="1948635"/>
-        <a:ext cx="1835687" cy="836706"/>
-      </dsp:txXfrm>
-    </dsp:sp>
-    <dsp:sp modelId="{75C8C936-7729-47F7-8629-D75521AA55CE}">
-      <dsp:nvSpPr>
-        <dsp:cNvPr id="0" name=""/>
-        <dsp:cNvSpPr/>
-      </dsp:nvSpPr>
-      <dsp:spPr>
-        <a:xfrm>
-          <a:off x="3049479" y="2081538"/>
-          <a:ext cx="912336" cy="912336"/>
-        </a:xfrm>
-        <a:prstGeom prst="ellipse">
-          <a:avLst/>
-        </a:prstGeom>
-        <a:blipFill>
-          <a:blip xmlns:r="http://schemas.openxmlformats.org/officeDocument/2006/relationships" r:embed="rId1" cstate="print">
-            <a:extLst>
-              <a:ext uri="{28A0092B-C50C-407E-A947-70E740481C1C}">
-                <a14:useLocalDpi xmlns:a14="http://schemas.microsoft.com/office/drawing/2010/main" val="0"/>
-              </a:ext>
-            </a:extLst>
-          </a:blip>
-          <a:srcRect/>
-          <a:stretch>
-            <a:fillRect/>
-          </a:stretch>
-        </a:blipFill>
-        <a:ln>
-          <a:noFill/>
-        </a:ln>
-        <a:effectLst/>
-        <a:sp3d z="57150" extrusionH="63500" contourW="12700" prstMaterial="matte">
-          <a:contourClr>
-            <a:schemeClr val="dk1">
-              <a:tint val="20000"/>
-            </a:schemeClr>
-          </a:contourClr>
-        </a:sp3d>
-      </dsp:spPr>
-      <dsp:style>
-        <a:lnRef idx="0">
-          <a:scrgbClr r="0" g="0" b="0"/>
-        </a:lnRef>
-        <a:fillRef idx="1">
-          <a:scrgbClr r="0" g="0" b="0"/>
-        </a:fillRef>
-        <a:effectRef idx="0">
-          <a:scrgbClr r="0" g="0" b="0"/>
-        </a:effectRef>
-        <a:fontRef idx="minor"/>
-      </dsp:style>
-    </dsp:sp>
-    <dsp:sp modelId="{9153245C-BB13-4EE9-B67B-49C109C120EA}">
-      <dsp:nvSpPr>
-        <dsp:cNvPr id="0" name=""/>
-        <dsp:cNvSpPr/>
-      </dsp:nvSpPr>
-      <dsp:spPr>
-        <a:xfrm>
-          <a:off x="4187841" y="2806"/>
-          <a:ext cx="2606675" cy="1945828"/>
-        </a:xfrm>
-        <a:prstGeom prst="round2SameRect">
-          <a:avLst>
-            <a:gd name="adj1" fmla="val 8000"/>
-            <a:gd name="adj2" fmla="val 0"/>
-          </a:avLst>
-        </a:prstGeom>
-        <a:solidFill>
-          <a:schemeClr val="dk1">
-            <a:alpha val="90000"/>
-            <a:tint val="40000"/>
-            <a:hueOff val="0"/>
-            <a:satOff val="0"/>
-            <a:lumOff val="0"/>
-            <a:alphaOff val="0"/>
-          </a:schemeClr>
-        </a:solidFill>
-        <a:ln w="6350" cap="flat" cmpd="sng" algn="ctr">
-          <a:solidFill>
-            <a:schemeClr val="dk1">
-              <a:hueOff val="0"/>
-              <a:satOff val="0"/>
-              <a:lumOff val="0"/>
-              <a:alphaOff val="0"/>
-            </a:schemeClr>
-          </a:solidFill>
-          <a:prstDash val="solid"/>
-          <a:miter lim="800000"/>
-        </a:ln>
-        <a:effectLst/>
-        <a:sp3d z="-400500" extrusionH="63500" prstMaterial="matte"/>
-      </dsp:spPr>
-      <dsp:style>
-        <a:lnRef idx="1">
-          <a:scrgbClr r="0" g="0" b="0"/>
-        </a:lnRef>
-        <a:fillRef idx="1">
-          <a:scrgbClr r="0" g="0" b="0"/>
-        </a:fillRef>
-        <a:effectRef idx="0">
-          <a:scrgbClr r="0" g="0" b="0"/>
-        </a:effectRef>
-        <a:fontRef idx="minor"/>
-      </dsp:style>
-    </dsp:sp>
-    <dsp:sp modelId="{E3CD0C6D-1492-43C8-B157-BF79A6159852}">
-      <dsp:nvSpPr>
-        <dsp:cNvPr id="0" name=""/>
-        <dsp:cNvSpPr/>
-      </dsp:nvSpPr>
-      <dsp:spPr>
-        <a:xfrm>
-          <a:off x="4187841" y="1948635"/>
-          <a:ext cx="2606675" cy="836706"/>
-        </a:xfrm>
-        <a:prstGeom prst="rect">
-          <a:avLst/>
-        </a:prstGeom>
-        <a:solidFill>
-          <a:schemeClr val="lt1">
-            <a:hueOff val="0"/>
-            <a:satOff val="0"/>
-            <a:lumOff val="0"/>
-            <a:alphaOff val="0"/>
-          </a:schemeClr>
-        </a:solidFill>
-        <a:ln w="6350" cap="flat" cmpd="sng" algn="ctr">
-          <a:solidFill>
-            <a:schemeClr val="dk1">
-              <a:shade val="80000"/>
-              <a:hueOff val="0"/>
-              <a:satOff val="0"/>
-              <a:lumOff val="0"/>
-              <a:alphaOff val="0"/>
-            </a:schemeClr>
-          </a:solidFill>
-          <a:prstDash val="solid"/>
-          <a:miter lim="800000"/>
-        </a:ln>
-        <a:effectLst/>
-        <a:sp3d extrusionH="381000" contourW="38100" prstMaterial="matte">
-          <a:contourClr>
-            <a:schemeClr val="lt1"/>
-          </a:contourClr>
-        </a:sp3d>
-      </dsp:spPr>
-      <dsp:style>
-        <a:lnRef idx="1">
-          <a:scrgbClr r="0" g="0" b="0"/>
-        </a:lnRef>
-        <a:fillRef idx="1">
-          <a:scrgbClr r="0" g="0" b="0"/>
-        </a:fillRef>
-        <a:effectRef idx="0">
-          <a:scrgbClr r="0" g="0" b="0"/>
-        </a:effectRef>
-        <a:fontRef idx="minor">
-          <a:schemeClr val="lt1"/>
-        </a:fontRef>
-      </dsp:style>
-      <dsp:txBody>
-        <a:bodyPr spcFirstLastPara="0" vert="horz" wrap="square" lIns="213360" tIns="0" rIns="71120" bIns="0" numCol="1" spcCol="1270" anchor="ctr" anchorCtr="0">
-          <a:noAutofit/>
-        </a:bodyPr>
-        <a:lstStyle/>
-        <a:p>
-          <a:pPr lvl="0" algn="l" defTabSz="2489200">
-            <a:lnSpc>
-              <a:spcPct val="90000"/>
-            </a:lnSpc>
-            <a:spcBef>
-              <a:spcPct val="0"/>
-            </a:spcBef>
-            <a:spcAft>
-              <a:spcPct val="35000"/>
-            </a:spcAft>
-          </a:pPr>
-          <a:r>
-            <a:rPr lang="de-DE" sz="5600" kern="1200" dirty="0"/>
-            <a:t>Alex</a:t>
-          </a:r>
-        </a:p>
-      </dsp:txBody>
-      <dsp:txXfrm>
-        <a:off x="4187841" y="1948635"/>
-        <a:ext cx="1835687" cy="836706"/>
-      </dsp:txXfrm>
-    </dsp:sp>
-    <dsp:sp modelId="{A5058B52-91CB-4846-B2FE-B23CB6CA4ED7}">
-      <dsp:nvSpPr>
-        <dsp:cNvPr id="0" name=""/>
-        <dsp:cNvSpPr/>
-      </dsp:nvSpPr>
-      <dsp:spPr>
-        <a:xfrm>
-          <a:off x="6097267" y="2081538"/>
-          <a:ext cx="912336" cy="912336"/>
-        </a:xfrm>
-        <a:prstGeom prst="ellipse">
-          <a:avLst/>
-        </a:prstGeom>
-        <a:blipFill>
-          <a:blip xmlns:r="http://schemas.openxmlformats.org/officeDocument/2006/relationships" r:embed="rId2" cstate="print">
-            <a:extLst>
-              <a:ext uri="{28A0092B-C50C-407E-A947-70E740481C1C}">
-                <a14:useLocalDpi xmlns:a14="http://schemas.microsoft.com/office/drawing/2010/main" val="0"/>
-              </a:ext>
-            </a:extLst>
-          </a:blip>
-          <a:srcRect/>
-          <a:stretch>
-            <a:fillRect t="-39000" b="-39000"/>
-          </a:stretch>
-        </a:blipFill>
-        <a:ln>
-          <a:noFill/>
-        </a:ln>
-        <a:effectLst/>
-        <a:sp3d z="57150" extrusionH="63500" contourW="12700" prstMaterial="matte">
-          <a:contourClr>
-            <a:schemeClr val="dk1">
-              <a:tint val="20000"/>
-            </a:schemeClr>
-          </a:contourClr>
-        </a:sp3d>
-      </dsp:spPr>
-      <dsp:style>
-        <a:lnRef idx="0">
-          <a:scrgbClr r="0" g="0" b="0"/>
-        </a:lnRef>
-        <a:fillRef idx="1">
-          <a:scrgbClr r="0" g="0" b="0"/>
-        </a:fillRef>
-        <a:effectRef idx="0">
-          <a:scrgbClr r="0" g="0" b="0"/>
-        </a:effectRef>
-        <a:fontRef idx="minor"/>
-      </dsp:style>
-    </dsp:sp>
-    <dsp:sp modelId="{6C19F780-5B81-4DA1-BA7C-985A90679B18}">
-      <dsp:nvSpPr>
-        <dsp:cNvPr id="0" name=""/>
-        <dsp:cNvSpPr/>
-      </dsp:nvSpPr>
-      <dsp:spPr>
-        <a:xfrm>
-          <a:off x="2663947" y="3445736"/>
-          <a:ext cx="2606675" cy="1945828"/>
-        </a:xfrm>
-        <a:prstGeom prst="round2SameRect">
-          <a:avLst>
-            <a:gd name="adj1" fmla="val 8000"/>
-            <a:gd name="adj2" fmla="val 0"/>
-          </a:avLst>
-        </a:prstGeom>
-        <a:solidFill>
-          <a:schemeClr val="dk1">
-            <a:alpha val="90000"/>
-            <a:tint val="40000"/>
-            <a:hueOff val="0"/>
-            <a:satOff val="0"/>
-            <a:lumOff val="0"/>
-            <a:alphaOff val="0"/>
-          </a:schemeClr>
-        </a:solidFill>
-        <a:ln w="6350" cap="flat" cmpd="sng" algn="ctr">
-          <a:solidFill>
-            <a:schemeClr val="dk1">
-              <a:hueOff val="0"/>
-              <a:satOff val="0"/>
-              <a:lumOff val="0"/>
-              <a:alphaOff val="0"/>
-            </a:schemeClr>
-          </a:solidFill>
-          <a:prstDash val="solid"/>
-          <a:miter lim="800000"/>
-        </a:ln>
-        <a:effectLst/>
-        <a:sp3d z="-400500" extrusionH="63500" prstMaterial="matte"/>
-      </dsp:spPr>
-      <dsp:style>
-        <a:lnRef idx="1">
-          <a:scrgbClr r="0" g="0" b="0"/>
-        </a:lnRef>
-        <a:fillRef idx="1">
-          <a:scrgbClr r="0" g="0" b="0"/>
-        </a:fillRef>
-        <a:effectRef idx="0">
-          <a:scrgbClr r="0" g="0" b="0"/>
-        </a:effectRef>
-        <a:fontRef idx="minor"/>
-      </dsp:style>
-      <dsp:txBody>
-        <a:bodyPr spcFirstLastPara="0" vert="horz" wrap="square" lIns="82550" tIns="247650" rIns="82550" bIns="82550" numCol="1" spcCol="1270" anchor="t" anchorCtr="0">
-          <a:noAutofit/>
-        </a:bodyPr>
-        <a:lstStyle/>
-        <a:p>
-          <a:pPr marL="285750" lvl="1" indent="-285750" algn="l" defTabSz="2889250">
-            <a:lnSpc>
-              <a:spcPct val="90000"/>
-            </a:lnSpc>
-            <a:spcBef>
-              <a:spcPct val="0"/>
-            </a:spcBef>
-            <a:spcAft>
-              <a:spcPct val="15000"/>
-            </a:spcAft>
-            <a:buChar char="••"/>
-          </a:pPr>
-          <a:endParaRPr lang="de-DE" sz="6500" kern="1200" dirty="0"/>
-        </a:p>
-      </dsp:txBody>
-      <dsp:txXfrm>
-        <a:off x="2709540" y="3491329"/>
-        <a:ext cx="2515489" cy="1900235"/>
-      </dsp:txXfrm>
-    </dsp:sp>
-    <dsp:sp modelId="{01C6FE07-F1B2-41A7-B0A0-2F3A8E66E361}">
-      <dsp:nvSpPr>
-        <dsp:cNvPr id="0" name=""/>
-        <dsp:cNvSpPr/>
-      </dsp:nvSpPr>
-      <dsp:spPr>
-        <a:xfrm>
-          <a:off x="2663947" y="5391564"/>
-          <a:ext cx="2606675" cy="836706"/>
-        </a:xfrm>
-        <a:prstGeom prst="rect">
-          <a:avLst/>
-        </a:prstGeom>
-        <a:solidFill>
-          <a:schemeClr val="lt1">
-            <a:hueOff val="0"/>
-            <a:satOff val="0"/>
-            <a:lumOff val="0"/>
-            <a:alphaOff val="0"/>
-          </a:schemeClr>
-        </a:solidFill>
-        <a:ln w="6350" cap="flat" cmpd="sng" algn="ctr">
-          <a:solidFill>
-            <a:schemeClr val="dk1">
-              <a:shade val="80000"/>
-              <a:hueOff val="0"/>
-              <a:satOff val="0"/>
-              <a:lumOff val="0"/>
-              <a:alphaOff val="0"/>
-            </a:schemeClr>
-          </a:solidFill>
-          <a:prstDash val="solid"/>
-          <a:miter lim="800000"/>
-        </a:ln>
-        <a:effectLst/>
-        <a:sp3d extrusionH="381000" contourW="38100" prstMaterial="matte">
-          <a:contourClr>
-            <a:schemeClr val="lt1"/>
-          </a:contourClr>
-        </a:sp3d>
-      </dsp:spPr>
-      <dsp:style>
-        <a:lnRef idx="1">
-          <a:scrgbClr r="0" g="0" b="0"/>
-        </a:lnRef>
-        <a:fillRef idx="1">
-          <a:scrgbClr r="0" g="0" b="0"/>
-        </a:fillRef>
-        <a:effectRef idx="0">
-          <a:scrgbClr r="0" g="0" b="0"/>
-        </a:effectRef>
-        <a:fontRef idx="minor">
-          <a:schemeClr val="lt1"/>
-        </a:fontRef>
-      </dsp:style>
-      <dsp:txBody>
-        <a:bodyPr spcFirstLastPara="0" vert="horz" wrap="square" lIns="213360" tIns="0" rIns="71120" bIns="0" numCol="1" spcCol="1270" anchor="ctr" anchorCtr="0">
-          <a:noAutofit/>
-        </a:bodyPr>
-        <a:lstStyle/>
-        <a:p>
-          <a:pPr lvl="0" algn="l" defTabSz="2489200">
-            <a:lnSpc>
-              <a:spcPct val="90000"/>
-            </a:lnSpc>
-            <a:spcBef>
-              <a:spcPct val="0"/>
-            </a:spcBef>
-            <a:spcAft>
-              <a:spcPct val="35000"/>
-            </a:spcAft>
-          </a:pPr>
-          <a:r>
-            <a:rPr lang="de-DE" sz="5600" kern="1200" dirty="0"/>
-            <a:t>Chris</a:t>
-          </a:r>
-        </a:p>
-      </dsp:txBody>
-      <dsp:txXfrm>
-        <a:off x="2663947" y="5391564"/>
-        <a:ext cx="1835687" cy="836706"/>
-      </dsp:txXfrm>
-    </dsp:sp>
-    <dsp:sp modelId="{0F0DF652-7447-448F-9BB0-344491D6C29E}">
-      <dsp:nvSpPr>
-        <dsp:cNvPr id="0" name=""/>
-        <dsp:cNvSpPr/>
-      </dsp:nvSpPr>
-      <dsp:spPr>
-        <a:xfrm>
-          <a:off x="4573373" y="5524467"/>
-          <a:ext cx="912336" cy="912336"/>
-        </a:xfrm>
-        <a:prstGeom prst="ellipse">
-          <a:avLst/>
-        </a:prstGeom>
-        <a:blipFill>
-          <a:blip xmlns:r="http://schemas.openxmlformats.org/officeDocument/2006/relationships" r:embed="rId3" cstate="print">
-            <a:extLst>
-              <a:ext uri="{28A0092B-C50C-407E-A947-70E740481C1C}">
-                <a14:useLocalDpi xmlns:a14="http://schemas.microsoft.com/office/drawing/2010/main" val="0"/>
-              </a:ext>
-            </a:extLst>
-          </a:blip>
-          <a:srcRect/>
-          <a:stretch>
-            <a:fillRect l="-25000" r="-25000"/>
-          </a:stretch>
-        </a:blipFill>
-        <a:ln>
-          <a:noFill/>
-        </a:ln>
-        <a:effectLst/>
-        <a:sp3d z="57150" extrusionH="63500" contourW="12700" prstMaterial="matte">
-          <a:contourClr>
-            <a:schemeClr val="dk1">
-              <a:tint val="20000"/>
-            </a:schemeClr>
-          </a:contourClr>
-        </a:sp3d>
-      </dsp:spPr>
-      <dsp:style>
-        <a:lnRef idx="0">
-          <a:scrgbClr r="0" g="0" b="0"/>
-        </a:lnRef>
-        <a:fillRef idx="1">
-          <a:scrgbClr r="0" g="0" b="0"/>
-        </a:fillRef>
-        <a:effectRef idx="0">
-          <a:scrgbClr r="0" g="0" b="0"/>
-        </a:effectRef>
-        <a:fontRef idx="minor"/>
-      </dsp:style>
-    </dsp:sp>
   </dsp:spTree>
 </dsp:drawing>
 </file>
@@ -4514,447 +3546,6 @@
       <dsp:cNvGrpSpPr/>
     </dsp:nvGrpSpPr>
     <dsp:grpSpPr/>
-    <dsp:sp modelId="{F0E81315-B9D7-4661-97C9-FF01E1612E06}">
-      <dsp:nvSpPr>
-        <dsp:cNvPr id="0" name=""/>
-        <dsp:cNvSpPr/>
-      </dsp:nvSpPr>
-      <dsp:spPr>
-        <a:xfrm>
-          <a:off x="-379226" y="136891"/>
-          <a:ext cx="8783806" cy="5489878"/>
-        </a:xfrm>
-        <a:prstGeom prst="swooshArrow">
-          <a:avLst>
-            <a:gd name="adj1" fmla="val 25000"/>
-            <a:gd name="adj2" fmla="val 25000"/>
-          </a:avLst>
-        </a:prstGeom>
-        <a:solidFill>
-          <a:schemeClr val="dk2">
-            <a:tint val="40000"/>
-            <a:hueOff val="0"/>
-            <a:satOff val="0"/>
-            <a:lumOff val="0"/>
-            <a:alphaOff val="0"/>
-          </a:schemeClr>
-        </a:solidFill>
-        <a:ln>
-          <a:noFill/>
-        </a:ln>
-        <a:effectLst/>
-      </dsp:spPr>
-      <dsp:style>
-        <a:lnRef idx="0">
-          <a:scrgbClr r="0" g="0" b="0"/>
-        </a:lnRef>
-        <a:fillRef idx="1">
-          <a:scrgbClr r="0" g="0" b="0"/>
-        </a:fillRef>
-        <a:effectRef idx="2">
-          <a:scrgbClr r="0" g="0" b="0"/>
-        </a:effectRef>
-        <a:fontRef idx="minor"/>
-      </dsp:style>
-    </dsp:sp>
-    <dsp:sp modelId="{5C97C76E-E266-4DF7-B5B1-817C9BC53963}">
-      <dsp:nvSpPr>
-        <dsp:cNvPr id="0" name=""/>
-        <dsp:cNvSpPr/>
-      </dsp:nvSpPr>
-      <dsp:spPr>
-        <a:xfrm>
-          <a:off x="736316" y="3926005"/>
-          <a:ext cx="228378" cy="228378"/>
-        </a:xfrm>
-        <a:prstGeom prst="ellipse">
-          <a:avLst/>
-        </a:prstGeom>
-        <a:gradFill rotWithShape="0">
-          <a:gsLst>
-            <a:gs pos="0">
-              <a:schemeClr val="dk2">
-                <a:hueOff val="0"/>
-                <a:satOff val="0"/>
-                <a:lumOff val="0"/>
-                <a:alphaOff val="0"/>
-                <a:satMod val="103000"/>
-                <a:lumMod val="102000"/>
-                <a:tint val="94000"/>
-              </a:schemeClr>
-            </a:gs>
-            <a:gs pos="50000">
-              <a:schemeClr val="dk2">
-                <a:hueOff val="0"/>
-                <a:satOff val="0"/>
-                <a:lumOff val="0"/>
-                <a:alphaOff val="0"/>
-                <a:satMod val="110000"/>
-                <a:lumMod val="100000"/>
-                <a:shade val="100000"/>
-              </a:schemeClr>
-            </a:gs>
-            <a:gs pos="100000">
-              <a:schemeClr val="dk2">
-                <a:hueOff val="0"/>
-                <a:satOff val="0"/>
-                <a:lumOff val="0"/>
-                <a:alphaOff val="0"/>
-                <a:lumMod val="99000"/>
-                <a:satMod val="120000"/>
-                <a:shade val="78000"/>
-              </a:schemeClr>
-            </a:gs>
-          </a:gsLst>
-          <a:lin ang="5400000" scaled="0"/>
-        </a:gradFill>
-        <a:ln>
-          <a:noFill/>
-        </a:ln>
-        <a:effectLst/>
-      </dsp:spPr>
-      <dsp:style>
-        <a:lnRef idx="0">
-          <a:scrgbClr r="0" g="0" b="0"/>
-        </a:lnRef>
-        <a:fillRef idx="3">
-          <a:scrgbClr r="0" g="0" b="0"/>
-        </a:fillRef>
-        <a:effectRef idx="2">
-          <a:scrgbClr r="0" g="0" b="0"/>
-        </a:effectRef>
-        <a:fontRef idx="minor">
-          <a:schemeClr val="lt1"/>
-        </a:fontRef>
-      </dsp:style>
-    </dsp:sp>
-    <dsp:sp modelId="{B93037BB-46BB-48F9-B24B-262F79A5E7F2}">
-      <dsp:nvSpPr>
-        <dsp:cNvPr id="0" name=""/>
-        <dsp:cNvSpPr/>
-      </dsp:nvSpPr>
-      <dsp:spPr>
-        <a:xfrm>
-          <a:off x="-565340" y="4177086"/>
-          <a:ext cx="5041271" cy="1586574"/>
-        </a:xfrm>
-        <a:prstGeom prst="rect">
-          <a:avLst/>
-        </a:prstGeom>
-        <a:noFill/>
-        <a:ln>
-          <a:noFill/>
-        </a:ln>
-        <a:effectLst/>
-      </dsp:spPr>
-      <dsp:style>
-        <a:lnRef idx="0">
-          <a:scrgbClr r="0" g="0" b="0"/>
-        </a:lnRef>
-        <a:fillRef idx="0">
-          <a:scrgbClr r="0" g="0" b="0"/>
-        </a:fillRef>
-        <a:effectRef idx="0">
-          <a:scrgbClr r="0" g="0" b="0"/>
-        </a:effectRef>
-        <a:fontRef idx="minor"/>
-      </dsp:style>
-      <dsp:txBody>
-        <a:bodyPr spcFirstLastPara="0" vert="horz" wrap="square" lIns="121013" tIns="0" rIns="0" bIns="0" numCol="1" spcCol="1270" anchor="t" anchorCtr="0">
-          <a:noAutofit/>
-        </a:bodyPr>
-        <a:lstStyle/>
-        <a:p>
-          <a:pPr lvl="0" algn="l" defTabSz="1066800">
-            <a:lnSpc>
-              <a:spcPct val="90000"/>
-            </a:lnSpc>
-            <a:spcBef>
-              <a:spcPct val="0"/>
-            </a:spcBef>
-            <a:spcAft>
-              <a:spcPct val="35000"/>
-            </a:spcAft>
-          </a:pPr>
-          <a:r>
-            <a:rPr lang="de-DE" sz="2400" kern="1200" dirty="0"/>
-            <a:t>Einarbeitung | Frontend | Datenbank</a:t>
-          </a:r>
-        </a:p>
-      </dsp:txBody>
-      <dsp:txXfrm>
-        <a:off x="-565340" y="4177086"/>
-        <a:ext cx="5041271" cy="1586574"/>
-      </dsp:txXfrm>
-    </dsp:sp>
-    <dsp:sp modelId="{1C998CCA-D9C1-414B-984C-01C14C0E010D}">
-      <dsp:nvSpPr>
-        <dsp:cNvPr id="0" name=""/>
-        <dsp:cNvSpPr/>
-      </dsp:nvSpPr>
-      <dsp:spPr>
-        <a:xfrm>
-          <a:off x="2752199" y="2433856"/>
-          <a:ext cx="412838" cy="412838"/>
-        </a:xfrm>
-        <a:prstGeom prst="ellipse">
-          <a:avLst/>
-        </a:prstGeom>
-        <a:gradFill rotWithShape="0">
-          <a:gsLst>
-            <a:gs pos="0">
-              <a:schemeClr val="dk2">
-                <a:hueOff val="0"/>
-                <a:satOff val="0"/>
-                <a:lumOff val="0"/>
-                <a:alphaOff val="0"/>
-                <a:satMod val="103000"/>
-                <a:lumMod val="102000"/>
-                <a:tint val="94000"/>
-              </a:schemeClr>
-            </a:gs>
-            <a:gs pos="50000">
-              <a:schemeClr val="dk2">
-                <a:hueOff val="0"/>
-                <a:satOff val="0"/>
-                <a:lumOff val="0"/>
-                <a:alphaOff val="0"/>
-                <a:satMod val="110000"/>
-                <a:lumMod val="100000"/>
-                <a:shade val="100000"/>
-              </a:schemeClr>
-            </a:gs>
-            <a:gs pos="100000">
-              <a:schemeClr val="dk2">
-                <a:hueOff val="0"/>
-                <a:satOff val="0"/>
-                <a:lumOff val="0"/>
-                <a:alphaOff val="0"/>
-                <a:lumMod val="99000"/>
-                <a:satMod val="120000"/>
-                <a:shade val="78000"/>
-              </a:schemeClr>
-            </a:gs>
-          </a:gsLst>
-          <a:lin ang="5400000" scaled="0"/>
-        </a:gradFill>
-        <a:ln>
-          <a:noFill/>
-        </a:ln>
-        <a:effectLst/>
-      </dsp:spPr>
-      <dsp:style>
-        <a:lnRef idx="0">
-          <a:scrgbClr r="0" g="0" b="0"/>
-        </a:lnRef>
-        <a:fillRef idx="3">
-          <a:scrgbClr r="0" g="0" b="0"/>
-        </a:fillRef>
-        <a:effectRef idx="2">
-          <a:scrgbClr r="0" g="0" b="0"/>
-        </a:effectRef>
-        <a:fontRef idx="minor">
-          <a:schemeClr val="lt1"/>
-        </a:fontRef>
-      </dsp:style>
-    </dsp:sp>
-    <dsp:sp modelId="{67B38144-ABD9-4F36-A88C-0C947BBDACBC}">
-      <dsp:nvSpPr>
-        <dsp:cNvPr id="0" name=""/>
-        <dsp:cNvSpPr/>
-      </dsp:nvSpPr>
-      <dsp:spPr>
-        <a:xfrm>
-          <a:off x="1126183" y="2906282"/>
-          <a:ext cx="5403347" cy="1228822"/>
-        </a:xfrm>
-        <a:prstGeom prst="rect">
-          <a:avLst/>
-        </a:prstGeom>
-        <a:noFill/>
-        <a:ln>
-          <a:noFill/>
-        </a:ln>
-        <a:effectLst/>
-      </dsp:spPr>
-      <dsp:style>
-        <a:lnRef idx="0">
-          <a:scrgbClr r="0" g="0" b="0"/>
-        </a:lnRef>
-        <a:fillRef idx="0">
-          <a:scrgbClr r="0" g="0" b="0"/>
-        </a:fillRef>
-        <a:effectRef idx="0">
-          <a:scrgbClr r="0" g="0" b="0"/>
-        </a:effectRef>
-        <a:fontRef idx="minor"/>
-      </dsp:style>
-      <dsp:txBody>
-        <a:bodyPr spcFirstLastPara="0" vert="horz" wrap="square" lIns="218755" tIns="0" rIns="0" bIns="0" numCol="1" spcCol="1270" anchor="t" anchorCtr="0">
-          <a:noAutofit/>
-        </a:bodyPr>
-        <a:lstStyle/>
-        <a:p>
-          <a:pPr lvl="0" algn="l" defTabSz="1066800">
-            <a:lnSpc>
-              <a:spcPct val="90000"/>
-            </a:lnSpc>
-            <a:spcBef>
-              <a:spcPct val="0"/>
-            </a:spcBef>
-            <a:spcAft>
-              <a:spcPct val="35000"/>
-            </a:spcAft>
-          </a:pPr>
-          <a:r>
-            <a:rPr lang="de-DE" sz="2400" kern="1200" dirty="0"/>
-            <a:t>Benutzerprofil | </a:t>
-          </a:r>
-          <a:r>
-            <a:rPr lang="de-DE" sz="2400" kern="1200" dirty="0" err="1"/>
-            <a:t>Youtube</a:t>
-          </a:r>
-          <a:r>
-            <a:rPr lang="de-DE" sz="2400" kern="1200" dirty="0"/>
-            <a:t>-API | Chat </a:t>
-          </a:r>
-        </a:p>
-      </dsp:txBody>
-      <dsp:txXfrm>
-        <a:off x="1126183" y="2906282"/>
-        <a:ext cx="5403347" cy="1228822"/>
-      </dsp:txXfrm>
-    </dsp:sp>
-    <dsp:sp modelId="{6FCE13F2-2999-43D7-9C67-9E6E6E19D206}">
-      <dsp:nvSpPr>
-        <dsp:cNvPr id="0" name=""/>
-        <dsp:cNvSpPr/>
-      </dsp:nvSpPr>
-      <dsp:spPr>
-        <a:xfrm>
-          <a:off x="5176530" y="1525830"/>
-          <a:ext cx="570947" cy="570947"/>
-        </a:xfrm>
-        <a:prstGeom prst="ellipse">
-          <a:avLst/>
-        </a:prstGeom>
-        <a:gradFill rotWithShape="0">
-          <a:gsLst>
-            <a:gs pos="0">
-              <a:schemeClr val="dk2">
-                <a:hueOff val="0"/>
-                <a:satOff val="0"/>
-                <a:lumOff val="0"/>
-                <a:alphaOff val="0"/>
-                <a:satMod val="103000"/>
-                <a:lumMod val="102000"/>
-                <a:tint val="94000"/>
-              </a:schemeClr>
-            </a:gs>
-            <a:gs pos="50000">
-              <a:schemeClr val="dk2">
-                <a:hueOff val="0"/>
-                <a:satOff val="0"/>
-                <a:lumOff val="0"/>
-                <a:alphaOff val="0"/>
-                <a:satMod val="110000"/>
-                <a:lumMod val="100000"/>
-                <a:shade val="100000"/>
-              </a:schemeClr>
-            </a:gs>
-            <a:gs pos="100000">
-              <a:schemeClr val="dk2">
-                <a:hueOff val="0"/>
-                <a:satOff val="0"/>
-                <a:lumOff val="0"/>
-                <a:alphaOff val="0"/>
-                <a:lumMod val="99000"/>
-                <a:satMod val="120000"/>
-                <a:shade val="78000"/>
-              </a:schemeClr>
-            </a:gs>
-          </a:gsLst>
-          <a:lin ang="5400000" scaled="0"/>
-        </a:gradFill>
-        <a:ln>
-          <a:noFill/>
-        </a:ln>
-        <a:effectLst/>
-      </dsp:spPr>
-      <dsp:style>
-        <a:lnRef idx="0">
-          <a:scrgbClr r="0" g="0" b="0"/>
-        </a:lnRef>
-        <a:fillRef idx="3">
-          <a:scrgbClr r="0" g="0" b="0"/>
-        </a:fillRef>
-        <a:effectRef idx="2">
-          <a:scrgbClr r="0" g="0" b="0"/>
-        </a:effectRef>
-        <a:fontRef idx="minor">
-          <a:schemeClr val="lt1"/>
-        </a:fontRef>
-      </dsp:style>
-    </dsp:sp>
-    <dsp:sp modelId="{DA4FBF98-BC65-4120-AA6C-67DAD257D6DD}">
-      <dsp:nvSpPr>
-        <dsp:cNvPr id="0" name=""/>
-        <dsp:cNvSpPr/>
-      </dsp:nvSpPr>
-      <dsp:spPr>
-        <a:xfrm>
-          <a:off x="3060704" y="2122875"/>
-          <a:ext cx="5829123" cy="1513061"/>
-        </a:xfrm>
-        <a:prstGeom prst="rect">
-          <a:avLst/>
-        </a:prstGeom>
-        <a:noFill/>
-        <a:ln>
-          <a:noFill/>
-        </a:ln>
-        <a:effectLst/>
-      </dsp:spPr>
-      <dsp:style>
-        <a:lnRef idx="0">
-          <a:scrgbClr r="0" g="0" b="0"/>
-        </a:lnRef>
-        <a:fillRef idx="0">
-          <a:scrgbClr r="0" g="0" b="0"/>
-        </a:fillRef>
-        <a:effectRef idx="0">
-          <a:scrgbClr r="0" g="0" b="0"/>
-        </a:effectRef>
-        <a:fontRef idx="minor"/>
-      </dsp:style>
-      <dsp:txBody>
-        <a:bodyPr spcFirstLastPara="0" vert="horz" wrap="square" lIns="302533" tIns="0" rIns="0" bIns="0" numCol="1" spcCol="1270" anchor="t" anchorCtr="0">
-          <a:noAutofit/>
-        </a:bodyPr>
-        <a:lstStyle/>
-        <a:p>
-          <a:pPr lvl="0" algn="l" defTabSz="1066800">
-            <a:lnSpc>
-              <a:spcPct val="90000"/>
-            </a:lnSpc>
-            <a:spcBef>
-              <a:spcPct val="0"/>
-            </a:spcBef>
-            <a:spcAft>
-              <a:spcPct val="35000"/>
-            </a:spcAft>
-          </a:pPr>
-          <a:r>
-            <a:rPr lang="de-DE" sz="2400" kern="1200" dirty="0"/>
-            <a:t>Security | Schönheitsimplementierungen </a:t>
-          </a:r>
-        </a:p>
-      </dsp:txBody>
-      <dsp:txXfrm>
-        <a:off x="3060704" y="2122875"/>
-        <a:ext cx="5829123" cy="1513061"/>
-      </dsp:txXfrm>
-    </dsp:sp>
   </dsp:spTree>
 </dsp:drawing>
 </file>
@@ -11031,125 +9622,10 @@
           <a:lstStyle/>
           <a:p>
             <a:r>
-              <a:rPr lang="de-DE" dirty="0" err="1" smtClean="0"/>
-              <a:t>Phpmyadmin</a:t>
-            </a:r>
-            <a:r>
-              <a:rPr lang="de-DE" dirty="0" smtClean="0"/>
-              <a:t>(MySQL)</a:t>
-            </a:r>
-          </a:p>
-          <a:p>
-            <a:r>
-              <a:rPr lang="de-DE" dirty="0" smtClean="0"/>
-              <a:t>Next.js</a:t>
-            </a:r>
-          </a:p>
-          <a:p>
-            <a:r>
-              <a:rPr lang="de-DE" dirty="0" err="1" smtClean="0"/>
-              <a:t>React</a:t>
-            </a:r>
-            <a:endParaRPr lang="de-DE" dirty="0" smtClean="0"/>
-          </a:p>
-          <a:p>
-            <a:r>
-              <a:rPr lang="de-DE" dirty="0" err="1" smtClean="0"/>
-              <a:t>Semantic</a:t>
-            </a:r>
-            <a:r>
               <a:rPr lang="de-DE" baseline="0" dirty="0" smtClean="0"/>
-              <a:t> UI</a:t>
-            </a:r>
-          </a:p>
-          <a:p>
-            <a:r>
-              <a:rPr lang="de-DE" baseline="0" dirty="0" err="1" smtClean="0"/>
-              <a:t>Node</a:t>
-            </a:r>
-            <a:r>
-              <a:rPr lang="de-DE" baseline="0" dirty="0" smtClean="0"/>
-              <a:t> </a:t>
-            </a:r>
-            <a:r>
-              <a:rPr lang="de-DE" baseline="0" dirty="0" err="1" smtClean="0"/>
-              <a:t>Js</a:t>
-            </a:r>
-            <a:r>
-              <a:rPr lang="de-DE" baseline="0" dirty="0" smtClean="0"/>
-              <a:t> - mit den oberen verbunden</a:t>
-            </a:r>
-          </a:p>
-          <a:p>
-            <a:r>
-              <a:rPr lang="de-DE" baseline="0" dirty="0" err="1" smtClean="0"/>
-              <a:t>Nginx</a:t>
-            </a:r>
-            <a:r>
-              <a:rPr lang="de-DE" baseline="0" dirty="0" smtClean="0"/>
-              <a:t> - </a:t>
-            </a:r>
-            <a:r>
-              <a:rPr lang="de-DE" baseline="0" dirty="0" err="1" smtClean="0"/>
-              <a:t>webserver</a:t>
+              <a:t>Übersicht über unsere verwendeten Technologien.</a:t>
             </a:r>
             <a:endParaRPr lang="de-DE" baseline="0" dirty="0" smtClean="0"/>
-          </a:p>
-          <a:p>
-            <a:r>
-              <a:rPr lang="de-DE" baseline="0" dirty="0" smtClean="0"/>
-              <a:t>Socket.io für Chat und </a:t>
-            </a:r>
-            <a:r>
-              <a:rPr lang="de-DE" baseline="0" dirty="0" err="1" smtClean="0"/>
-              <a:t>trigger</a:t>
-            </a:r>
-            <a:r>
-              <a:rPr lang="de-DE" baseline="0" dirty="0" smtClean="0"/>
-              <a:t> für </a:t>
-            </a:r>
-            <a:r>
-              <a:rPr lang="de-DE" baseline="0" dirty="0" err="1" smtClean="0"/>
-              <a:t>sync</a:t>
-            </a:r>
-            <a:endParaRPr lang="de-DE" baseline="0" dirty="0" smtClean="0"/>
-          </a:p>
-          <a:p>
-            <a:r>
-              <a:rPr lang="de-DE" baseline="0" dirty="0" err="1" smtClean="0"/>
-              <a:t>Bcrypt</a:t>
-            </a:r>
-            <a:r>
-              <a:rPr lang="de-DE" baseline="0" dirty="0" smtClean="0"/>
-              <a:t> – </a:t>
-            </a:r>
-            <a:r>
-              <a:rPr lang="de-DE" baseline="0" dirty="0" err="1" smtClean="0"/>
-              <a:t>verschlüssel</a:t>
-            </a:r>
-            <a:r>
-              <a:rPr lang="de-DE" baseline="0" dirty="0" smtClean="0"/>
-              <a:t> von </a:t>
-            </a:r>
-            <a:r>
-              <a:rPr lang="de-DE" baseline="0" dirty="0" err="1" smtClean="0"/>
-              <a:t>passwörtern</a:t>
-            </a:r>
-            <a:endParaRPr lang="de-DE" baseline="0" dirty="0" smtClean="0"/>
-          </a:p>
-          <a:p>
-            <a:r>
-              <a:rPr lang="de-DE" baseline="0" dirty="0" smtClean="0"/>
-              <a:t>JSON Web Token – für Session verwendet, dadurch Cookie „</a:t>
-            </a:r>
-            <a:r>
-              <a:rPr lang="de-DE" baseline="0" dirty="0" err="1" smtClean="0"/>
-              <a:t>verschlüssel</a:t>
-            </a:r>
-            <a:r>
-              <a:rPr lang="de-DE" baseline="0" dirty="0" smtClean="0"/>
-              <a:t>“</a:t>
-            </a:r>
           </a:p>
           <a:p>
             <a:endParaRPr lang="de-DE" dirty="0" smtClean="0"/>
@@ -11240,45 +9716,172 @@
           <a:lstStyle/>
           <a:p>
             <a:r>
+              <a:rPr lang="de-DE" baseline="0" dirty="0" smtClean="0"/>
+              <a:t>- einer der ersten Entscheidungen.</a:t>
+            </a:r>
+          </a:p>
+          <a:p>
+            <a:pPr marL="0" indent="0">
+              <a:buFontTx/>
+              <a:buNone/>
+            </a:pPr>
+            <a:r>
               <a:rPr lang="de-DE" dirty="0" smtClean="0"/>
-              <a:t>Haben</a:t>
+              <a:t>- </a:t>
+            </a:r>
+            <a:r>
+              <a:rPr lang="de-DE" u="sng" dirty="0" smtClean="0"/>
+              <a:t>MySQL</a:t>
+            </a:r>
+            <a:r>
+              <a:rPr lang="de-DE" dirty="0" smtClean="0"/>
+              <a:t/>
+            </a:r>
+            <a:br>
+              <a:rPr lang="de-DE" dirty="0" smtClean="0"/>
+            </a:br>
+            <a:r>
+              <a:rPr lang="de-DE" dirty="0" smtClean="0"/>
+              <a:t>	</a:t>
+            </a:r>
+            <a:r>
+              <a:rPr lang="de-DE" b="1" dirty="0" smtClean="0"/>
+              <a:t>pro</a:t>
+            </a:r>
+            <a:r>
+              <a:rPr lang="de-DE" dirty="0" smtClean="0"/>
+              <a:t>:</a:t>
             </a:r>
             <a:r>
               <a:rPr lang="de-DE" baseline="0" dirty="0" smtClean="0"/>
-              <a:t> uns für </a:t>
+              <a:t> -Relationaler Aufbau</a:t>
+            </a:r>
+          </a:p>
+          <a:p>
+            <a:pPr marL="914400" lvl="2" indent="0">
+              <a:buFontTx/>
+              <a:buNone/>
+            </a:pPr>
+            <a:r>
+              <a:rPr lang="de-DE" baseline="0" dirty="0" smtClean="0"/>
+              <a:t>       - Beziehungen realisierbar ( Raum, Video, User Tabellen)</a:t>
+            </a:r>
+          </a:p>
+          <a:p>
+            <a:pPr marL="914400" lvl="2" indent="0">
+              <a:buFontTx/>
+              <a:buNone/>
+            </a:pPr>
+            <a:r>
+              <a:rPr lang="de-DE" baseline="0" dirty="0" smtClean="0"/>
+              <a:t>       - Einige Vorkenntnisse vorhanden</a:t>
+            </a:r>
+          </a:p>
+          <a:p>
+            <a:pPr marL="914400" lvl="2" indent="0">
+              <a:buFontTx/>
+              <a:buNone/>
+            </a:pPr>
+            <a:r>
+              <a:rPr lang="de-DE" b="1" baseline="0" dirty="0" err="1" smtClean="0"/>
+              <a:t>Con</a:t>
+            </a:r>
+            <a:r>
+              <a:rPr lang="de-DE" baseline="0" dirty="0" smtClean="0"/>
+              <a:t>:- Performance bei zu großen </a:t>
             </a:r>
             <a:r>
               <a:rPr lang="de-DE" baseline="0" dirty="0" err="1" smtClean="0"/>
-              <a:t>Mysql</a:t>
+              <a:t>korrelation</a:t>
             </a:r>
             <a:r>
               <a:rPr lang="de-DE" baseline="0" dirty="0" smtClean="0"/>
-              <a:t> entschieden, da die Beziehung zwischen den Tabellen für unser Projekt hilfreich ist. (</a:t>
+              <a:t> schlecht. Aber das betrifft uns nicht</a:t>
+            </a:r>
+          </a:p>
+          <a:p>
+            <a:pPr marL="914400" lvl="2" indent="0">
+              <a:buFontTx/>
+              <a:buNone/>
+            </a:pPr>
+            <a:endParaRPr lang="de-DE" baseline="0" dirty="0" smtClean="0"/>
+          </a:p>
+          <a:p>
+            <a:pPr marL="171450" lvl="0" indent="-171450">
+              <a:buFontTx/>
+              <a:buChar char="-"/>
+            </a:pPr>
+            <a:r>
+              <a:rPr lang="de-DE" u="sng" dirty="0" err="1" smtClean="0"/>
+              <a:t>NoSQL</a:t>
             </a:r>
             <a:r>
-              <a:rPr lang="de-DE" baseline="0" dirty="0" err="1" smtClean="0"/>
-              <a:t>User,Room,Videos</a:t>
+              <a:rPr lang="de-DE" u="none" dirty="0" smtClean="0"/>
+              <a:t>	</a:t>
             </a:r>
             <a:r>
-              <a:rPr lang="de-DE" baseline="0" dirty="0" smtClean="0"/>
-              <a:t>). Vorkenntnisse in der </a:t>
+              <a:rPr lang="de-DE" b="1" u="none" dirty="0" smtClean="0"/>
+              <a:t>pro</a:t>
             </a:r>
             <a:r>
-              <a:rPr lang="de-DE" baseline="0" dirty="0" err="1" smtClean="0"/>
-              <a:t>Mysql</a:t>
+              <a:rPr lang="de-DE" u="none" dirty="0" smtClean="0"/>
+              <a:t>:</a:t>
             </a:r>
             <a:r>
-              <a:rPr lang="de-DE" baseline="0" dirty="0" smtClean="0"/>
+              <a:rPr lang="de-DE" u="none" baseline="0" dirty="0" smtClean="0"/>
+              <a:t> - Gut für großen Datenmengen</a:t>
+            </a:r>
+          </a:p>
+          <a:p>
+            <a:pPr marL="914400" lvl="2" indent="0">
+              <a:buFontTx/>
+              <a:buNone/>
+            </a:pPr>
+            <a:r>
+              <a:rPr lang="de-DE" b="1" u="none" baseline="0" dirty="0" err="1" smtClean="0"/>
+              <a:t>Con</a:t>
+            </a:r>
+            <a:r>
+              <a:rPr lang="de-DE" u="none" baseline="0" dirty="0" smtClean="0"/>
+              <a:t>:- Keine Beziehungen</a:t>
+            </a:r>
+            <a:br>
+              <a:rPr lang="de-DE" u="none" baseline="0" dirty="0" smtClean="0"/>
+            </a:br>
+            <a:r>
+              <a:rPr lang="de-DE" u="none" baseline="0" dirty="0" smtClean="0"/>
+              <a:t>       - wenig Erfahrung</a:t>
+            </a:r>
+          </a:p>
+          <a:p>
+            <a:pPr marL="914400" lvl="2" indent="0">
+              <a:buFontTx/>
+              <a:buNone/>
+            </a:pPr>
+            <a:endParaRPr lang="de-DE" u="none" dirty="0" smtClean="0"/>
+          </a:p>
+          <a:p>
+            <a:r>
+              <a:rPr lang="de-DE" u="sng" dirty="0" smtClean="0"/>
+              <a:t>Ergebnis</a:t>
+            </a:r>
+            <a:r>
+              <a:rPr lang="de-DE" u="none" dirty="0" smtClean="0"/>
+              <a:t>:</a:t>
+            </a:r>
+            <a:r>
+              <a:rPr lang="de-DE" u="none" baseline="0" dirty="0" smtClean="0"/>
               <a:t> </a:t>
             </a:r>
             <a:r>
-              <a:rPr lang="de-DE" baseline="0" dirty="0" err="1" smtClean="0"/>
-              <a:t>welt</a:t>
+              <a:rPr lang="de-DE" u="none" dirty="0" smtClean="0"/>
+              <a:t>Entscheidung für MySQL</a:t>
             </a:r>
             <a:r>
-              <a:rPr lang="de-DE" baseline="0" dirty="0" smtClean="0"/>
-              <a:t> haben uns dann auch noch sehr geholfen. Die Performance ist nicht ganz so gravierend, da wir nicht zu viele Daten miteinander korrelieren.</a:t>
+              <a:rPr lang="de-DE" u="none" baseline="0" dirty="0" smtClean="0"/>
+              <a:t> auf Grund der Vorkenntnisse und der Möglichkeit Beziehungen zu erstellen</a:t>
             </a:r>
+            <a:endParaRPr lang="de-DE" u="sng" baseline="0" dirty="0" smtClean="0"/>
           </a:p>
           <a:p>
             <a:endParaRPr lang="de-DE" baseline="0" dirty="0" smtClean="0"/>
@@ -11366,8 +9969,25 @@
           <a:lstStyle/>
           <a:p>
             <a:r>
+              <a:rPr lang="de-DE" u="sng" dirty="0" smtClean="0"/>
+              <a:t>Frontend</a:t>
+            </a:r>
+          </a:p>
+          <a:p>
+            <a:endParaRPr lang="de-DE" dirty="0" smtClean="0"/>
+          </a:p>
+          <a:p>
+            <a:r>
               <a:rPr lang="de-DE" dirty="0" err="1" smtClean="0"/>
               <a:t>React</a:t>
+            </a:r>
+            <a:r>
+              <a:rPr lang="de-DE" dirty="0" smtClean="0"/>
+              <a:t> – JavaScript</a:t>
+            </a:r>
+            <a:r>
+              <a:rPr lang="de-DE" baseline="0" dirty="0" smtClean="0"/>
+              <a:t> Bibliothek, die ein Grundgerüst für die Ausgabe von User-Interface-Komponenten von Webseiten zu Verfügung stellt.</a:t>
             </a:r>
             <a:endParaRPr lang="de-DE" dirty="0" smtClean="0"/>
           </a:p>
@@ -11378,7 +9998,11 @@
             </a:r>
             <a:r>
               <a:rPr lang="de-DE" baseline="0" dirty="0" smtClean="0"/>
-              <a:t> UI</a:t>
+              <a:t> </a:t>
+            </a:r>
+            <a:r>
+              <a:rPr lang="de-DE" baseline="0" dirty="0" smtClean="0"/>
+              <a:t>UI – Für das Design der Oberflache zuständig</a:t>
             </a:r>
             <a:endParaRPr lang="de-DE" dirty="0"/>
           </a:p>
@@ -11465,44 +10089,73 @@
           <a:lstStyle/>
           <a:p>
             <a:r>
-              <a:rPr lang="de-DE" dirty="0" err="1" smtClean="0"/>
-              <a:t>Nginx</a:t>
+              <a:rPr lang="de-DE" u="sng" dirty="0" smtClean="0"/>
+              <a:t>Backend</a:t>
             </a:r>
             <a:r>
               <a:rPr lang="de-DE" dirty="0" smtClean="0"/>
-              <a:t> als Webserver</a:t>
+              <a:t>:</a:t>
             </a:r>
           </a:p>
           <a:p>
+            <a:endParaRPr lang="de-DE" dirty="0" smtClean="0"/>
+          </a:p>
+          <a:p>
             <a:r>
-              <a:rPr lang="de-DE" dirty="0" err="1" smtClean="0"/>
-              <a:t>Node</a:t>
+              <a:rPr lang="de-DE" b="1" dirty="0" err="1" smtClean="0"/>
+              <a:t>Nginx</a:t>
             </a:r>
             <a:r>
               <a:rPr lang="de-DE" dirty="0" smtClean="0"/>
               <a:t> </a:t>
             </a:r>
             <a:r>
-              <a:rPr lang="de-DE" dirty="0" err="1" smtClean="0"/>
+              <a:rPr lang="de-DE" dirty="0" smtClean="0"/>
+              <a:t>als </a:t>
+            </a:r>
+            <a:r>
+              <a:rPr lang="de-DE" dirty="0" smtClean="0"/>
+              <a:t>Webserver auf der</a:t>
+            </a:r>
+            <a:r>
+              <a:rPr lang="de-DE" baseline="0" dirty="0" smtClean="0"/>
+              <a:t> VM</a:t>
+            </a:r>
+          </a:p>
+          <a:p>
+            <a:r>
+              <a:rPr lang="de-DE" b="1" dirty="0" err="1" smtClean="0"/>
+              <a:t>Node</a:t>
+            </a:r>
+            <a:r>
+              <a:rPr lang="de-DE" b="1" dirty="0" smtClean="0"/>
+              <a:t> </a:t>
+            </a:r>
+            <a:r>
+              <a:rPr lang="de-DE" b="1" dirty="0" err="1" smtClean="0"/>
               <a:t>js</a:t>
             </a:r>
             <a:r>
-              <a:rPr lang="de-DE" dirty="0" smtClean="0"/>
-              <a:t> – keine </a:t>
-            </a:r>
-            <a:r>
-              <a:rPr lang="de-DE" dirty="0" err="1" smtClean="0"/>
-              <a:t>Ahung</a:t>
+              <a:rPr lang="de-DE" b="1" dirty="0" smtClean="0"/>
+              <a:t> </a:t>
             </a:r>
             <a:r>
               <a:rPr lang="de-DE" dirty="0" smtClean="0"/>
-              <a:t> ob das hier hin muss </a:t>
+              <a:t>– </a:t>
+            </a:r>
+            <a:r>
+              <a:rPr lang="de-DE" dirty="0" smtClean="0"/>
+              <a:t>Dient als Backend</a:t>
+            </a:r>
+            <a:r>
+              <a:rPr lang="de-DE" baseline="0" dirty="0" smtClean="0"/>
+              <a:t> für unser Projekt</a:t>
             </a:r>
             <a:r>
               <a:rPr lang="de-DE" dirty="0" smtClean="0">
                 <a:sym typeface="Wingdings" panose="05000000000000000000" pitchFamily="2" charset="2"/>
               </a:rPr>
-              <a:t></a:t>
+              <a:t/>
             </a:r>
             <a:br>
               <a:rPr lang="de-DE" dirty="0" smtClean="0">
@@ -11510,22 +10163,28 @@
               </a:rPr>
             </a:br>
             <a:r>
-              <a:rPr lang="de-DE" dirty="0" smtClean="0">
+              <a:rPr lang="de-DE" b="1" dirty="0" smtClean="0">
                 <a:sym typeface="Wingdings" panose="05000000000000000000" pitchFamily="2" charset="2"/>
               </a:rPr>
               <a:t>socket </a:t>
             </a:r>
             <a:r>
-              <a:rPr lang="de-DE" dirty="0" err="1" smtClean="0">
+              <a:rPr lang="de-DE" b="1" dirty="0" err="1" smtClean="0">
                 <a:sym typeface="Wingdings" panose="05000000000000000000" pitchFamily="2" charset="2"/>
               </a:rPr>
               <a:t>io</a:t>
             </a:r>
             <a:r>
+              <a:rPr lang="de-DE" b="1" dirty="0" smtClean="0">
+                <a:sym typeface="Wingdings" panose="05000000000000000000" pitchFamily="2" charset="2"/>
+              </a:rPr>
+              <a:t> </a:t>
+            </a:r>
+            <a:r>
               <a:rPr lang="de-DE" dirty="0" smtClean="0">
                 <a:sym typeface="Wingdings" panose="05000000000000000000" pitchFamily="2" charset="2"/>
               </a:rPr>
-              <a:t> - für die Realisierung des</a:t>
+              <a:t>- für die Realisierung des</a:t>
             </a:r>
             <a:r>
               <a:rPr lang="de-DE" baseline="0" dirty="0" smtClean="0">
@@ -11543,12 +10202,33 @@
               <a:rPr lang="de-DE" baseline="0" dirty="0" smtClean="0">
                 <a:sym typeface="Wingdings" panose="05000000000000000000" pitchFamily="2" charset="2"/>
               </a:rPr>
-              <a:t> für den Chat</a:t>
+              <a:t> </a:t>
             </a:r>
+            <a:r>
+              <a:rPr lang="de-DE" baseline="0" dirty="0" smtClean="0">
+                <a:sym typeface="Wingdings" panose="05000000000000000000" pitchFamily="2" charset="2"/>
+              </a:rPr>
+              <a:t>der für </a:t>
+            </a:r>
+            <a:r>
+              <a:rPr lang="de-DE" baseline="0" dirty="0" smtClean="0">
+                <a:sym typeface="Wingdings" panose="05000000000000000000" pitchFamily="2" charset="2"/>
+              </a:rPr>
+              <a:t>den </a:t>
+            </a:r>
+            <a:r>
+              <a:rPr lang="de-DE" baseline="0" dirty="0" smtClean="0">
+                <a:sym typeface="Wingdings" panose="05000000000000000000" pitchFamily="2" charset="2"/>
+              </a:rPr>
+              <a:t>Chat verwendet wird. Zudem noch unterschiedliche Trigger innerhalb eines Raumes.</a:t>
+            </a:r>
+            <a:endParaRPr lang="de-DE" baseline="0" dirty="0" smtClean="0">
+              <a:sym typeface="Wingdings" panose="05000000000000000000" pitchFamily="2" charset="2"/>
+            </a:endParaRPr>
           </a:p>
           <a:p>
             <a:r>
-              <a:rPr lang="de-DE" sz="1200" b="0" i="0" kern="1200" dirty="0" smtClean="0">
+              <a:rPr lang="de-DE" sz="1200" b="1" i="0" kern="1200" dirty="0" smtClean="0">
                 <a:solidFill>
                   <a:schemeClr val="tx1"/>
                 </a:solidFill>
@@ -11560,7 +10240,7 @@
               <a:t>Next </a:t>
             </a:r>
             <a:r>
-              <a:rPr lang="de-DE" sz="1200" b="0" i="0" kern="1200" dirty="0" err="1" smtClean="0">
+              <a:rPr lang="de-DE" sz="1200" b="1" i="0" kern="1200" dirty="0" err="1" smtClean="0">
                 <a:solidFill>
                   <a:schemeClr val="tx1"/>
                 </a:solidFill>
@@ -11572,6 +10252,18 @@
               <a:t>js</a:t>
             </a:r>
             <a:r>
+              <a:rPr lang="de-DE" sz="1200" b="1" i="0" kern="1200" dirty="0" smtClean="0">
+                <a:solidFill>
+                  <a:schemeClr val="tx1"/>
+                </a:solidFill>
+                <a:effectLst/>
+                <a:latin typeface="+mn-lt"/>
+                <a:ea typeface="+mn-ea"/>
+                <a:cs typeface="+mn-cs"/>
+              </a:rPr>
+              <a:t>.  </a:t>
+            </a:r>
+            <a:r>
               <a:rPr lang="de-DE" sz="1200" b="0" i="0" kern="1200" dirty="0" smtClean="0">
                 <a:solidFill>
                   <a:schemeClr val="tx1"/>
@@ -11581,7 +10273,7 @@
                 <a:ea typeface="+mn-ea"/>
                 <a:cs typeface="+mn-cs"/>
               </a:rPr>
-              <a:t>.  - JavaScript-Framework für Server-</a:t>
+              <a:t>- JavaScript-Framework für Server-</a:t>
             </a:r>
             <a:r>
               <a:rPr lang="de-DE" sz="1200" b="0" i="0" kern="1200" dirty="0" err="1" smtClean="0">
@@ -11605,7 +10297,19 @@
                 <a:ea typeface="+mn-ea"/>
                 <a:cs typeface="+mn-cs"/>
               </a:rPr>
-              <a:t> JavaScript-</a:t>
+              <a:t> </a:t>
+            </a:r>
+            <a:r>
+              <a:rPr lang="de-DE" sz="1200" b="0" i="0" kern="1200" dirty="0" smtClean="0">
+                <a:solidFill>
+                  <a:schemeClr val="tx1"/>
+                </a:solidFill>
+                <a:effectLst/>
+                <a:latin typeface="+mn-lt"/>
+                <a:ea typeface="+mn-ea"/>
+                <a:cs typeface="+mn-cs"/>
+              </a:rPr>
+              <a:t>JavaScript-</a:t>
             </a:r>
             <a:r>
               <a:rPr lang="de-DE" sz="1200" b="0" i="0" kern="1200" dirty="0" err="1" smtClean="0">
@@ -11617,10 +10321,10 @@
                 <a:ea typeface="+mn-ea"/>
                 <a:cs typeface="+mn-cs"/>
               </a:rPr>
-              <a:t>Webapps</a:t>
+              <a:t>Webapp</a:t>
             </a:r>
             <a:r>
-              <a:rPr lang="de-DE" sz="1200" b="0" i="0" kern="1200" dirty="0" smtClean="0">
+              <a:rPr lang="de-DE" sz="1200" b="0" i="0" kern="1200" baseline="0" dirty="0" smtClean="0">
                 <a:solidFill>
                   <a:schemeClr val="tx1"/>
                 </a:solidFill>
@@ -11629,10 +10333,10 @@
                 <a:ea typeface="+mn-ea"/>
                 <a:cs typeface="+mn-cs"/>
               </a:rPr>
-              <a:t> und baut auf </a:t>
+              <a:t>. Um die </a:t>
             </a:r>
             <a:r>
-              <a:rPr lang="de-DE" sz="1200" b="0" i="0" kern="1200" dirty="0" err="1" smtClean="0">
+              <a:rPr lang="de-DE" sz="1200" b="0" i="0" kern="1200" baseline="0" dirty="0" err="1" smtClean="0">
                 <a:solidFill>
                   <a:schemeClr val="tx1"/>
                 </a:solidFill>
@@ -11653,7 +10357,7 @@
                 <a:ea typeface="+mn-ea"/>
                 <a:cs typeface="+mn-cs"/>
               </a:rPr>
-              <a:t> auf.</a:t>
+              <a:t> Webseite serverseitig zu rendern.</a:t>
             </a:r>
             <a:endParaRPr lang="de-DE" dirty="0"/>
           </a:p>
@@ -11740,7 +10444,7 @@
           <a:lstStyle/>
           <a:p>
             <a:r>
-              <a:rPr lang="de-DE" dirty="0" err="1" smtClean="0"/>
+              <a:rPr lang="de-DE" b="1" dirty="0" err="1" smtClean="0"/>
               <a:t>Jsonwebtoken</a:t>
             </a:r>
             <a:r>
@@ -11775,7 +10479,7 @@
               <a:rPr lang="de-DE" dirty="0"/>
             </a:br>
             <a:r>
-              <a:rPr lang="de-DE" dirty="0" err="1" smtClean="0"/>
+              <a:rPr lang="de-DE" b="1" dirty="0" err="1" smtClean="0"/>
               <a:t>Bcrypt</a:t>
             </a:r>
             <a:r>
@@ -11880,7 +10584,7 @@
           <p:cNvPr id="2" name="Titel 1">
             <a:extLst>
               <a:ext uri="{FF2B5EF4-FFF2-40B4-BE49-F238E27FC236}">
-                <a16:creationId xmlns:a16="http://schemas.microsoft.com/office/drawing/2014/main" xmlns="" id="{724983D2-4D9A-49C5-A31D-DDCB3D006090}"/>
+                <a16:creationId xmlns="" xmlns:a16="http://schemas.microsoft.com/office/drawing/2014/main" id="{724983D2-4D9A-49C5-A31D-DDCB3D006090}"/>
               </a:ext>
             </a:extLst>
           </p:cNvPr>
@@ -11917,7 +10621,7 @@
           <p:cNvPr id="3" name="Untertitel 2">
             <a:extLst>
               <a:ext uri="{FF2B5EF4-FFF2-40B4-BE49-F238E27FC236}">
-                <a16:creationId xmlns:a16="http://schemas.microsoft.com/office/drawing/2014/main" xmlns="" id="{EC6A68B0-8322-4F42-A03E-D04A4D4F3FBE}"/>
+                <a16:creationId xmlns="" xmlns:a16="http://schemas.microsoft.com/office/drawing/2014/main" id="{EC6A68B0-8322-4F42-A03E-D04A4D4F3FBE}"/>
               </a:ext>
             </a:extLst>
           </p:cNvPr>
@@ -11987,7 +10691,7 @@
           <p:cNvPr id="4" name="Datumsplatzhalter 3">
             <a:extLst>
               <a:ext uri="{FF2B5EF4-FFF2-40B4-BE49-F238E27FC236}">
-                <a16:creationId xmlns:a16="http://schemas.microsoft.com/office/drawing/2014/main" xmlns="" id="{32314984-4194-4C46-9236-AE6E2B42D28C}"/>
+                <a16:creationId xmlns="" xmlns:a16="http://schemas.microsoft.com/office/drawing/2014/main" id="{32314984-4194-4C46-9236-AE6E2B42D28C}"/>
               </a:ext>
             </a:extLst>
           </p:cNvPr>
@@ -12016,7 +10720,7 @@
           <p:cNvPr id="5" name="Fußzeilenplatzhalter 4">
             <a:extLst>
               <a:ext uri="{FF2B5EF4-FFF2-40B4-BE49-F238E27FC236}">
-                <a16:creationId xmlns:a16="http://schemas.microsoft.com/office/drawing/2014/main" xmlns="" id="{AD177AB4-C655-45D0-ACD6-F0074DFFC244}"/>
+                <a16:creationId xmlns="" xmlns:a16="http://schemas.microsoft.com/office/drawing/2014/main" id="{AD177AB4-C655-45D0-ACD6-F0074DFFC244}"/>
               </a:ext>
             </a:extLst>
           </p:cNvPr>
@@ -12041,7 +10745,7 @@
           <p:cNvPr id="6" name="Foliennummernplatzhalter 5">
             <a:extLst>
               <a:ext uri="{FF2B5EF4-FFF2-40B4-BE49-F238E27FC236}">
-                <a16:creationId xmlns:a16="http://schemas.microsoft.com/office/drawing/2014/main" xmlns="" id="{4A44E1CE-3C24-4B8C-9541-1A8CC348B5F0}"/>
+                <a16:creationId xmlns="" xmlns:a16="http://schemas.microsoft.com/office/drawing/2014/main" id="{4A44E1CE-3C24-4B8C-9541-1A8CC348B5F0}"/>
               </a:ext>
             </a:extLst>
           </p:cNvPr>
@@ -12100,7 +10804,7 @@
           <p:cNvPr id="2" name="Titel 1">
             <a:extLst>
               <a:ext uri="{FF2B5EF4-FFF2-40B4-BE49-F238E27FC236}">
-                <a16:creationId xmlns:a16="http://schemas.microsoft.com/office/drawing/2014/main" xmlns="" id="{608E78D5-1FFE-436F-88ED-EA5401B5E6EB}"/>
+                <a16:creationId xmlns="" xmlns:a16="http://schemas.microsoft.com/office/drawing/2014/main" id="{608E78D5-1FFE-436F-88ED-EA5401B5E6EB}"/>
               </a:ext>
             </a:extLst>
           </p:cNvPr>
@@ -12128,7 +10832,7 @@
           <p:cNvPr id="3" name="Vertikaler Textplatzhalter 2">
             <a:extLst>
               <a:ext uri="{FF2B5EF4-FFF2-40B4-BE49-F238E27FC236}">
-                <a16:creationId xmlns:a16="http://schemas.microsoft.com/office/drawing/2014/main" xmlns="" id="{20B21505-985F-47AF-8195-A1E1295B477C}"/>
+                <a16:creationId xmlns="" xmlns:a16="http://schemas.microsoft.com/office/drawing/2014/main" id="{20B21505-985F-47AF-8195-A1E1295B477C}"/>
               </a:ext>
             </a:extLst>
           </p:cNvPr>
@@ -12185,7 +10889,7 @@
           <p:cNvPr id="4" name="Datumsplatzhalter 3">
             <a:extLst>
               <a:ext uri="{FF2B5EF4-FFF2-40B4-BE49-F238E27FC236}">
-                <a16:creationId xmlns:a16="http://schemas.microsoft.com/office/drawing/2014/main" xmlns="" id="{79F0B56E-9F3F-4506-8530-E0FA8D1F5F57}"/>
+                <a16:creationId xmlns="" xmlns:a16="http://schemas.microsoft.com/office/drawing/2014/main" id="{79F0B56E-9F3F-4506-8530-E0FA8D1F5F57}"/>
               </a:ext>
             </a:extLst>
           </p:cNvPr>
@@ -12214,7 +10918,7 @@
           <p:cNvPr id="5" name="Fußzeilenplatzhalter 4">
             <a:extLst>
               <a:ext uri="{FF2B5EF4-FFF2-40B4-BE49-F238E27FC236}">
-                <a16:creationId xmlns:a16="http://schemas.microsoft.com/office/drawing/2014/main" xmlns="" id="{210548FB-454A-4A2F-96D5-1360B42885F0}"/>
+                <a16:creationId xmlns="" xmlns:a16="http://schemas.microsoft.com/office/drawing/2014/main" id="{210548FB-454A-4A2F-96D5-1360B42885F0}"/>
               </a:ext>
             </a:extLst>
           </p:cNvPr>
@@ -12239,7 +10943,7 @@
           <p:cNvPr id="6" name="Foliennummernplatzhalter 5">
             <a:extLst>
               <a:ext uri="{FF2B5EF4-FFF2-40B4-BE49-F238E27FC236}">
-                <a16:creationId xmlns:a16="http://schemas.microsoft.com/office/drawing/2014/main" xmlns="" id="{6B3CDA53-B96C-4612-B87F-F7032FE162AB}"/>
+                <a16:creationId xmlns="" xmlns:a16="http://schemas.microsoft.com/office/drawing/2014/main" id="{6B3CDA53-B96C-4612-B87F-F7032FE162AB}"/>
               </a:ext>
             </a:extLst>
           </p:cNvPr>
@@ -12298,7 +11002,7 @@
           <p:cNvPr id="2" name="Vertikaler Titel 1">
             <a:extLst>
               <a:ext uri="{FF2B5EF4-FFF2-40B4-BE49-F238E27FC236}">
-                <a16:creationId xmlns:a16="http://schemas.microsoft.com/office/drawing/2014/main" xmlns="" id="{AE46E16A-D5B6-458D-B454-D6E845F686AC}"/>
+                <a16:creationId xmlns="" xmlns:a16="http://schemas.microsoft.com/office/drawing/2014/main" id="{AE46E16A-D5B6-458D-B454-D6E845F686AC}"/>
               </a:ext>
             </a:extLst>
           </p:cNvPr>
@@ -12331,7 +11035,7 @@
           <p:cNvPr id="3" name="Vertikaler Textplatzhalter 2">
             <a:extLst>
               <a:ext uri="{FF2B5EF4-FFF2-40B4-BE49-F238E27FC236}">
-                <a16:creationId xmlns:a16="http://schemas.microsoft.com/office/drawing/2014/main" xmlns="" id="{A8F91EC6-800B-4B9E-8885-574B03C9A9BD}"/>
+                <a16:creationId xmlns="" xmlns:a16="http://schemas.microsoft.com/office/drawing/2014/main" id="{A8F91EC6-800B-4B9E-8885-574B03C9A9BD}"/>
               </a:ext>
             </a:extLst>
           </p:cNvPr>
@@ -12393,7 +11097,7 @@
           <p:cNvPr id="4" name="Datumsplatzhalter 3">
             <a:extLst>
               <a:ext uri="{FF2B5EF4-FFF2-40B4-BE49-F238E27FC236}">
-                <a16:creationId xmlns:a16="http://schemas.microsoft.com/office/drawing/2014/main" xmlns="" id="{0ABC6CAC-6FBC-4EAD-A891-CADF725ACDFA}"/>
+                <a16:creationId xmlns="" xmlns:a16="http://schemas.microsoft.com/office/drawing/2014/main" id="{0ABC6CAC-6FBC-4EAD-A891-CADF725ACDFA}"/>
               </a:ext>
             </a:extLst>
           </p:cNvPr>
@@ -12422,7 +11126,7 @@
           <p:cNvPr id="5" name="Fußzeilenplatzhalter 4">
             <a:extLst>
               <a:ext uri="{FF2B5EF4-FFF2-40B4-BE49-F238E27FC236}">
-                <a16:creationId xmlns:a16="http://schemas.microsoft.com/office/drawing/2014/main" xmlns="" id="{E36C698D-E861-477D-95C5-1EDF4EB59C5C}"/>
+                <a16:creationId xmlns="" xmlns:a16="http://schemas.microsoft.com/office/drawing/2014/main" id="{E36C698D-E861-477D-95C5-1EDF4EB59C5C}"/>
               </a:ext>
             </a:extLst>
           </p:cNvPr>
@@ -12447,7 +11151,7 @@
           <p:cNvPr id="6" name="Foliennummernplatzhalter 5">
             <a:extLst>
               <a:ext uri="{FF2B5EF4-FFF2-40B4-BE49-F238E27FC236}">
-                <a16:creationId xmlns:a16="http://schemas.microsoft.com/office/drawing/2014/main" xmlns="" id="{0FBA801D-602F-4AEB-88A3-7051DE3311B1}"/>
+                <a16:creationId xmlns="" xmlns:a16="http://schemas.microsoft.com/office/drawing/2014/main" id="{0FBA801D-602F-4AEB-88A3-7051DE3311B1}"/>
               </a:ext>
             </a:extLst>
           </p:cNvPr>
@@ -12506,7 +11210,7 @@
           <p:cNvPr id="2" name="Titel 1">
             <a:extLst>
               <a:ext uri="{FF2B5EF4-FFF2-40B4-BE49-F238E27FC236}">
-                <a16:creationId xmlns:a16="http://schemas.microsoft.com/office/drawing/2014/main" xmlns="" id="{6E8DD669-80F6-42B9-852F-E78CF49DCF4B}"/>
+                <a16:creationId xmlns="" xmlns:a16="http://schemas.microsoft.com/office/drawing/2014/main" id="{6E8DD669-80F6-42B9-852F-E78CF49DCF4B}"/>
               </a:ext>
             </a:extLst>
           </p:cNvPr>
@@ -12534,7 +11238,7 @@
           <p:cNvPr id="3" name="Inhaltsplatzhalter 2">
             <a:extLst>
               <a:ext uri="{FF2B5EF4-FFF2-40B4-BE49-F238E27FC236}">
-                <a16:creationId xmlns:a16="http://schemas.microsoft.com/office/drawing/2014/main" xmlns="" id="{7C55332C-7A20-469B-9BEC-D5B0101FA19F}"/>
+                <a16:creationId xmlns="" xmlns:a16="http://schemas.microsoft.com/office/drawing/2014/main" id="{7C55332C-7A20-469B-9BEC-D5B0101FA19F}"/>
               </a:ext>
             </a:extLst>
           </p:cNvPr>
@@ -12591,7 +11295,7 @@
           <p:cNvPr id="4" name="Datumsplatzhalter 3">
             <a:extLst>
               <a:ext uri="{FF2B5EF4-FFF2-40B4-BE49-F238E27FC236}">
-                <a16:creationId xmlns:a16="http://schemas.microsoft.com/office/drawing/2014/main" xmlns="" id="{15E21441-ABC3-4646-AB44-3FD296C7DC37}"/>
+                <a16:creationId xmlns="" xmlns:a16="http://schemas.microsoft.com/office/drawing/2014/main" id="{15E21441-ABC3-4646-AB44-3FD296C7DC37}"/>
               </a:ext>
             </a:extLst>
           </p:cNvPr>
@@ -12620,7 +11324,7 @@
           <p:cNvPr id="5" name="Fußzeilenplatzhalter 4">
             <a:extLst>
               <a:ext uri="{FF2B5EF4-FFF2-40B4-BE49-F238E27FC236}">
-                <a16:creationId xmlns:a16="http://schemas.microsoft.com/office/drawing/2014/main" xmlns="" id="{CAE46990-78EA-44B3-A2F7-BEFC1ED49E9E}"/>
+                <a16:creationId xmlns="" xmlns:a16="http://schemas.microsoft.com/office/drawing/2014/main" id="{CAE46990-78EA-44B3-A2F7-BEFC1ED49E9E}"/>
               </a:ext>
             </a:extLst>
           </p:cNvPr>
@@ -12645,7 +11349,7 @@
           <p:cNvPr id="6" name="Foliennummernplatzhalter 5">
             <a:extLst>
               <a:ext uri="{FF2B5EF4-FFF2-40B4-BE49-F238E27FC236}">
-                <a16:creationId xmlns:a16="http://schemas.microsoft.com/office/drawing/2014/main" xmlns="" id="{C0EF3B48-16CD-4727-93CA-86A67155D8C6}"/>
+                <a16:creationId xmlns="" xmlns:a16="http://schemas.microsoft.com/office/drawing/2014/main" id="{C0EF3B48-16CD-4727-93CA-86A67155D8C6}"/>
               </a:ext>
             </a:extLst>
           </p:cNvPr>
@@ -12704,7 +11408,7 @@
           <p:cNvPr id="2" name="Titel 1">
             <a:extLst>
               <a:ext uri="{FF2B5EF4-FFF2-40B4-BE49-F238E27FC236}">
-                <a16:creationId xmlns:a16="http://schemas.microsoft.com/office/drawing/2014/main" xmlns="" id="{D2B54FD9-D3CB-4069-9528-3B738EFC849D}"/>
+                <a16:creationId xmlns="" xmlns:a16="http://schemas.microsoft.com/office/drawing/2014/main" id="{D2B54FD9-D3CB-4069-9528-3B738EFC849D}"/>
               </a:ext>
             </a:extLst>
           </p:cNvPr>
@@ -12741,7 +11445,7 @@
           <p:cNvPr id="3" name="Textplatzhalter 2">
             <a:extLst>
               <a:ext uri="{FF2B5EF4-FFF2-40B4-BE49-F238E27FC236}">
-                <a16:creationId xmlns:a16="http://schemas.microsoft.com/office/drawing/2014/main" xmlns="" id="{160E5F36-7F4B-4792-8C1A-EFC93B0E4ADB}"/>
+                <a16:creationId xmlns="" xmlns:a16="http://schemas.microsoft.com/office/drawing/2014/main" id="{160E5F36-7F4B-4792-8C1A-EFC93B0E4ADB}"/>
               </a:ext>
             </a:extLst>
           </p:cNvPr>
@@ -12866,7 +11570,7 @@
           <p:cNvPr id="4" name="Datumsplatzhalter 3">
             <a:extLst>
               <a:ext uri="{FF2B5EF4-FFF2-40B4-BE49-F238E27FC236}">
-                <a16:creationId xmlns:a16="http://schemas.microsoft.com/office/drawing/2014/main" xmlns="" id="{14528A00-E24B-4C25-A7A8-8FBE3BA56346}"/>
+                <a16:creationId xmlns="" xmlns:a16="http://schemas.microsoft.com/office/drawing/2014/main" id="{14528A00-E24B-4C25-A7A8-8FBE3BA56346}"/>
               </a:ext>
             </a:extLst>
           </p:cNvPr>
@@ -12895,7 +11599,7 @@
           <p:cNvPr id="5" name="Fußzeilenplatzhalter 4">
             <a:extLst>
               <a:ext uri="{FF2B5EF4-FFF2-40B4-BE49-F238E27FC236}">
-                <a16:creationId xmlns:a16="http://schemas.microsoft.com/office/drawing/2014/main" xmlns="" id="{65488209-60A8-4D37-B7A7-5B45E3149B2F}"/>
+                <a16:creationId xmlns="" xmlns:a16="http://schemas.microsoft.com/office/drawing/2014/main" id="{65488209-60A8-4D37-B7A7-5B45E3149B2F}"/>
               </a:ext>
             </a:extLst>
           </p:cNvPr>
@@ -12920,7 +11624,7 @@
           <p:cNvPr id="6" name="Foliennummernplatzhalter 5">
             <a:extLst>
               <a:ext uri="{FF2B5EF4-FFF2-40B4-BE49-F238E27FC236}">
-                <a16:creationId xmlns:a16="http://schemas.microsoft.com/office/drawing/2014/main" xmlns="" id="{6904B3C9-E264-42D1-BC48-A1FC5542A0AA}"/>
+                <a16:creationId xmlns="" xmlns:a16="http://schemas.microsoft.com/office/drawing/2014/main" id="{6904B3C9-E264-42D1-BC48-A1FC5542A0AA}"/>
               </a:ext>
             </a:extLst>
           </p:cNvPr>
@@ -12979,7 +11683,7 @@
           <p:cNvPr id="2" name="Titel 1">
             <a:extLst>
               <a:ext uri="{FF2B5EF4-FFF2-40B4-BE49-F238E27FC236}">
-                <a16:creationId xmlns:a16="http://schemas.microsoft.com/office/drawing/2014/main" xmlns="" id="{D73D7613-7D51-47FD-93BA-887418F92EE2}"/>
+                <a16:creationId xmlns="" xmlns:a16="http://schemas.microsoft.com/office/drawing/2014/main" id="{D73D7613-7D51-47FD-93BA-887418F92EE2}"/>
               </a:ext>
             </a:extLst>
           </p:cNvPr>
@@ -13007,7 +11711,7 @@
           <p:cNvPr id="3" name="Inhaltsplatzhalter 2">
             <a:extLst>
               <a:ext uri="{FF2B5EF4-FFF2-40B4-BE49-F238E27FC236}">
-                <a16:creationId xmlns:a16="http://schemas.microsoft.com/office/drawing/2014/main" xmlns="" id="{0F5BBCFD-9F79-4270-A1B9-2FC0142080A9}"/>
+                <a16:creationId xmlns="" xmlns:a16="http://schemas.microsoft.com/office/drawing/2014/main" id="{0F5BBCFD-9F79-4270-A1B9-2FC0142080A9}"/>
               </a:ext>
             </a:extLst>
           </p:cNvPr>
@@ -13069,7 +11773,7 @@
           <p:cNvPr id="4" name="Inhaltsplatzhalter 3">
             <a:extLst>
               <a:ext uri="{FF2B5EF4-FFF2-40B4-BE49-F238E27FC236}">
-                <a16:creationId xmlns:a16="http://schemas.microsoft.com/office/drawing/2014/main" xmlns="" id="{9545DD76-BF76-4E5E-913B-43EEB8F8AEDD}"/>
+                <a16:creationId xmlns="" xmlns:a16="http://schemas.microsoft.com/office/drawing/2014/main" id="{9545DD76-BF76-4E5E-913B-43EEB8F8AEDD}"/>
               </a:ext>
             </a:extLst>
           </p:cNvPr>
@@ -13131,7 +11835,7 @@
           <p:cNvPr id="5" name="Datumsplatzhalter 4">
             <a:extLst>
               <a:ext uri="{FF2B5EF4-FFF2-40B4-BE49-F238E27FC236}">
-                <a16:creationId xmlns:a16="http://schemas.microsoft.com/office/drawing/2014/main" xmlns="" id="{4E7A5240-522C-431D-8AF5-B9B07F6A17DB}"/>
+                <a16:creationId xmlns="" xmlns:a16="http://schemas.microsoft.com/office/drawing/2014/main" id="{4E7A5240-522C-431D-8AF5-B9B07F6A17DB}"/>
               </a:ext>
             </a:extLst>
           </p:cNvPr>
@@ -13160,7 +11864,7 @@
           <p:cNvPr id="6" name="Fußzeilenplatzhalter 5">
             <a:extLst>
               <a:ext uri="{FF2B5EF4-FFF2-40B4-BE49-F238E27FC236}">
-                <a16:creationId xmlns:a16="http://schemas.microsoft.com/office/drawing/2014/main" xmlns="" id="{817E6F8D-CDAB-4259-9396-28905E3DC91D}"/>
+                <a16:creationId xmlns="" xmlns:a16="http://schemas.microsoft.com/office/drawing/2014/main" id="{817E6F8D-CDAB-4259-9396-28905E3DC91D}"/>
               </a:ext>
             </a:extLst>
           </p:cNvPr>
@@ -13185,7 +11889,7 @@
           <p:cNvPr id="7" name="Foliennummernplatzhalter 6">
             <a:extLst>
               <a:ext uri="{FF2B5EF4-FFF2-40B4-BE49-F238E27FC236}">
-                <a16:creationId xmlns:a16="http://schemas.microsoft.com/office/drawing/2014/main" xmlns="" id="{4D7C084E-82BC-4455-A263-485314756579}"/>
+                <a16:creationId xmlns="" xmlns:a16="http://schemas.microsoft.com/office/drawing/2014/main" id="{4D7C084E-82BC-4455-A263-485314756579}"/>
               </a:ext>
             </a:extLst>
           </p:cNvPr>
@@ -13244,7 +11948,7 @@
           <p:cNvPr id="2" name="Titel 1">
             <a:extLst>
               <a:ext uri="{FF2B5EF4-FFF2-40B4-BE49-F238E27FC236}">
-                <a16:creationId xmlns:a16="http://schemas.microsoft.com/office/drawing/2014/main" xmlns="" id="{044FBEA3-8BA8-42F3-BAED-07F40F59CBF4}"/>
+                <a16:creationId xmlns="" xmlns:a16="http://schemas.microsoft.com/office/drawing/2014/main" id="{044FBEA3-8BA8-42F3-BAED-07F40F59CBF4}"/>
               </a:ext>
             </a:extLst>
           </p:cNvPr>
@@ -13277,7 +11981,7 @@
           <p:cNvPr id="3" name="Textplatzhalter 2">
             <a:extLst>
               <a:ext uri="{FF2B5EF4-FFF2-40B4-BE49-F238E27FC236}">
-                <a16:creationId xmlns:a16="http://schemas.microsoft.com/office/drawing/2014/main" xmlns="" id="{243B3D82-E466-44C1-A4ED-F7735E1C22E0}"/>
+                <a16:creationId xmlns="" xmlns:a16="http://schemas.microsoft.com/office/drawing/2014/main" id="{243B3D82-E466-44C1-A4ED-F7735E1C22E0}"/>
               </a:ext>
             </a:extLst>
           </p:cNvPr>
@@ -13348,7 +12052,7 @@
           <p:cNvPr id="4" name="Inhaltsplatzhalter 3">
             <a:extLst>
               <a:ext uri="{FF2B5EF4-FFF2-40B4-BE49-F238E27FC236}">
-                <a16:creationId xmlns:a16="http://schemas.microsoft.com/office/drawing/2014/main" xmlns="" id="{A2D8A684-1973-4CDE-B973-0CF1EFE3CFEE}"/>
+                <a16:creationId xmlns="" xmlns:a16="http://schemas.microsoft.com/office/drawing/2014/main" id="{A2D8A684-1973-4CDE-B973-0CF1EFE3CFEE}"/>
               </a:ext>
             </a:extLst>
           </p:cNvPr>
@@ -13410,7 +12114,7 @@
           <p:cNvPr id="5" name="Textplatzhalter 4">
             <a:extLst>
               <a:ext uri="{FF2B5EF4-FFF2-40B4-BE49-F238E27FC236}">
-                <a16:creationId xmlns:a16="http://schemas.microsoft.com/office/drawing/2014/main" xmlns="" id="{81A7F42B-5B10-4E47-A35C-08C5A3AFE86A}"/>
+                <a16:creationId xmlns="" xmlns:a16="http://schemas.microsoft.com/office/drawing/2014/main" id="{81A7F42B-5B10-4E47-A35C-08C5A3AFE86A}"/>
               </a:ext>
             </a:extLst>
           </p:cNvPr>
@@ -13481,7 +12185,7 @@
           <p:cNvPr id="6" name="Inhaltsplatzhalter 5">
             <a:extLst>
               <a:ext uri="{FF2B5EF4-FFF2-40B4-BE49-F238E27FC236}">
-                <a16:creationId xmlns:a16="http://schemas.microsoft.com/office/drawing/2014/main" xmlns="" id="{B95DBEA4-F8C4-4EEE-8721-2DE78350B322}"/>
+                <a16:creationId xmlns="" xmlns:a16="http://schemas.microsoft.com/office/drawing/2014/main" id="{B95DBEA4-F8C4-4EEE-8721-2DE78350B322}"/>
               </a:ext>
             </a:extLst>
           </p:cNvPr>
@@ -13543,7 +12247,7 @@
           <p:cNvPr id="7" name="Datumsplatzhalter 6">
             <a:extLst>
               <a:ext uri="{FF2B5EF4-FFF2-40B4-BE49-F238E27FC236}">
-                <a16:creationId xmlns:a16="http://schemas.microsoft.com/office/drawing/2014/main" xmlns="" id="{C854B474-D7DB-40A1-B6AA-FA842CAC2CD0}"/>
+                <a16:creationId xmlns="" xmlns:a16="http://schemas.microsoft.com/office/drawing/2014/main" id="{C854B474-D7DB-40A1-B6AA-FA842CAC2CD0}"/>
               </a:ext>
             </a:extLst>
           </p:cNvPr>
@@ -13572,7 +12276,7 @@
           <p:cNvPr id="8" name="Fußzeilenplatzhalter 7">
             <a:extLst>
               <a:ext uri="{FF2B5EF4-FFF2-40B4-BE49-F238E27FC236}">
-                <a16:creationId xmlns:a16="http://schemas.microsoft.com/office/drawing/2014/main" xmlns="" id="{FCFC44DF-A716-4102-926C-80B7DC0C2761}"/>
+                <a16:creationId xmlns="" xmlns:a16="http://schemas.microsoft.com/office/drawing/2014/main" id="{FCFC44DF-A716-4102-926C-80B7DC0C2761}"/>
               </a:ext>
             </a:extLst>
           </p:cNvPr>
@@ -13597,7 +12301,7 @@
           <p:cNvPr id="9" name="Foliennummernplatzhalter 8">
             <a:extLst>
               <a:ext uri="{FF2B5EF4-FFF2-40B4-BE49-F238E27FC236}">
-                <a16:creationId xmlns:a16="http://schemas.microsoft.com/office/drawing/2014/main" xmlns="" id="{BE42A609-2806-4733-9ECA-964457CF43F5}"/>
+                <a16:creationId xmlns="" xmlns:a16="http://schemas.microsoft.com/office/drawing/2014/main" id="{BE42A609-2806-4733-9ECA-964457CF43F5}"/>
               </a:ext>
             </a:extLst>
           </p:cNvPr>
@@ -13656,7 +12360,7 @@
           <p:cNvPr id="2" name="Titel 1">
             <a:extLst>
               <a:ext uri="{FF2B5EF4-FFF2-40B4-BE49-F238E27FC236}">
-                <a16:creationId xmlns:a16="http://schemas.microsoft.com/office/drawing/2014/main" xmlns="" id="{50492774-D3F8-4EF2-BBAC-33D65A4954E6}"/>
+                <a16:creationId xmlns="" xmlns:a16="http://schemas.microsoft.com/office/drawing/2014/main" id="{50492774-D3F8-4EF2-BBAC-33D65A4954E6}"/>
               </a:ext>
             </a:extLst>
           </p:cNvPr>
@@ -13684,7 +12388,7 @@
           <p:cNvPr id="3" name="Datumsplatzhalter 2">
             <a:extLst>
               <a:ext uri="{FF2B5EF4-FFF2-40B4-BE49-F238E27FC236}">
-                <a16:creationId xmlns:a16="http://schemas.microsoft.com/office/drawing/2014/main" xmlns="" id="{A06EFD28-219C-455B-80B0-CC2D55D432D4}"/>
+                <a16:creationId xmlns="" xmlns:a16="http://schemas.microsoft.com/office/drawing/2014/main" id="{A06EFD28-219C-455B-80B0-CC2D55D432D4}"/>
               </a:ext>
             </a:extLst>
           </p:cNvPr>
@@ -13713,7 +12417,7 @@
           <p:cNvPr id="4" name="Fußzeilenplatzhalter 3">
             <a:extLst>
               <a:ext uri="{FF2B5EF4-FFF2-40B4-BE49-F238E27FC236}">
-                <a16:creationId xmlns:a16="http://schemas.microsoft.com/office/drawing/2014/main" xmlns="" id="{F79437AB-4E8B-41ED-89B4-045F187496E5}"/>
+                <a16:creationId xmlns="" xmlns:a16="http://schemas.microsoft.com/office/drawing/2014/main" id="{F79437AB-4E8B-41ED-89B4-045F187496E5}"/>
               </a:ext>
             </a:extLst>
           </p:cNvPr>
@@ -13738,7 +12442,7 @@
           <p:cNvPr id="5" name="Foliennummernplatzhalter 4">
             <a:extLst>
               <a:ext uri="{FF2B5EF4-FFF2-40B4-BE49-F238E27FC236}">
-                <a16:creationId xmlns:a16="http://schemas.microsoft.com/office/drawing/2014/main" xmlns="" id="{30731DC2-6777-47B2-83EF-2F50EE59EF2D}"/>
+                <a16:creationId xmlns="" xmlns:a16="http://schemas.microsoft.com/office/drawing/2014/main" id="{30731DC2-6777-47B2-83EF-2F50EE59EF2D}"/>
               </a:ext>
             </a:extLst>
           </p:cNvPr>
@@ -13797,7 +12501,7 @@
           <p:cNvPr id="2" name="Datumsplatzhalter 1">
             <a:extLst>
               <a:ext uri="{FF2B5EF4-FFF2-40B4-BE49-F238E27FC236}">
-                <a16:creationId xmlns:a16="http://schemas.microsoft.com/office/drawing/2014/main" xmlns="" id="{73E7154D-F0FB-4A64-BABC-F0831888298B}"/>
+                <a16:creationId xmlns="" xmlns:a16="http://schemas.microsoft.com/office/drawing/2014/main" id="{73E7154D-F0FB-4A64-BABC-F0831888298B}"/>
               </a:ext>
             </a:extLst>
           </p:cNvPr>
@@ -13826,7 +12530,7 @@
           <p:cNvPr id="3" name="Fußzeilenplatzhalter 2">
             <a:extLst>
               <a:ext uri="{FF2B5EF4-FFF2-40B4-BE49-F238E27FC236}">
-                <a16:creationId xmlns:a16="http://schemas.microsoft.com/office/drawing/2014/main" xmlns="" id="{F46EEF41-F049-4531-9253-357399B8274B}"/>
+                <a16:creationId xmlns="" xmlns:a16="http://schemas.microsoft.com/office/drawing/2014/main" id="{F46EEF41-F049-4531-9253-357399B8274B}"/>
               </a:ext>
             </a:extLst>
           </p:cNvPr>
@@ -13851,7 +12555,7 @@
           <p:cNvPr id="4" name="Foliennummernplatzhalter 3">
             <a:extLst>
               <a:ext uri="{FF2B5EF4-FFF2-40B4-BE49-F238E27FC236}">
-                <a16:creationId xmlns:a16="http://schemas.microsoft.com/office/drawing/2014/main" xmlns="" id="{91E63CBB-FD4A-4D15-848A-72296229F6AF}"/>
+                <a16:creationId xmlns="" xmlns:a16="http://schemas.microsoft.com/office/drawing/2014/main" id="{91E63CBB-FD4A-4D15-848A-72296229F6AF}"/>
               </a:ext>
             </a:extLst>
           </p:cNvPr>
@@ -13910,7 +12614,7 @@
           <p:cNvPr id="2" name="Titel 1">
             <a:extLst>
               <a:ext uri="{FF2B5EF4-FFF2-40B4-BE49-F238E27FC236}">
-                <a16:creationId xmlns:a16="http://schemas.microsoft.com/office/drawing/2014/main" xmlns="" id="{03A82808-D753-4B6C-B42D-AFC23BF61092}"/>
+                <a16:creationId xmlns="" xmlns:a16="http://schemas.microsoft.com/office/drawing/2014/main" id="{03A82808-D753-4B6C-B42D-AFC23BF61092}"/>
               </a:ext>
             </a:extLst>
           </p:cNvPr>
@@ -13947,7 +12651,7 @@
           <p:cNvPr id="3" name="Inhaltsplatzhalter 2">
             <a:extLst>
               <a:ext uri="{FF2B5EF4-FFF2-40B4-BE49-F238E27FC236}">
-                <a16:creationId xmlns:a16="http://schemas.microsoft.com/office/drawing/2014/main" xmlns="" id="{E9887AD5-17CF-48BA-A433-7FB5A92ED4F9}"/>
+                <a16:creationId xmlns="" xmlns:a16="http://schemas.microsoft.com/office/drawing/2014/main" id="{E9887AD5-17CF-48BA-A433-7FB5A92ED4F9}"/>
               </a:ext>
             </a:extLst>
           </p:cNvPr>
@@ -14037,7 +12741,7 @@
           <p:cNvPr id="4" name="Textplatzhalter 3">
             <a:extLst>
               <a:ext uri="{FF2B5EF4-FFF2-40B4-BE49-F238E27FC236}">
-                <a16:creationId xmlns:a16="http://schemas.microsoft.com/office/drawing/2014/main" xmlns="" id="{0B322C5C-EB4D-4112-B0B6-50490B09B5EC}"/>
+                <a16:creationId xmlns="" xmlns:a16="http://schemas.microsoft.com/office/drawing/2014/main" id="{0B322C5C-EB4D-4112-B0B6-50490B09B5EC}"/>
               </a:ext>
             </a:extLst>
           </p:cNvPr>
@@ -14108,7 +12812,7 @@
           <p:cNvPr id="5" name="Datumsplatzhalter 4">
             <a:extLst>
               <a:ext uri="{FF2B5EF4-FFF2-40B4-BE49-F238E27FC236}">
-                <a16:creationId xmlns:a16="http://schemas.microsoft.com/office/drawing/2014/main" xmlns="" id="{C1D652FD-7225-4737-AE33-A8CD3F776205}"/>
+                <a16:creationId xmlns="" xmlns:a16="http://schemas.microsoft.com/office/drawing/2014/main" id="{C1D652FD-7225-4737-AE33-A8CD3F776205}"/>
               </a:ext>
             </a:extLst>
           </p:cNvPr>
@@ -14137,7 +12841,7 @@
           <p:cNvPr id="6" name="Fußzeilenplatzhalter 5">
             <a:extLst>
               <a:ext uri="{FF2B5EF4-FFF2-40B4-BE49-F238E27FC236}">
-                <a16:creationId xmlns:a16="http://schemas.microsoft.com/office/drawing/2014/main" xmlns="" id="{E696A282-C156-47AB-A6AC-C6833CD45756}"/>
+                <a16:creationId xmlns="" xmlns:a16="http://schemas.microsoft.com/office/drawing/2014/main" id="{E696A282-C156-47AB-A6AC-C6833CD45756}"/>
               </a:ext>
             </a:extLst>
           </p:cNvPr>
@@ -14162,7 +12866,7 @@
           <p:cNvPr id="7" name="Foliennummernplatzhalter 6">
             <a:extLst>
               <a:ext uri="{FF2B5EF4-FFF2-40B4-BE49-F238E27FC236}">
-                <a16:creationId xmlns:a16="http://schemas.microsoft.com/office/drawing/2014/main" xmlns="" id="{9EFC4400-AC2C-4BB7-9C8F-6A855B086474}"/>
+                <a16:creationId xmlns="" xmlns:a16="http://schemas.microsoft.com/office/drawing/2014/main" id="{9EFC4400-AC2C-4BB7-9C8F-6A855B086474}"/>
               </a:ext>
             </a:extLst>
           </p:cNvPr>
@@ -14221,7 +12925,7 @@
           <p:cNvPr id="2" name="Titel 1">
             <a:extLst>
               <a:ext uri="{FF2B5EF4-FFF2-40B4-BE49-F238E27FC236}">
-                <a16:creationId xmlns:a16="http://schemas.microsoft.com/office/drawing/2014/main" xmlns="" id="{DB8D5C42-DA9E-4587-AE67-E8B8EC98608F}"/>
+                <a16:creationId xmlns="" xmlns:a16="http://schemas.microsoft.com/office/drawing/2014/main" id="{DB8D5C42-DA9E-4587-AE67-E8B8EC98608F}"/>
               </a:ext>
             </a:extLst>
           </p:cNvPr>
@@ -14258,7 +12962,7 @@
           <p:cNvPr id="3" name="Bildplatzhalter 2">
             <a:extLst>
               <a:ext uri="{FF2B5EF4-FFF2-40B4-BE49-F238E27FC236}">
-                <a16:creationId xmlns:a16="http://schemas.microsoft.com/office/drawing/2014/main" xmlns="" id="{1A64A225-42B6-4624-A211-ACE89C1E850E}"/>
+                <a16:creationId xmlns="" xmlns:a16="http://schemas.microsoft.com/office/drawing/2014/main" id="{1A64A225-42B6-4624-A211-ACE89C1E850E}"/>
               </a:ext>
             </a:extLst>
           </p:cNvPr>
@@ -14325,7 +13029,7 @@
           <p:cNvPr id="4" name="Textplatzhalter 3">
             <a:extLst>
               <a:ext uri="{FF2B5EF4-FFF2-40B4-BE49-F238E27FC236}">
-                <a16:creationId xmlns:a16="http://schemas.microsoft.com/office/drawing/2014/main" xmlns="" id="{88065C5E-8323-444B-863B-E0B70B8DD839}"/>
+                <a16:creationId xmlns="" xmlns:a16="http://schemas.microsoft.com/office/drawing/2014/main" id="{88065C5E-8323-444B-863B-E0B70B8DD839}"/>
               </a:ext>
             </a:extLst>
           </p:cNvPr>
@@ -14396,7 +13100,7 @@
           <p:cNvPr id="5" name="Datumsplatzhalter 4">
             <a:extLst>
               <a:ext uri="{FF2B5EF4-FFF2-40B4-BE49-F238E27FC236}">
-                <a16:creationId xmlns:a16="http://schemas.microsoft.com/office/drawing/2014/main" xmlns="" id="{5201BD16-04ED-4E75-A4C7-92CF42FE7A8E}"/>
+                <a16:creationId xmlns="" xmlns:a16="http://schemas.microsoft.com/office/drawing/2014/main" id="{5201BD16-04ED-4E75-A4C7-92CF42FE7A8E}"/>
               </a:ext>
             </a:extLst>
           </p:cNvPr>
@@ -14425,7 +13129,7 @@
           <p:cNvPr id="6" name="Fußzeilenplatzhalter 5">
             <a:extLst>
               <a:ext uri="{FF2B5EF4-FFF2-40B4-BE49-F238E27FC236}">
-                <a16:creationId xmlns:a16="http://schemas.microsoft.com/office/drawing/2014/main" xmlns="" id="{74CC25C4-2D5B-42CD-8BEA-7FA169497EBE}"/>
+                <a16:creationId xmlns="" xmlns:a16="http://schemas.microsoft.com/office/drawing/2014/main" id="{74CC25C4-2D5B-42CD-8BEA-7FA169497EBE}"/>
               </a:ext>
             </a:extLst>
           </p:cNvPr>
@@ -14450,7 +13154,7 @@
           <p:cNvPr id="7" name="Foliennummernplatzhalter 6">
             <a:extLst>
               <a:ext uri="{FF2B5EF4-FFF2-40B4-BE49-F238E27FC236}">
-                <a16:creationId xmlns:a16="http://schemas.microsoft.com/office/drawing/2014/main" xmlns="" id="{70930502-B167-4698-9594-D1080B7539BC}"/>
+                <a16:creationId xmlns="" xmlns:a16="http://schemas.microsoft.com/office/drawing/2014/main" id="{70930502-B167-4698-9594-D1080B7539BC}"/>
               </a:ext>
             </a:extLst>
           </p:cNvPr>
@@ -14514,7 +13218,7 @@
           <p:cNvPr id="2" name="Titelplatzhalter 1">
             <a:extLst>
               <a:ext uri="{FF2B5EF4-FFF2-40B4-BE49-F238E27FC236}">
-                <a16:creationId xmlns:a16="http://schemas.microsoft.com/office/drawing/2014/main" xmlns="" id="{8E6C0C76-839C-4266-9067-37CDFF3A9D75}"/>
+                <a16:creationId xmlns="" xmlns:a16="http://schemas.microsoft.com/office/drawing/2014/main" id="{8E6C0C76-839C-4266-9067-37CDFF3A9D75}"/>
               </a:ext>
             </a:extLst>
           </p:cNvPr>
@@ -14552,7 +13256,7 @@
           <p:cNvPr id="3" name="Textplatzhalter 2">
             <a:extLst>
               <a:ext uri="{FF2B5EF4-FFF2-40B4-BE49-F238E27FC236}">
-                <a16:creationId xmlns:a16="http://schemas.microsoft.com/office/drawing/2014/main" xmlns="" id="{583945DB-94FF-478C-9FEE-AE8F7B42D6B5}"/>
+                <a16:creationId xmlns="" xmlns:a16="http://schemas.microsoft.com/office/drawing/2014/main" id="{583945DB-94FF-478C-9FEE-AE8F7B42D6B5}"/>
               </a:ext>
             </a:extLst>
           </p:cNvPr>
@@ -14619,7 +13323,7 @@
           <p:cNvPr id="4" name="Datumsplatzhalter 3">
             <a:extLst>
               <a:ext uri="{FF2B5EF4-FFF2-40B4-BE49-F238E27FC236}">
-                <a16:creationId xmlns:a16="http://schemas.microsoft.com/office/drawing/2014/main" xmlns="" id="{C351A553-E5BE-42DC-BC3A-47F63D606757}"/>
+                <a16:creationId xmlns="" xmlns:a16="http://schemas.microsoft.com/office/drawing/2014/main" id="{C351A553-E5BE-42DC-BC3A-47F63D606757}"/>
               </a:ext>
             </a:extLst>
           </p:cNvPr>
@@ -14666,7 +13370,7 @@
           <p:cNvPr id="5" name="Fußzeilenplatzhalter 4">
             <a:extLst>
               <a:ext uri="{FF2B5EF4-FFF2-40B4-BE49-F238E27FC236}">
-                <a16:creationId xmlns:a16="http://schemas.microsoft.com/office/drawing/2014/main" xmlns="" id="{AE609C72-4BB4-48FA-815B-D3CB5FA9FAB0}"/>
+                <a16:creationId xmlns="" xmlns:a16="http://schemas.microsoft.com/office/drawing/2014/main" id="{AE609C72-4BB4-48FA-815B-D3CB5FA9FAB0}"/>
               </a:ext>
             </a:extLst>
           </p:cNvPr>
@@ -14709,7 +13413,7 @@
           <p:cNvPr id="6" name="Foliennummernplatzhalter 5">
             <a:extLst>
               <a:ext uri="{FF2B5EF4-FFF2-40B4-BE49-F238E27FC236}">
-                <a16:creationId xmlns:a16="http://schemas.microsoft.com/office/drawing/2014/main" xmlns="" id="{EF857986-AF0C-4699-BC9B-2B60D00FA79F}"/>
+                <a16:creationId xmlns="" xmlns:a16="http://schemas.microsoft.com/office/drawing/2014/main" id="{EF857986-AF0C-4699-BC9B-2B60D00FA79F}"/>
               </a:ext>
             </a:extLst>
           </p:cNvPr>
@@ -15088,10 +13792,10 @@
           <p:cNvPr id="40" name="Freeform: Shape 39">
             <a:extLst>
               <a:ext uri="{FF2B5EF4-FFF2-40B4-BE49-F238E27FC236}">
-                <a16:creationId xmlns:a16="http://schemas.microsoft.com/office/drawing/2014/main" xmlns="" id="{92AA2300-0FA6-4328-9BD8-1D67925C0BD6}"/>
+                <a16:creationId xmlns="" xmlns:a16="http://schemas.microsoft.com/office/drawing/2014/main" id="{92AA2300-0FA6-4328-9BD8-1D67925C0BD6}"/>
               </a:ext>
               <a:ext uri="{C183D7F6-B498-43B3-948B-1728B52AA6E4}">
-                <adec:decorative xmlns:adec="http://schemas.microsoft.com/office/drawing/2017/decorative" xmlns="" val="1"/>
+                <adec:decorative xmlns="" xmlns:adec="http://schemas.microsoft.com/office/drawing/2017/decorative" val="1"/>
               </a:ext>
             </a:extLst>
           </p:cNvPr>
@@ -15101,7 +13805,7 @@
           <p:nvPr>
             <p:extLst>
               <p:ext uri="{386F3935-93C4-4BCD-93E2-E3B085C9AB24}">
-                <p16:designElem xmlns:p16="http://schemas.microsoft.com/office/powerpoint/2015/main" xmlns="" val="1"/>
+                <p16:designElem xmlns="" xmlns:p16="http://schemas.microsoft.com/office/powerpoint/2015/main" val="1"/>
               </p:ext>
             </p:extLst>
           </p:nvPr>
@@ -15259,10 +13963,10 @@
           <p:cNvPr id="42" name="Freeform: Shape 41">
             <a:extLst>
               <a:ext uri="{FF2B5EF4-FFF2-40B4-BE49-F238E27FC236}">
-                <a16:creationId xmlns:a16="http://schemas.microsoft.com/office/drawing/2014/main" xmlns="" id="{D3E1FE85-D0BF-41D3-8B85-04776368E1F0}"/>
+                <a16:creationId xmlns="" xmlns:a16="http://schemas.microsoft.com/office/drawing/2014/main" id="{D3E1FE85-D0BF-41D3-8B85-04776368E1F0}"/>
               </a:ext>
               <a:ext uri="{C183D7F6-B498-43B3-948B-1728B52AA6E4}">
-                <adec:decorative xmlns:adec="http://schemas.microsoft.com/office/drawing/2017/decorative" xmlns="" val="1"/>
+                <adec:decorative xmlns="" xmlns:adec="http://schemas.microsoft.com/office/drawing/2017/decorative" val="1"/>
               </a:ext>
             </a:extLst>
           </p:cNvPr>
@@ -15272,7 +13976,7 @@
           <p:nvPr>
             <p:extLst>
               <p:ext uri="{386F3935-93C4-4BCD-93E2-E3B085C9AB24}">
-                <p16:designElem xmlns:p16="http://schemas.microsoft.com/office/powerpoint/2015/main" xmlns="" val="1"/>
+                <p16:designElem xmlns="" xmlns:p16="http://schemas.microsoft.com/office/powerpoint/2015/main" val="1"/>
               </p:ext>
             </p:extLst>
           </p:nvPr>
@@ -15426,10 +14130,10 @@
           <p:cNvPr id="71" name="Freeform: Shape 43">
             <a:extLst>
               <a:ext uri="{FF2B5EF4-FFF2-40B4-BE49-F238E27FC236}">
-                <a16:creationId xmlns:a16="http://schemas.microsoft.com/office/drawing/2014/main" xmlns="" id="{F2E5A8E1-2A22-48D0-9556-E21648FA1EAC}"/>
+                <a16:creationId xmlns="" xmlns:a16="http://schemas.microsoft.com/office/drawing/2014/main" id="{F2E5A8E1-2A22-48D0-9556-E21648FA1EAC}"/>
               </a:ext>
               <a:ext uri="{C183D7F6-B498-43B3-948B-1728B52AA6E4}">
-                <adec:decorative xmlns:adec="http://schemas.microsoft.com/office/drawing/2017/decorative" xmlns="" val="1"/>
+                <adec:decorative xmlns="" xmlns:adec="http://schemas.microsoft.com/office/drawing/2017/decorative" val="1"/>
               </a:ext>
             </a:extLst>
           </p:cNvPr>
@@ -15439,7 +14143,7 @@
           <p:nvPr>
             <p:extLst>
               <p:ext uri="{386F3935-93C4-4BCD-93E2-E3B085C9AB24}">
-                <p16:designElem xmlns:p16="http://schemas.microsoft.com/office/powerpoint/2015/main" xmlns="" val="1"/>
+                <p16:designElem xmlns="" xmlns:p16="http://schemas.microsoft.com/office/powerpoint/2015/main" val="1"/>
               </p:ext>
             </p:extLst>
           </p:nvPr>
@@ -15605,10 +14309,10 @@
           <p:cNvPr id="46" name="Freeform: Shape 45">
             <a:extLst>
               <a:ext uri="{FF2B5EF4-FFF2-40B4-BE49-F238E27FC236}">
-                <a16:creationId xmlns:a16="http://schemas.microsoft.com/office/drawing/2014/main" xmlns="" id="{1072B470-1E76-42B5-86EA-1FB0F881D7EF}"/>
+                <a16:creationId xmlns="" xmlns:a16="http://schemas.microsoft.com/office/drawing/2014/main" id="{1072B470-1E76-42B5-86EA-1FB0F881D7EF}"/>
               </a:ext>
               <a:ext uri="{C183D7F6-B498-43B3-948B-1728B52AA6E4}">
-                <adec:decorative xmlns:adec="http://schemas.microsoft.com/office/drawing/2017/decorative" xmlns="" val="1"/>
+                <adec:decorative xmlns="" xmlns:adec="http://schemas.microsoft.com/office/drawing/2017/decorative" val="1"/>
               </a:ext>
             </a:extLst>
           </p:cNvPr>
@@ -15618,7 +14322,7 @@
           <p:nvPr>
             <p:extLst>
               <p:ext uri="{386F3935-93C4-4BCD-93E2-E3B085C9AB24}">
-                <p16:designElem xmlns:p16="http://schemas.microsoft.com/office/powerpoint/2015/main" xmlns="" val="1"/>
+                <p16:designElem xmlns="" xmlns:p16="http://schemas.microsoft.com/office/powerpoint/2015/main" val="1"/>
               </p:ext>
             </p:extLst>
           </p:nvPr>
@@ -15774,10 +14478,10 @@
           <p:cNvPr id="48" name="Freeform: Shape 47">
             <a:extLst>
               <a:ext uri="{FF2B5EF4-FFF2-40B4-BE49-F238E27FC236}">
-                <a16:creationId xmlns:a16="http://schemas.microsoft.com/office/drawing/2014/main" xmlns="" id="{DDD8B025-3845-4DEF-98B6-7C0BF531DB78}"/>
+                <a16:creationId xmlns="" xmlns:a16="http://schemas.microsoft.com/office/drawing/2014/main" id="{DDD8B025-3845-4DEF-98B6-7C0BF531DB78}"/>
               </a:ext>
               <a:ext uri="{C183D7F6-B498-43B3-948B-1728B52AA6E4}">
-                <adec:decorative xmlns:adec="http://schemas.microsoft.com/office/drawing/2017/decorative" xmlns="" val="1"/>
+                <adec:decorative xmlns="" xmlns:adec="http://schemas.microsoft.com/office/drawing/2017/decorative" val="1"/>
               </a:ext>
             </a:extLst>
           </p:cNvPr>
@@ -15787,7 +14491,7 @@
           <p:nvPr>
             <p:extLst>
               <p:ext uri="{386F3935-93C4-4BCD-93E2-E3B085C9AB24}">
-                <p16:designElem xmlns:p16="http://schemas.microsoft.com/office/powerpoint/2015/main" xmlns="" val="1"/>
+                <p16:designElem xmlns="" xmlns:p16="http://schemas.microsoft.com/office/powerpoint/2015/main" val="1"/>
               </p:ext>
             </p:extLst>
           </p:nvPr>
@@ -15951,10 +14655,10 @@
           <p:cNvPr id="50" name="Freeform: Shape 49">
             <a:extLst>
               <a:ext uri="{FF2B5EF4-FFF2-40B4-BE49-F238E27FC236}">
-                <a16:creationId xmlns:a16="http://schemas.microsoft.com/office/drawing/2014/main" xmlns="" id="{C4051FED-CF0D-4DDD-A9BB-E58FEEFE7C46}"/>
+                <a16:creationId xmlns="" xmlns:a16="http://schemas.microsoft.com/office/drawing/2014/main" id="{C4051FED-CF0D-4DDD-A9BB-E58FEEFE7C46}"/>
               </a:ext>
               <a:ext uri="{C183D7F6-B498-43B3-948B-1728B52AA6E4}">
-                <adec:decorative xmlns:adec="http://schemas.microsoft.com/office/drawing/2017/decorative" xmlns="" val="1"/>
+                <adec:decorative xmlns="" xmlns:adec="http://schemas.microsoft.com/office/drawing/2017/decorative" val="1"/>
               </a:ext>
             </a:extLst>
           </p:cNvPr>
@@ -15964,7 +14668,7 @@
           <p:nvPr>
             <p:extLst>
               <p:ext uri="{386F3935-93C4-4BCD-93E2-E3B085C9AB24}">
-                <p16:designElem xmlns:p16="http://schemas.microsoft.com/office/powerpoint/2015/main" xmlns="" val="1"/>
+                <p16:designElem xmlns="" xmlns:p16="http://schemas.microsoft.com/office/powerpoint/2015/main" val="1"/>
               </p:ext>
             </p:extLst>
           </p:nvPr>
@@ -16118,7 +14822,7 @@
           <p:cNvPr id="34" name="Grafik 33">
             <a:extLst>
               <a:ext uri="{FF2B5EF4-FFF2-40B4-BE49-F238E27FC236}">
-                <a16:creationId xmlns:a16="http://schemas.microsoft.com/office/drawing/2014/main" xmlns="" id="{C4B2D1B6-9CC9-4D39-9877-4068CF726A6D}"/>
+                <a16:creationId xmlns="" xmlns:a16="http://schemas.microsoft.com/office/drawing/2014/main" id="{C4B2D1B6-9CC9-4D39-9877-4068CF726A6D}"/>
               </a:ext>
             </a:extLst>
           </p:cNvPr>
@@ -16154,7 +14858,7 @@
           <p:cNvPr id="7" name="Grafik 6">
             <a:extLst>
               <a:ext uri="{FF2B5EF4-FFF2-40B4-BE49-F238E27FC236}">
-                <a16:creationId xmlns:a16="http://schemas.microsoft.com/office/drawing/2014/main" xmlns="" id="{20A64369-5BE0-40C8-B9CB-5E6B39AA2511}"/>
+                <a16:creationId xmlns="" xmlns:a16="http://schemas.microsoft.com/office/drawing/2014/main" id="{20A64369-5BE0-40C8-B9CB-5E6B39AA2511}"/>
               </a:ext>
             </a:extLst>
           </p:cNvPr>
@@ -16190,7 +14894,7 @@
           <p:cNvPr id="9" name="Grafik 8">
             <a:extLst>
               <a:ext uri="{FF2B5EF4-FFF2-40B4-BE49-F238E27FC236}">
-                <a16:creationId xmlns:a16="http://schemas.microsoft.com/office/drawing/2014/main" xmlns="" id="{7A44D108-3F84-4CB9-8043-9E1F67833057}"/>
+                <a16:creationId xmlns="" xmlns:a16="http://schemas.microsoft.com/office/drawing/2014/main" id="{7A44D108-3F84-4CB9-8043-9E1F67833057}"/>
               </a:ext>
             </a:extLst>
           </p:cNvPr>
@@ -16206,7 +14910,7 @@
                 <a14:useLocalDpi xmlns:a14="http://schemas.microsoft.com/office/drawing/2010/main" val="0"/>
               </a:ext>
               <a:ext uri="{96DAC541-7B7A-43D3-8B79-37D633B846F1}">
-                <asvg:svgBlip xmlns:asvg="http://schemas.microsoft.com/office/drawing/2016/SVG/main" xmlns="" r:embed="rId5"/>
+                <asvg:svgBlip xmlns="" xmlns:asvg="http://schemas.microsoft.com/office/drawing/2016/SVG/main" r:embed="rId5"/>
               </a:ext>
             </a:extLst>
           </a:blip>
@@ -16229,7 +14933,7 @@
           <p:cNvPr id="2" name="Titel 1">
             <a:extLst>
               <a:ext uri="{FF2B5EF4-FFF2-40B4-BE49-F238E27FC236}">
-                <a16:creationId xmlns:a16="http://schemas.microsoft.com/office/drawing/2014/main" xmlns="" id="{7B47AFD9-8E90-4C61-9AB3-7FC588346B9D}"/>
+                <a16:creationId xmlns="" xmlns:a16="http://schemas.microsoft.com/office/drawing/2014/main" id="{7B47AFD9-8E90-4C61-9AB3-7FC588346B9D}"/>
               </a:ext>
             </a:extLst>
           </p:cNvPr>
@@ -16266,7 +14970,7 @@
           <p:cNvPr id="3" name="Untertitel 2">
             <a:extLst>
               <a:ext uri="{FF2B5EF4-FFF2-40B4-BE49-F238E27FC236}">
-                <a16:creationId xmlns:a16="http://schemas.microsoft.com/office/drawing/2014/main" xmlns="" id="{2BFFC9BF-292C-4541-88FD-73573910C544}"/>
+                <a16:creationId xmlns="" xmlns:a16="http://schemas.microsoft.com/office/drawing/2014/main" id="{2BFFC9BF-292C-4541-88FD-73573910C544}"/>
               </a:ext>
             </a:extLst>
           </p:cNvPr>
@@ -16354,10 +15058,10 @@
           <p:cNvPr id="121" name="Freeform: Shape 120">
             <a:extLst>
               <a:ext uri="{FF2B5EF4-FFF2-40B4-BE49-F238E27FC236}">
-                <a16:creationId xmlns:a16="http://schemas.microsoft.com/office/drawing/2014/main" xmlns="" id="{0C526D66-3621-4347-B1EF-342CBF4DB9C1}"/>
+                <a16:creationId xmlns="" xmlns:a16="http://schemas.microsoft.com/office/drawing/2014/main" id="{0C526D66-3621-4347-B1EF-342CBF4DB9C1}"/>
               </a:ext>
               <a:ext uri="{C183D7F6-B498-43B3-948B-1728B52AA6E4}">
-                <adec:decorative xmlns:adec="http://schemas.microsoft.com/office/drawing/2017/decorative" xmlns="" val="1"/>
+                <adec:decorative xmlns="" xmlns:adec="http://schemas.microsoft.com/office/drawing/2017/decorative" val="1"/>
               </a:ext>
             </a:extLst>
           </p:cNvPr>
@@ -16367,7 +15071,7 @@
           <p:nvPr>
             <p:extLst>
               <p:ext uri="{386F3935-93C4-4BCD-93E2-E3B085C9AB24}">
-                <p16:designElem xmlns:p16="http://schemas.microsoft.com/office/powerpoint/2015/main" xmlns="" val="1"/>
+                <p16:designElem xmlns="" xmlns:p16="http://schemas.microsoft.com/office/powerpoint/2015/main" val="1"/>
               </p:ext>
             </p:extLst>
           </p:nvPr>
@@ -16557,10 +15261,10 @@
           <p:cNvPr id="123" name="Freeform: Shape 122">
             <a:extLst>
               <a:ext uri="{FF2B5EF4-FFF2-40B4-BE49-F238E27FC236}">
-                <a16:creationId xmlns:a16="http://schemas.microsoft.com/office/drawing/2014/main" xmlns="" id="{8A177BCC-4208-4795-8572-4D623BA1E2A0}"/>
+                <a16:creationId xmlns="" xmlns:a16="http://schemas.microsoft.com/office/drawing/2014/main" id="{8A177BCC-4208-4795-8572-4D623BA1E2A0}"/>
               </a:ext>
               <a:ext uri="{C183D7F6-B498-43B3-948B-1728B52AA6E4}">
-                <adec:decorative xmlns:adec="http://schemas.microsoft.com/office/drawing/2017/decorative" xmlns="" val="1"/>
+                <adec:decorative xmlns="" xmlns:adec="http://schemas.microsoft.com/office/drawing/2017/decorative" val="1"/>
               </a:ext>
             </a:extLst>
           </p:cNvPr>
@@ -16570,7 +15274,7 @@
           <p:nvPr>
             <p:extLst>
               <p:ext uri="{386F3935-93C4-4BCD-93E2-E3B085C9AB24}">
-                <p16:designElem xmlns:p16="http://schemas.microsoft.com/office/powerpoint/2015/main" xmlns="" val="1"/>
+                <p16:designElem xmlns="" xmlns:p16="http://schemas.microsoft.com/office/powerpoint/2015/main" val="1"/>
               </p:ext>
             </p:extLst>
           </p:nvPr>
@@ -16726,10 +15430,10 @@
           <p:cNvPr id="125" name="Freeform: Shape 124">
             <a:extLst>
               <a:ext uri="{FF2B5EF4-FFF2-40B4-BE49-F238E27FC236}">
-                <a16:creationId xmlns:a16="http://schemas.microsoft.com/office/drawing/2014/main" xmlns="" id="{0193166D-DDF1-4F9A-A786-A7AEF5375C06}"/>
+                <a16:creationId xmlns="" xmlns:a16="http://schemas.microsoft.com/office/drawing/2014/main" id="{0193166D-DDF1-4F9A-A786-A7AEF5375C06}"/>
               </a:ext>
               <a:ext uri="{C183D7F6-B498-43B3-948B-1728B52AA6E4}">
-                <adec:decorative xmlns:adec="http://schemas.microsoft.com/office/drawing/2017/decorative" xmlns="" val="1"/>
+                <adec:decorative xmlns="" xmlns:adec="http://schemas.microsoft.com/office/drawing/2017/decorative" val="1"/>
               </a:ext>
             </a:extLst>
           </p:cNvPr>
@@ -16739,7 +15443,7 @@
           <p:nvPr>
             <p:extLst>
               <p:ext uri="{386F3935-93C4-4BCD-93E2-E3B085C9AB24}">
-                <p16:designElem xmlns:p16="http://schemas.microsoft.com/office/powerpoint/2015/main" xmlns="" val="1"/>
+                <p16:designElem xmlns="" xmlns:p16="http://schemas.microsoft.com/office/powerpoint/2015/main" val="1"/>
               </p:ext>
             </p:extLst>
           </p:nvPr>
@@ -16927,10 +15631,10 @@
           <p:cNvPr id="127" name="Freeform: Shape 126">
             <a:extLst>
               <a:ext uri="{FF2B5EF4-FFF2-40B4-BE49-F238E27FC236}">
-                <a16:creationId xmlns:a16="http://schemas.microsoft.com/office/drawing/2014/main" xmlns="" id="{E4EE7214-AC05-465E-A501-65AA04EF5E1A}"/>
+                <a16:creationId xmlns="" xmlns:a16="http://schemas.microsoft.com/office/drawing/2014/main" id="{E4EE7214-AC05-465E-A501-65AA04EF5E1A}"/>
               </a:ext>
               <a:ext uri="{C183D7F6-B498-43B3-948B-1728B52AA6E4}">
-                <adec:decorative xmlns:adec="http://schemas.microsoft.com/office/drawing/2017/decorative" xmlns="" val="1"/>
+                <adec:decorative xmlns="" xmlns:adec="http://schemas.microsoft.com/office/drawing/2017/decorative" val="1"/>
               </a:ext>
             </a:extLst>
           </p:cNvPr>
@@ -16940,7 +15644,7 @@
           <p:nvPr>
             <p:extLst>
               <p:ext uri="{386F3935-93C4-4BCD-93E2-E3B085C9AB24}">
-                <p16:designElem xmlns:p16="http://schemas.microsoft.com/office/powerpoint/2015/main" xmlns="" val="1"/>
+                <p16:designElem xmlns="" xmlns:p16="http://schemas.microsoft.com/office/powerpoint/2015/main" val="1"/>
               </p:ext>
             </p:extLst>
           </p:nvPr>
@@ -17094,7 +15798,7 @@
           <p:cNvPr id="4" name="Grafik 3">
             <a:extLst>
               <a:ext uri="{FF2B5EF4-FFF2-40B4-BE49-F238E27FC236}">
-                <a16:creationId xmlns:a16="http://schemas.microsoft.com/office/drawing/2014/main" xmlns="" id="{7830B805-B3AA-4E8D-BB14-56F2C91F4433}"/>
+                <a16:creationId xmlns="" xmlns:a16="http://schemas.microsoft.com/office/drawing/2014/main" id="{7830B805-B3AA-4E8D-BB14-56F2C91F4433}"/>
               </a:ext>
             </a:extLst>
           </p:cNvPr>
@@ -17110,7 +15814,7 @@
                 <a14:useLocalDpi xmlns:a14="http://schemas.microsoft.com/office/drawing/2010/main" val="0"/>
               </a:ext>
               <a:ext uri="{96DAC541-7B7A-43D3-8B79-37D633B846F1}">
-                <asvg:svgBlip xmlns:asvg="http://schemas.microsoft.com/office/drawing/2016/SVG/main" xmlns="" r:embed="rId4"/>
+                <asvg:svgBlip xmlns="" xmlns:asvg="http://schemas.microsoft.com/office/drawing/2016/SVG/main" r:embed="rId4"/>
               </a:ext>
             </a:extLst>
           </a:blip>
@@ -17133,7 +15837,7 @@
           <p:cNvPr id="11" name="Grafik 10">
             <a:extLst>
               <a:ext uri="{FF2B5EF4-FFF2-40B4-BE49-F238E27FC236}">
-                <a16:creationId xmlns:a16="http://schemas.microsoft.com/office/drawing/2014/main" xmlns="" id="{7686D367-D5D2-426B-A0B0-E5A7C8ECC2D9}"/>
+                <a16:creationId xmlns="" xmlns:a16="http://schemas.microsoft.com/office/drawing/2014/main" id="{7686D367-D5D2-426B-A0B0-E5A7C8ECC2D9}"/>
               </a:ext>
             </a:extLst>
           </p:cNvPr>
@@ -17169,7 +15873,7 @@
           <p:cNvPr id="111" name="Inhaltsplatzhalter 2">
             <a:extLst>
               <a:ext uri="{FF2B5EF4-FFF2-40B4-BE49-F238E27FC236}">
-                <a16:creationId xmlns:a16="http://schemas.microsoft.com/office/drawing/2014/main" xmlns="" id="{DFED6985-E05C-5442-8D81-240D91D1C65A}"/>
+                <a16:creationId xmlns="" xmlns:a16="http://schemas.microsoft.com/office/drawing/2014/main" id="{DFED6985-E05C-5442-8D81-240D91D1C65A}"/>
               </a:ext>
             </a:extLst>
           </p:cNvPr>
@@ -17372,7 +16076,7 @@
           <p:cNvPr id="8" name="Grafik 7">
             <a:extLst>
               <a:ext uri="{FF2B5EF4-FFF2-40B4-BE49-F238E27FC236}">
-                <a16:creationId xmlns:a16="http://schemas.microsoft.com/office/drawing/2014/main" xmlns="" id="{DFA0BA83-B92C-462D-8C67-FAE88DDFE559}"/>
+                <a16:creationId xmlns="" xmlns:a16="http://schemas.microsoft.com/office/drawing/2014/main" id="{DFA0BA83-B92C-462D-8C67-FAE88DDFE559}"/>
               </a:ext>
             </a:extLst>
           </p:cNvPr>
@@ -17408,7 +16112,7 @@
           <p:cNvPr id="6" name="Titel 5">
             <a:extLst>
               <a:ext uri="{FF2B5EF4-FFF2-40B4-BE49-F238E27FC236}">
-                <a16:creationId xmlns:a16="http://schemas.microsoft.com/office/drawing/2014/main" xmlns="" id="{97D4CC26-A6D9-44D5-BE51-0167991D4E18}"/>
+                <a16:creationId xmlns="" xmlns:a16="http://schemas.microsoft.com/office/drawing/2014/main" id="{97D4CC26-A6D9-44D5-BE51-0167991D4E18}"/>
               </a:ext>
             </a:extLst>
           </p:cNvPr>
@@ -17503,10 +16207,10 @@
           <p:cNvPr id="24" name="Down Arrow 7">
             <a:extLst>
               <a:ext uri="{FF2B5EF4-FFF2-40B4-BE49-F238E27FC236}">
-                <a16:creationId xmlns:a16="http://schemas.microsoft.com/office/drawing/2014/main" xmlns="" id="{B547373F-AF2E-4907-B442-9F902B387FD0}"/>
+                <a16:creationId xmlns="" xmlns:a16="http://schemas.microsoft.com/office/drawing/2014/main" id="{B547373F-AF2E-4907-B442-9F902B387FD0}"/>
               </a:ext>
               <a:ext uri="{C183D7F6-B498-43B3-948B-1728B52AA6E4}">
-                <adec:decorative xmlns:adec="http://schemas.microsoft.com/office/drawing/2017/decorative" xmlns="" val="1"/>
+                <adec:decorative xmlns="" xmlns:adec="http://schemas.microsoft.com/office/drawing/2017/decorative" val="1"/>
               </a:ext>
             </a:extLst>
           </p:cNvPr>
@@ -17516,7 +16220,7 @@
           <p:nvPr>
             <p:extLst>
               <p:ext uri="{386F3935-93C4-4BCD-93E2-E3B085C9AB24}">
-                <p16:designElem xmlns:p16="http://schemas.microsoft.com/office/powerpoint/2015/main" xmlns="" val="1"/>
+                <p16:designElem xmlns="" xmlns:p16="http://schemas.microsoft.com/office/powerpoint/2015/main" val="1"/>
               </p:ext>
             </p:extLst>
           </p:nvPr>
@@ -17572,7 +16276,7 @@
           <p:cNvPr id="19" name="Grafik 18">
             <a:extLst>
               <a:ext uri="{FF2B5EF4-FFF2-40B4-BE49-F238E27FC236}">
-                <a16:creationId xmlns:a16="http://schemas.microsoft.com/office/drawing/2014/main" xmlns="" id="{6A0CF42E-C820-4C87-884E-7A7671423EB6}"/>
+                <a16:creationId xmlns="" xmlns:a16="http://schemas.microsoft.com/office/drawing/2014/main" id="{6A0CF42E-C820-4C87-884E-7A7671423EB6}"/>
               </a:ext>
             </a:extLst>
           </p:cNvPr>
@@ -17608,7 +16312,7 @@
           <p:cNvPr id="2" name="Titel 1">
             <a:extLst>
               <a:ext uri="{FF2B5EF4-FFF2-40B4-BE49-F238E27FC236}">
-                <a16:creationId xmlns:a16="http://schemas.microsoft.com/office/drawing/2014/main" xmlns="" id="{2739BE3E-CAB9-4698-9CD4-9384CBCC5931}"/>
+                <a16:creationId xmlns="" xmlns:a16="http://schemas.microsoft.com/office/drawing/2014/main" id="{2739BE3E-CAB9-4698-9CD4-9384CBCC5931}"/>
               </a:ext>
             </a:extLst>
           </p:cNvPr>
@@ -17649,7 +16353,7 @@
           <p:cNvPr id="5" name="Diagramm 4">
             <a:extLst>
               <a:ext uri="{FF2B5EF4-FFF2-40B4-BE49-F238E27FC236}">
-                <a16:creationId xmlns:a16="http://schemas.microsoft.com/office/drawing/2014/main" xmlns="" id="{E6303B73-1BE8-495B-810F-B7171065D7DF}"/>
+                <a16:creationId xmlns="" xmlns:a16="http://schemas.microsoft.com/office/drawing/2014/main" id="{E6303B73-1BE8-495B-810F-B7171065D7DF}"/>
               </a:ext>
             </a:extLst>
           </p:cNvPr>
@@ -17722,10 +16426,10 @@
           <p:cNvPr id="24" name="Down Arrow 7">
             <a:extLst>
               <a:ext uri="{FF2B5EF4-FFF2-40B4-BE49-F238E27FC236}">
-                <a16:creationId xmlns:a16="http://schemas.microsoft.com/office/drawing/2014/main" xmlns="" id="{B547373F-AF2E-4907-B442-9F902B387FD0}"/>
+                <a16:creationId xmlns="" xmlns:a16="http://schemas.microsoft.com/office/drawing/2014/main" id="{B547373F-AF2E-4907-B442-9F902B387FD0}"/>
               </a:ext>
               <a:ext uri="{C183D7F6-B498-43B3-948B-1728B52AA6E4}">
-                <adec:decorative xmlns:adec="http://schemas.microsoft.com/office/drawing/2017/decorative" xmlns="" val="1"/>
+                <adec:decorative xmlns="" xmlns:adec="http://schemas.microsoft.com/office/drawing/2017/decorative" val="1"/>
               </a:ext>
             </a:extLst>
           </p:cNvPr>
@@ -17735,7 +16439,7 @@
           <p:nvPr>
             <p:extLst>
               <p:ext uri="{386F3935-93C4-4BCD-93E2-E3B085C9AB24}">
-                <p16:designElem xmlns:p16="http://schemas.microsoft.com/office/powerpoint/2015/main" xmlns="" val="1"/>
+                <p16:designElem xmlns="" xmlns:p16="http://schemas.microsoft.com/office/powerpoint/2015/main" val="1"/>
               </p:ext>
             </p:extLst>
           </p:nvPr>
@@ -17791,7 +16495,7 @@
           <p:cNvPr id="19" name="Grafik 18">
             <a:extLst>
               <a:ext uri="{FF2B5EF4-FFF2-40B4-BE49-F238E27FC236}">
-                <a16:creationId xmlns:a16="http://schemas.microsoft.com/office/drawing/2014/main" xmlns="" id="{6A0CF42E-C820-4C87-884E-7A7671423EB6}"/>
+                <a16:creationId xmlns="" xmlns:a16="http://schemas.microsoft.com/office/drawing/2014/main" id="{6A0CF42E-C820-4C87-884E-7A7671423EB6}"/>
               </a:ext>
             </a:extLst>
           </p:cNvPr>
@@ -17827,7 +16531,7 @@
           <p:cNvPr id="2" name="Titel 1">
             <a:extLst>
               <a:ext uri="{FF2B5EF4-FFF2-40B4-BE49-F238E27FC236}">
-                <a16:creationId xmlns:a16="http://schemas.microsoft.com/office/drawing/2014/main" xmlns="" id="{2739BE3E-CAB9-4698-9CD4-9384CBCC5931}"/>
+                <a16:creationId xmlns="" xmlns:a16="http://schemas.microsoft.com/office/drawing/2014/main" id="{2739BE3E-CAB9-4698-9CD4-9384CBCC5931}"/>
               </a:ext>
             </a:extLst>
           </p:cNvPr>
@@ -18502,10 +17206,10 @@
           <p:cNvPr id="24" name="Down Arrow 7">
             <a:extLst>
               <a:ext uri="{FF2B5EF4-FFF2-40B4-BE49-F238E27FC236}">
-                <a16:creationId xmlns:a16="http://schemas.microsoft.com/office/drawing/2014/main" xmlns="" id="{B547373F-AF2E-4907-B442-9F902B387FD0}"/>
+                <a16:creationId xmlns="" xmlns:a16="http://schemas.microsoft.com/office/drawing/2014/main" id="{B547373F-AF2E-4907-B442-9F902B387FD0}"/>
               </a:ext>
               <a:ext uri="{C183D7F6-B498-43B3-948B-1728B52AA6E4}">
-                <adec:decorative xmlns:adec="http://schemas.microsoft.com/office/drawing/2017/decorative" xmlns="" val="1"/>
+                <adec:decorative xmlns="" xmlns:adec="http://schemas.microsoft.com/office/drawing/2017/decorative" val="1"/>
               </a:ext>
             </a:extLst>
           </p:cNvPr>
@@ -18515,7 +17219,7 @@
           <p:nvPr>
             <p:extLst>
               <p:ext uri="{386F3935-93C4-4BCD-93E2-E3B085C9AB24}">
-                <p16:designElem xmlns:p16="http://schemas.microsoft.com/office/powerpoint/2015/main" xmlns="" val="1"/>
+                <p16:designElem xmlns="" xmlns:p16="http://schemas.microsoft.com/office/powerpoint/2015/main" val="1"/>
               </p:ext>
             </p:extLst>
           </p:nvPr>
@@ -18571,7 +17275,7 @@
           <p:cNvPr id="19" name="Grafik 18">
             <a:extLst>
               <a:ext uri="{FF2B5EF4-FFF2-40B4-BE49-F238E27FC236}">
-                <a16:creationId xmlns:a16="http://schemas.microsoft.com/office/drawing/2014/main" xmlns="" id="{6A0CF42E-C820-4C87-884E-7A7671423EB6}"/>
+                <a16:creationId xmlns="" xmlns:a16="http://schemas.microsoft.com/office/drawing/2014/main" id="{6A0CF42E-C820-4C87-884E-7A7671423EB6}"/>
               </a:ext>
             </a:extLst>
           </p:cNvPr>
@@ -18607,7 +17311,7 @@
           <p:cNvPr id="2" name="Titel 1">
             <a:extLst>
               <a:ext uri="{FF2B5EF4-FFF2-40B4-BE49-F238E27FC236}">
-                <a16:creationId xmlns:a16="http://schemas.microsoft.com/office/drawing/2014/main" xmlns="" id="{2739BE3E-CAB9-4698-9CD4-9384CBCC5931}"/>
+                <a16:creationId xmlns="" xmlns:a16="http://schemas.microsoft.com/office/drawing/2014/main" id="{2739BE3E-CAB9-4698-9CD4-9384CBCC5931}"/>
               </a:ext>
             </a:extLst>
           </p:cNvPr>
@@ -18657,7 +17361,7 @@
         <p:spPr>
           <a:xfrm>
             <a:off x="5328745" y="1008621"/>
-            <a:ext cx="7168055" cy="3785652"/>
+            <a:ext cx="7168055" cy="4524315"/>
           </a:xfrm>
           <a:prstGeom prst="rect">
             <a:avLst/>
@@ -18735,6 +17439,17 @@
               <a:rPr lang="de-DE" sz="2400" dirty="0" smtClean="0"/>
               <a:t>Webcams</a:t>
             </a:r>
+          </a:p>
+          <a:p>
+            <a:pPr fontAlgn="t">
+              <a:lnSpc>
+                <a:spcPct val="200000"/>
+              </a:lnSpc>
+            </a:pPr>
+            <a:r>
+              <a:rPr lang="de-DE" sz="2400" dirty="0" smtClean="0"/>
+              <a:t>Unterschiedliche Sprachen</a:t>
+            </a:r>
             <a:endParaRPr lang="de-DE" sz="2400" dirty="0"/>
           </a:p>
         </p:txBody>
@@ -18883,6 +17598,36 @@
           <a:xfrm>
             <a:off x="4887313" y="4228023"/>
             <a:ext cx="457588" cy="457588"/>
+          </a:xfrm>
+          <a:prstGeom prst="rect">
+            <a:avLst/>
+          </a:prstGeom>
+        </p:spPr>
+      </p:pic>
+      <p:pic>
+        <p:nvPicPr>
+          <p:cNvPr id="4" name="Grafik 3"/>
+          <p:cNvPicPr>
+            <a:picLocks noChangeAspect="1"/>
+          </p:cNvPicPr>
+          <p:nvPr/>
+        </p:nvPicPr>
+        <p:blipFill>
+          <a:blip r:embed="rId8">
+            <a:extLst>
+              <a:ext uri="{28A0092B-C50C-407E-A947-70E740481C1C}">
+                <a14:useLocalDpi xmlns:a14="http://schemas.microsoft.com/office/drawing/2010/main" val="0"/>
+              </a:ext>
+            </a:extLst>
+          </a:blip>
+          <a:stretch>
+            <a:fillRect/>
+          </a:stretch>
+        </p:blipFill>
+        <p:spPr>
+          <a:xfrm>
+            <a:off x="4887313" y="5053041"/>
+            <a:ext cx="479895" cy="479895"/>
           </a:xfrm>
           <a:prstGeom prst="rect">
             <a:avLst/>
@@ -18939,10 +17684,10 @@
           <p:cNvPr id="116" name="Down Arrow 7">
             <a:extLst>
               <a:ext uri="{FF2B5EF4-FFF2-40B4-BE49-F238E27FC236}">
-                <a16:creationId xmlns:a16="http://schemas.microsoft.com/office/drawing/2014/main" xmlns="" id="{B547373F-AF2E-4907-B442-9F902B387FD0}"/>
+                <a16:creationId xmlns="" xmlns:a16="http://schemas.microsoft.com/office/drawing/2014/main" id="{B547373F-AF2E-4907-B442-9F902B387FD0}"/>
               </a:ext>
               <a:ext uri="{C183D7F6-B498-43B3-948B-1728B52AA6E4}">
-                <adec:decorative xmlns:adec="http://schemas.microsoft.com/office/drawing/2017/decorative" xmlns="" val="1"/>
+                <adec:decorative xmlns="" xmlns:adec="http://schemas.microsoft.com/office/drawing/2017/decorative" val="1"/>
               </a:ext>
             </a:extLst>
           </p:cNvPr>
@@ -18952,7 +17697,7 @@
           <p:nvPr>
             <p:extLst>
               <p:ext uri="{386F3935-93C4-4BCD-93E2-E3B085C9AB24}">
-                <p16:designElem xmlns:p16="http://schemas.microsoft.com/office/powerpoint/2015/main" xmlns="" val="1"/>
+                <p16:designElem xmlns="" xmlns:p16="http://schemas.microsoft.com/office/powerpoint/2015/main" val="1"/>
               </p:ext>
             </p:extLst>
           </p:nvPr>
@@ -19008,7 +17753,7 @@
           <p:cNvPr id="111" name="Inhaltsplatzhalter 2">
             <a:extLst>
               <a:ext uri="{FF2B5EF4-FFF2-40B4-BE49-F238E27FC236}">
-                <a16:creationId xmlns:a16="http://schemas.microsoft.com/office/drawing/2014/main" xmlns="" id="{DFED6985-E05C-5442-8D81-240D91D1C65A}"/>
+                <a16:creationId xmlns="" xmlns:a16="http://schemas.microsoft.com/office/drawing/2014/main" id="{DFED6985-E05C-5442-8D81-240D91D1C65A}"/>
               </a:ext>
             </a:extLst>
           </p:cNvPr>
@@ -19211,7 +17956,7 @@
           <p:cNvPr id="7" name="Grafik 6">
             <a:extLst>
               <a:ext uri="{FF2B5EF4-FFF2-40B4-BE49-F238E27FC236}">
-                <a16:creationId xmlns:a16="http://schemas.microsoft.com/office/drawing/2014/main" xmlns="" id="{7A887C29-BDDD-470A-A266-BBA08FA64108}"/>
+                <a16:creationId xmlns="" xmlns:a16="http://schemas.microsoft.com/office/drawing/2014/main" id="{7A887C29-BDDD-470A-A266-BBA08FA64108}"/>
               </a:ext>
             </a:extLst>
           </p:cNvPr>
@@ -19247,7 +17992,7 @@
           <p:cNvPr id="6" name="Titel 5">
             <a:extLst>
               <a:ext uri="{FF2B5EF4-FFF2-40B4-BE49-F238E27FC236}">
-                <a16:creationId xmlns:a16="http://schemas.microsoft.com/office/drawing/2014/main" xmlns="" id="{97D4CC26-A6D9-44D5-BE51-0167991D4E18}"/>
+                <a16:creationId xmlns="" xmlns:a16="http://schemas.microsoft.com/office/drawing/2014/main" id="{97D4CC26-A6D9-44D5-BE51-0167991D4E18}"/>
               </a:ext>
             </a:extLst>
           </p:cNvPr>
@@ -19278,15 +18023,7 @@
                   <a:schemeClr val="bg1"/>
                 </a:solidFill>
               </a:rPr>
-              <a:t>VII</a:t>
-            </a:r>
-            <a:r>
-              <a:rPr lang="en-US" sz="3600" dirty="0" smtClean="0">
-                <a:solidFill>
-                  <a:schemeClr val="bg1"/>
-                </a:solidFill>
-              </a:rPr>
-              <a:t>. </a:t>
+              <a:t>VII. </a:t>
             </a:r>
             <a:r>
               <a:rPr lang="en-US" sz="3600" dirty="0">
@@ -19304,7 +18041,7 @@
           <p:cNvPr id="8" name="Inhaltsplatzhalter 2">
             <a:extLst>
               <a:ext uri="{FF2B5EF4-FFF2-40B4-BE49-F238E27FC236}">
-                <a16:creationId xmlns:a16="http://schemas.microsoft.com/office/drawing/2014/main" xmlns="" id="{7003E075-98FD-4D24-9416-AC73CBE803DB}"/>
+                <a16:creationId xmlns="" xmlns:a16="http://schemas.microsoft.com/office/drawing/2014/main" id="{7003E075-98FD-4D24-9416-AC73CBE803DB}"/>
               </a:ext>
             </a:extLst>
           </p:cNvPr>
@@ -19512,7 +18249,7 @@
           <p:cNvPr id="9" name="Inhaltsplatzhalter 3">
             <a:extLst>
               <a:ext uri="{FF2B5EF4-FFF2-40B4-BE49-F238E27FC236}">
-                <a16:creationId xmlns:a16="http://schemas.microsoft.com/office/drawing/2014/main" xmlns="" id="{F88ECA09-A8F2-4BDB-9617-2541072D9236}"/>
+                <a16:creationId xmlns="" xmlns:a16="http://schemas.microsoft.com/office/drawing/2014/main" id="{F88ECA09-A8F2-4BDB-9617-2541072D9236}"/>
               </a:ext>
             </a:extLst>
           </p:cNvPr>
@@ -19721,7 +18458,7 @@
           <p:cNvPr id="10" name="Inhaltsplatzhalter 2">
             <a:extLst>
               <a:ext uri="{FF2B5EF4-FFF2-40B4-BE49-F238E27FC236}">
-                <a16:creationId xmlns:a16="http://schemas.microsoft.com/office/drawing/2014/main" xmlns="" id="{DE6EF24E-B70D-42AF-A95E-39833628D6F4}"/>
+                <a16:creationId xmlns="" xmlns:a16="http://schemas.microsoft.com/office/drawing/2014/main" id="{DE6EF24E-B70D-42AF-A95E-39833628D6F4}"/>
               </a:ext>
             </a:extLst>
           </p:cNvPr>
@@ -19929,7 +18666,7 @@
           <p:cNvPr id="4" name="Grafik 3">
             <a:extLst>
               <a:ext uri="{FF2B5EF4-FFF2-40B4-BE49-F238E27FC236}">
-                <a16:creationId xmlns:a16="http://schemas.microsoft.com/office/drawing/2014/main" xmlns="" id="{1A5A34A1-6E42-4F94-9CF9-F4BB69F5D66D}"/>
+                <a16:creationId xmlns="" xmlns:a16="http://schemas.microsoft.com/office/drawing/2014/main" id="{1A5A34A1-6E42-4F94-9CF9-F4BB69F5D66D}"/>
               </a:ext>
             </a:extLst>
           </p:cNvPr>
@@ -19965,7 +18702,7 @@
           <p:cNvPr id="11" name="Grafik 10">
             <a:extLst>
               <a:ext uri="{FF2B5EF4-FFF2-40B4-BE49-F238E27FC236}">
-                <a16:creationId xmlns:a16="http://schemas.microsoft.com/office/drawing/2014/main" xmlns="" id="{9EAE4F7A-0446-4343-819D-3C60C12C670C}"/>
+                <a16:creationId xmlns="" xmlns:a16="http://schemas.microsoft.com/office/drawing/2014/main" id="{9EAE4F7A-0446-4343-819D-3C60C12C670C}"/>
               </a:ext>
             </a:extLst>
           </p:cNvPr>
@@ -20001,7 +18738,7 @@
           <p:cNvPr id="13" name="Grafik 12">
             <a:extLst>
               <a:ext uri="{FF2B5EF4-FFF2-40B4-BE49-F238E27FC236}">
-                <a16:creationId xmlns:a16="http://schemas.microsoft.com/office/drawing/2014/main" xmlns="" id="{40F7AB82-BA20-44B1-84F7-5C73F6161B51}"/>
+                <a16:creationId xmlns="" xmlns:a16="http://schemas.microsoft.com/office/drawing/2014/main" id="{40F7AB82-BA20-44B1-84F7-5C73F6161B51}"/>
               </a:ext>
             </a:extLst>
           </p:cNvPr>
@@ -20037,7 +18774,7 @@
           <p:cNvPr id="2" name="Textfeld 1">
             <a:extLst>
               <a:ext uri="{FF2B5EF4-FFF2-40B4-BE49-F238E27FC236}">
-                <a16:creationId xmlns:a16="http://schemas.microsoft.com/office/drawing/2014/main" xmlns="" id="{9E2D1883-817E-498B-8C99-B0DB64BFC8F8}"/>
+                <a16:creationId xmlns="" xmlns:a16="http://schemas.microsoft.com/office/drawing/2014/main" id="{9E2D1883-817E-498B-8C99-B0DB64BFC8F8}"/>
               </a:ext>
             </a:extLst>
           </p:cNvPr>
@@ -20091,7 +18828,7 @@
           <p:cNvPr id="3" name="Textfeld 2">
             <a:extLst>
               <a:ext uri="{FF2B5EF4-FFF2-40B4-BE49-F238E27FC236}">
-                <a16:creationId xmlns:a16="http://schemas.microsoft.com/office/drawing/2014/main" xmlns="" id="{534F31D1-A9BE-49BE-9A68-B53AAAB4512C}"/>
+                <a16:creationId xmlns="" xmlns:a16="http://schemas.microsoft.com/office/drawing/2014/main" id="{534F31D1-A9BE-49BE-9A68-B53AAAB4512C}"/>
               </a:ext>
             </a:extLst>
           </p:cNvPr>
@@ -20164,7 +18901,7 @@
           <p:cNvPr id="5" name="Textfeld 4">
             <a:extLst>
               <a:ext uri="{FF2B5EF4-FFF2-40B4-BE49-F238E27FC236}">
-                <a16:creationId xmlns:a16="http://schemas.microsoft.com/office/drawing/2014/main" xmlns="" id="{0424897C-689E-4630-A842-34F2020AA909}"/>
+                <a16:creationId xmlns="" xmlns:a16="http://schemas.microsoft.com/office/drawing/2014/main" id="{0424897C-689E-4630-A842-34F2020AA909}"/>
               </a:ext>
             </a:extLst>
           </p:cNvPr>
@@ -20192,8 +18929,12 @@
               <a:buChar char="•"/>
             </a:pPr>
             <a:r>
+              <a:rPr lang="de-DE" dirty="0" smtClean="0"/>
+              <a:t>Gemeinsam im Team </a:t>
+            </a:r>
+            <a:r>
               <a:rPr lang="de-DE" dirty="0"/>
-              <a:t>Gemeinsam Technologien </a:t>
+              <a:t>Technologien </a:t>
             </a:r>
             <a:r>
               <a:rPr lang="de-DE" dirty="0" smtClean="0"/>
@@ -20283,10 +19024,10 @@
           <p:cNvPr id="121" name="Freeform: Shape 120">
             <a:extLst>
               <a:ext uri="{FF2B5EF4-FFF2-40B4-BE49-F238E27FC236}">
-                <a16:creationId xmlns:a16="http://schemas.microsoft.com/office/drawing/2014/main" xmlns="" id="{92AA2300-0FA6-4328-9BD8-1D67925C0BD6}"/>
+                <a16:creationId xmlns="" xmlns:a16="http://schemas.microsoft.com/office/drawing/2014/main" id="{92AA2300-0FA6-4328-9BD8-1D67925C0BD6}"/>
               </a:ext>
               <a:ext uri="{C183D7F6-B498-43B3-948B-1728B52AA6E4}">
-                <adec:decorative xmlns:adec="http://schemas.microsoft.com/office/drawing/2017/decorative" xmlns="" val="1"/>
+                <adec:decorative xmlns="" xmlns:adec="http://schemas.microsoft.com/office/drawing/2017/decorative" val="1"/>
               </a:ext>
             </a:extLst>
           </p:cNvPr>
@@ -20296,7 +19037,7 @@
           <p:nvPr>
             <p:extLst>
               <p:ext uri="{386F3935-93C4-4BCD-93E2-E3B085C9AB24}">
-                <p16:designElem xmlns:p16="http://schemas.microsoft.com/office/powerpoint/2015/main" xmlns="" val="1"/>
+                <p16:designElem xmlns="" xmlns:p16="http://schemas.microsoft.com/office/powerpoint/2015/main" val="1"/>
               </p:ext>
             </p:extLst>
           </p:nvPr>
@@ -20454,10 +19195,10 @@
           <p:cNvPr id="123" name="Freeform: Shape 122">
             <a:extLst>
               <a:ext uri="{FF2B5EF4-FFF2-40B4-BE49-F238E27FC236}">
-                <a16:creationId xmlns:a16="http://schemas.microsoft.com/office/drawing/2014/main" xmlns="" id="{D3E1FE85-D0BF-41D3-8B85-04776368E1F0}"/>
+                <a16:creationId xmlns="" xmlns:a16="http://schemas.microsoft.com/office/drawing/2014/main" id="{D3E1FE85-D0BF-41D3-8B85-04776368E1F0}"/>
               </a:ext>
               <a:ext uri="{C183D7F6-B498-43B3-948B-1728B52AA6E4}">
-                <adec:decorative xmlns:adec="http://schemas.microsoft.com/office/drawing/2017/decorative" xmlns="" val="1"/>
+                <adec:decorative xmlns="" xmlns:adec="http://schemas.microsoft.com/office/drawing/2017/decorative" val="1"/>
               </a:ext>
             </a:extLst>
           </p:cNvPr>
@@ -20467,7 +19208,7 @@
           <p:nvPr>
             <p:extLst>
               <p:ext uri="{386F3935-93C4-4BCD-93E2-E3B085C9AB24}">
-                <p16:designElem xmlns:p16="http://schemas.microsoft.com/office/powerpoint/2015/main" xmlns="" val="1"/>
+                <p16:designElem xmlns="" xmlns:p16="http://schemas.microsoft.com/office/powerpoint/2015/main" val="1"/>
               </p:ext>
             </p:extLst>
           </p:nvPr>
@@ -20621,10 +19362,10 @@
           <p:cNvPr id="125" name="Freeform: Shape 124">
             <a:extLst>
               <a:ext uri="{FF2B5EF4-FFF2-40B4-BE49-F238E27FC236}">
-                <a16:creationId xmlns:a16="http://schemas.microsoft.com/office/drawing/2014/main" xmlns="" id="{F2E5A8E1-2A22-48D0-9556-E21648FA1EAC}"/>
+                <a16:creationId xmlns="" xmlns:a16="http://schemas.microsoft.com/office/drawing/2014/main" id="{F2E5A8E1-2A22-48D0-9556-E21648FA1EAC}"/>
               </a:ext>
               <a:ext uri="{C183D7F6-B498-43B3-948B-1728B52AA6E4}">
-                <adec:decorative xmlns:adec="http://schemas.microsoft.com/office/drawing/2017/decorative" xmlns="" val="1"/>
+                <adec:decorative xmlns="" xmlns:adec="http://schemas.microsoft.com/office/drawing/2017/decorative" val="1"/>
               </a:ext>
             </a:extLst>
           </p:cNvPr>
@@ -20634,7 +19375,7 @@
           <p:nvPr>
             <p:extLst>
               <p:ext uri="{386F3935-93C4-4BCD-93E2-E3B085C9AB24}">
-                <p16:designElem xmlns:p16="http://schemas.microsoft.com/office/powerpoint/2015/main" xmlns="" val="1"/>
+                <p16:designElem xmlns="" xmlns:p16="http://schemas.microsoft.com/office/powerpoint/2015/main" val="1"/>
               </p:ext>
             </p:extLst>
           </p:nvPr>
@@ -20800,10 +19541,10 @@
           <p:cNvPr id="127" name="Freeform: Shape 126">
             <a:extLst>
               <a:ext uri="{FF2B5EF4-FFF2-40B4-BE49-F238E27FC236}">
-                <a16:creationId xmlns:a16="http://schemas.microsoft.com/office/drawing/2014/main" xmlns="" id="{1072B470-1E76-42B5-86EA-1FB0F881D7EF}"/>
+                <a16:creationId xmlns="" xmlns:a16="http://schemas.microsoft.com/office/drawing/2014/main" id="{1072B470-1E76-42B5-86EA-1FB0F881D7EF}"/>
               </a:ext>
               <a:ext uri="{C183D7F6-B498-43B3-948B-1728B52AA6E4}">
-                <adec:decorative xmlns:adec="http://schemas.microsoft.com/office/drawing/2017/decorative" xmlns="" val="1"/>
+                <adec:decorative xmlns="" xmlns:adec="http://schemas.microsoft.com/office/drawing/2017/decorative" val="1"/>
               </a:ext>
             </a:extLst>
           </p:cNvPr>
@@ -20813,7 +19554,7 @@
           <p:nvPr>
             <p:extLst>
               <p:ext uri="{386F3935-93C4-4BCD-93E2-E3B085C9AB24}">
-                <p16:designElem xmlns:p16="http://schemas.microsoft.com/office/powerpoint/2015/main" xmlns="" val="1"/>
+                <p16:designElem xmlns="" xmlns:p16="http://schemas.microsoft.com/office/powerpoint/2015/main" val="1"/>
               </p:ext>
             </p:extLst>
           </p:nvPr>
@@ -20969,10 +19710,10 @@
           <p:cNvPr id="129" name="Freeform: Shape 128">
             <a:extLst>
               <a:ext uri="{FF2B5EF4-FFF2-40B4-BE49-F238E27FC236}">
-                <a16:creationId xmlns:a16="http://schemas.microsoft.com/office/drawing/2014/main" xmlns="" id="{DDD8B025-3845-4DEF-98B6-7C0BF531DB78}"/>
+                <a16:creationId xmlns="" xmlns:a16="http://schemas.microsoft.com/office/drawing/2014/main" id="{DDD8B025-3845-4DEF-98B6-7C0BF531DB78}"/>
               </a:ext>
               <a:ext uri="{C183D7F6-B498-43B3-948B-1728B52AA6E4}">
-                <adec:decorative xmlns:adec="http://schemas.microsoft.com/office/drawing/2017/decorative" xmlns="" val="1"/>
+                <adec:decorative xmlns="" xmlns:adec="http://schemas.microsoft.com/office/drawing/2017/decorative" val="1"/>
               </a:ext>
             </a:extLst>
           </p:cNvPr>
@@ -20982,7 +19723,7 @@
           <p:nvPr>
             <p:extLst>
               <p:ext uri="{386F3935-93C4-4BCD-93E2-E3B085C9AB24}">
-                <p16:designElem xmlns:p16="http://schemas.microsoft.com/office/powerpoint/2015/main" xmlns="" val="1"/>
+                <p16:designElem xmlns="" xmlns:p16="http://schemas.microsoft.com/office/powerpoint/2015/main" val="1"/>
               </p:ext>
             </p:extLst>
           </p:nvPr>
@@ -21146,10 +19887,10 @@
           <p:cNvPr id="131" name="Freeform: Shape 130">
             <a:extLst>
               <a:ext uri="{FF2B5EF4-FFF2-40B4-BE49-F238E27FC236}">
-                <a16:creationId xmlns:a16="http://schemas.microsoft.com/office/drawing/2014/main" xmlns="" id="{C4051FED-CF0D-4DDD-A9BB-E58FEEFE7C46}"/>
+                <a16:creationId xmlns="" xmlns:a16="http://schemas.microsoft.com/office/drawing/2014/main" id="{C4051FED-CF0D-4DDD-A9BB-E58FEEFE7C46}"/>
               </a:ext>
               <a:ext uri="{C183D7F6-B498-43B3-948B-1728B52AA6E4}">
-                <adec:decorative xmlns:adec="http://schemas.microsoft.com/office/drawing/2017/decorative" xmlns="" val="1"/>
+                <adec:decorative xmlns="" xmlns:adec="http://schemas.microsoft.com/office/drawing/2017/decorative" val="1"/>
               </a:ext>
             </a:extLst>
           </p:cNvPr>
@@ -21159,7 +19900,7 @@
           <p:nvPr>
             <p:extLst>
               <p:ext uri="{386F3935-93C4-4BCD-93E2-E3B085C9AB24}">
-                <p16:designElem xmlns:p16="http://schemas.microsoft.com/office/powerpoint/2015/main" xmlns="" val="1"/>
+                <p16:designElem xmlns="" xmlns:p16="http://schemas.microsoft.com/office/powerpoint/2015/main" val="1"/>
               </p:ext>
             </p:extLst>
           </p:nvPr>
@@ -21313,7 +20054,7 @@
           <p:cNvPr id="26" name="Grafik 25">
             <a:extLst>
               <a:ext uri="{FF2B5EF4-FFF2-40B4-BE49-F238E27FC236}">
-                <a16:creationId xmlns:a16="http://schemas.microsoft.com/office/drawing/2014/main" xmlns="" id="{A6292C25-8593-4E6E-BAD9-F9336A667C1C}"/>
+                <a16:creationId xmlns="" xmlns:a16="http://schemas.microsoft.com/office/drawing/2014/main" id="{A6292C25-8593-4E6E-BAD9-F9336A667C1C}"/>
               </a:ext>
             </a:extLst>
           </p:cNvPr>
@@ -21349,7 +20090,7 @@
           <p:cNvPr id="27" name="Grafik 26">
             <a:extLst>
               <a:ext uri="{FF2B5EF4-FFF2-40B4-BE49-F238E27FC236}">
-                <a16:creationId xmlns:a16="http://schemas.microsoft.com/office/drawing/2014/main" xmlns="" id="{34024532-95E4-4F80-9F7B-F9980DB60401}"/>
+                <a16:creationId xmlns="" xmlns:a16="http://schemas.microsoft.com/office/drawing/2014/main" id="{34024532-95E4-4F80-9F7B-F9980DB60401}"/>
               </a:ext>
             </a:extLst>
           </p:cNvPr>
@@ -21385,7 +20126,7 @@
           <p:cNvPr id="28" name="Grafik 27">
             <a:extLst>
               <a:ext uri="{FF2B5EF4-FFF2-40B4-BE49-F238E27FC236}">
-                <a16:creationId xmlns:a16="http://schemas.microsoft.com/office/drawing/2014/main" xmlns="" id="{C50136C2-C223-45B6-9643-1691E8D5C16E}"/>
+                <a16:creationId xmlns="" xmlns:a16="http://schemas.microsoft.com/office/drawing/2014/main" id="{C50136C2-C223-45B6-9643-1691E8D5C16E}"/>
               </a:ext>
             </a:extLst>
           </p:cNvPr>
@@ -21401,7 +20142,7 @@
                 <a14:useLocalDpi xmlns:a14="http://schemas.microsoft.com/office/drawing/2010/main" val="0"/>
               </a:ext>
               <a:ext uri="{96DAC541-7B7A-43D3-8B79-37D633B846F1}">
-                <asvg:svgBlip xmlns:asvg="http://schemas.microsoft.com/office/drawing/2016/SVG/main" xmlns="" r:embed="rId5"/>
+                <asvg:svgBlip xmlns="" xmlns:asvg="http://schemas.microsoft.com/office/drawing/2016/SVG/main" r:embed="rId5"/>
               </a:ext>
             </a:extLst>
           </a:blip>
@@ -21424,7 +20165,7 @@
           <p:cNvPr id="111" name="Inhaltsplatzhalter 2">
             <a:extLst>
               <a:ext uri="{FF2B5EF4-FFF2-40B4-BE49-F238E27FC236}">
-                <a16:creationId xmlns:a16="http://schemas.microsoft.com/office/drawing/2014/main" xmlns="" id="{DFED6985-E05C-5442-8D81-240D91D1C65A}"/>
+                <a16:creationId xmlns="" xmlns:a16="http://schemas.microsoft.com/office/drawing/2014/main" id="{DFED6985-E05C-5442-8D81-240D91D1C65A}"/>
               </a:ext>
             </a:extLst>
           </p:cNvPr>
@@ -21627,7 +20368,7 @@
           <p:cNvPr id="6" name="Titel 5">
             <a:extLst>
               <a:ext uri="{FF2B5EF4-FFF2-40B4-BE49-F238E27FC236}">
-                <a16:creationId xmlns:a16="http://schemas.microsoft.com/office/drawing/2014/main" xmlns="" id="{97D4CC26-A6D9-44D5-BE51-0167991D4E18}"/>
+                <a16:creationId xmlns="" xmlns:a16="http://schemas.microsoft.com/office/drawing/2014/main" id="{97D4CC26-A6D9-44D5-BE51-0167991D4E18}"/>
               </a:ext>
             </a:extLst>
           </p:cNvPr>
@@ -21714,10 +20455,10 @@
           <p:cNvPr id="116" name="Freeform: Shape 115">
             <a:extLst>
               <a:ext uri="{FF2B5EF4-FFF2-40B4-BE49-F238E27FC236}">
-                <a16:creationId xmlns:a16="http://schemas.microsoft.com/office/drawing/2014/main" xmlns="" id="{92AA2300-0FA6-4328-9BD8-1D67925C0BD6}"/>
+                <a16:creationId xmlns="" xmlns:a16="http://schemas.microsoft.com/office/drawing/2014/main" id="{92AA2300-0FA6-4328-9BD8-1D67925C0BD6}"/>
               </a:ext>
               <a:ext uri="{C183D7F6-B498-43B3-948B-1728B52AA6E4}">
-                <adec:decorative xmlns:adec="http://schemas.microsoft.com/office/drawing/2017/decorative" xmlns="" val="1"/>
+                <adec:decorative xmlns="" xmlns:adec="http://schemas.microsoft.com/office/drawing/2017/decorative" val="1"/>
               </a:ext>
             </a:extLst>
           </p:cNvPr>
@@ -21727,7 +20468,7 @@
           <p:nvPr>
             <p:extLst>
               <p:ext uri="{386F3935-93C4-4BCD-93E2-E3B085C9AB24}">
-                <p16:designElem xmlns:p16="http://schemas.microsoft.com/office/powerpoint/2015/main" xmlns="" val="1"/>
+                <p16:designElem xmlns="" xmlns:p16="http://schemas.microsoft.com/office/powerpoint/2015/main" val="1"/>
               </p:ext>
             </p:extLst>
           </p:nvPr>
@@ -21885,10 +20626,10 @@
           <p:cNvPr id="118" name="Freeform: Shape 117">
             <a:extLst>
               <a:ext uri="{FF2B5EF4-FFF2-40B4-BE49-F238E27FC236}">
-                <a16:creationId xmlns:a16="http://schemas.microsoft.com/office/drawing/2014/main" xmlns="" id="{D3E1FE85-D0BF-41D3-8B85-04776368E1F0}"/>
+                <a16:creationId xmlns="" xmlns:a16="http://schemas.microsoft.com/office/drawing/2014/main" id="{D3E1FE85-D0BF-41D3-8B85-04776368E1F0}"/>
               </a:ext>
               <a:ext uri="{C183D7F6-B498-43B3-948B-1728B52AA6E4}">
-                <adec:decorative xmlns:adec="http://schemas.microsoft.com/office/drawing/2017/decorative" xmlns="" val="1"/>
+                <adec:decorative xmlns="" xmlns:adec="http://schemas.microsoft.com/office/drawing/2017/decorative" val="1"/>
               </a:ext>
             </a:extLst>
           </p:cNvPr>
@@ -21898,7 +20639,7 @@
           <p:nvPr>
             <p:extLst>
               <p:ext uri="{386F3935-93C4-4BCD-93E2-E3B085C9AB24}">
-                <p16:designElem xmlns:p16="http://schemas.microsoft.com/office/powerpoint/2015/main" xmlns="" val="1"/>
+                <p16:designElem xmlns="" xmlns:p16="http://schemas.microsoft.com/office/powerpoint/2015/main" val="1"/>
               </p:ext>
             </p:extLst>
           </p:nvPr>
@@ -22052,10 +20793,10 @@
           <p:cNvPr id="120" name="Freeform: Shape 119">
             <a:extLst>
               <a:ext uri="{FF2B5EF4-FFF2-40B4-BE49-F238E27FC236}">
-                <a16:creationId xmlns:a16="http://schemas.microsoft.com/office/drawing/2014/main" xmlns="" id="{F2E5A8E1-2A22-48D0-9556-E21648FA1EAC}"/>
+                <a16:creationId xmlns="" xmlns:a16="http://schemas.microsoft.com/office/drawing/2014/main" id="{F2E5A8E1-2A22-48D0-9556-E21648FA1EAC}"/>
               </a:ext>
               <a:ext uri="{C183D7F6-B498-43B3-948B-1728B52AA6E4}">
-                <adec:decorative xmlns:adec="http://schemas.microsoft.com/office/drawing/2017/decorative" xmlns="" val="1"/>
+                <adec:decorative xmlns="" xmlns:adec="http://schemas.microsoft.com/office/drawing/2017/decorative" val="1"/>
               </a:ext>
             </a:extLst>
           </p:cNvPr>
@@ -22065,7 +20806,7 @@
           <p:nvPr>
             <p:extLst>
               <p:ext uri="{386F3935-93C4-4BCD-93E2-E3B085C9AB24}">
-                <p16:designElem xmlns:p16="http://schemas.microsoft.com/office/powerpoint/2015/main" xmlns="" val="1"/>
+                <p16:designElem xmlns="" xmlns:p16="http://schemas.microsoft.com/office/powerpoint/2015/main" val="1"/>
               </p:ext>
             </p:extLst>
           </p:nvPr>
@@ -22231,10 +20972,10 @@
           <p:cNvPr id="122" name="Freeform: Shape 121">
             <a:extLst>
               <a:ext uri="{FF2B5EF4-FFF2-40B4-BE49-F238E27FC236}">
-                <a16:creationId xmlns:a16="http://schemas.microsoft.com/office/drawing/2014/main" xmlns="" id="{1072B470-1E76-42B5-86EA-1FB0F881D7EF}"/>
+                <a16:creationId xmlns="" xmlns:a16="http://schemas.microsoft.com/office/drawing/2014/main" id="{1072B470-1E76-42B5-86EA-1FB0F881D7EF}"/>
               </a:ext>
               <a:ext uri="{C183D7F6-B498-43B3-948B-1728B52AA6E4}">
-                <adec:decorative xmlns:adec="http://schemas.microsoft.com/office/drawing/2017/decorative" xmlns="" val="1"/>
+                <adec:decorative xmlns="" xmlns:adec="http://schemas.microsoft.com/office/drawing/2017/decorative" val="1"/>
               </a:ext>
             </a:extLst>
           </p:cNvPr>
@@ -22244,7 +20985,7 @@
           <p:nvPr>
             <p:extLst>
               <p:ext uri="{386F3935-93C4-4BCD-93E2-E3B085C9AB24}">
-                <p16:designElem xmlns:p16="http://schemas.microsoft.com/office/powerpoint/2015/main" xmlns="" val="1"/>
+                <p16:designElem xmlns="" xmlns:p16="http://schemas.microsoft.com/office/powerpoint/2015/main" val="1"/>
               </p:ext>
             </p:extLst>
           </p:nvPr>
@@ -22400,10 +21141,10 @@
           <p:cNvPr id="124" name="Freeform: Shape 123">
             <a:extLst>
               <a:ext uri="{FF2B5EF4-FFF2-40B4-BE49-F238E27FC236}">
-                <a16:creationId xmlns:a16="http://schemas.microsoft.com/office/drawing/2014/main" xmlns="" id="{DDD8B025-3845-4DEF-98B6-7C0BF531DB78}"/>
+                <a16:creationId xmlns="" xmlns:a16="http://schemas.microsoft.com/office/drawing/2014/main" id="{DDD8B025-3845-4DEF-98B6-7C0BF531DB78}"/>
               </a:ext>
               <a:ext uri="{C183D7F6-B498-43B3-948B-1728B52AA6E4}">
-                <adec:decorative xmlns:adec="http://schemas.microsoft.com/office/drawing/2017/decorative" xmlns="" val="1"/>
+                <adec:decorative xmlns="" xmlns:adec="http://schemas.microsoft.com/office/drawing/2017/decorative" val="1"/>
               </a:ext>
             </a:extLst>
           </p:cNvPr>
@@ -22413,7 +21154,7 @@
           <p:nvPr>
             <p:extLst>
               <p:ext uri="{386F3935-93C4-4BCD-93E2-E3B085C9AB24}">
-                <p16:designElem xmlns:p16="http://schemas.microsoft.com/office/powerpoint/2015/main" xmlns="" val="1"/>
+                <p16:designElem xmlns="" xmlns:p16="http://schemas.microsoft.com/office/powerpoint/2015/main" val="1"/>
               </p:ext>
             </p:extLst>
           </p:nvPr>
@@ -22577,10 +21318,10 @@
           <p:cNvPr id="126" name="Freeform: Shape 125">
             <a:extLst>
               <a:ext uri="{FF2B5EF4-FFF2-40B4-BE49-F238E27FC236}">
-                <a16:creationId xmlns:a16="http://schemas.microsoft.com/office/drawing/2014/main" xmlns="" id="{C4051FED-CF0D-4DDD-A9BB-E58FEEFE7C46}"/>
+                <a16:creationId xmlns="" xmlns:a16="http://schemas.microsoft.com/office/drawing/2014/main" id="{C4051FED-CF0D-4DDD-A9BB-E58FEEFE7C46}"/>
               </a:ext>
               <a:ext uri="{C183D7F6-B498-43B3-948B-1728B52AA6E4}">
-                <adec:decorative xmlns:adec="http://schemas.microsoft.com/office/drawing/2017/decorative" xmlns="" val="1"/>
+                <adec:decorative xmlns="" xmlns:adec="http://schemas.microsoft.com/office/drawing/2017/decorative" val="1"/>
               </a:ext>
             </a:extLst>
           </p:cNvPr>
@@ -22590,7 +21331,7 @@
           <p:nvPr>
             <p:extLst>
               <p:ext uri="{386F3935-93C4-4BCD-93E2-E3B085C9AB24}">
-                <p16:designElem xmlns:p16="http://schemas.microsoft.com/office/powerpoint/2015/main" xmlns="" val="1"/>
+                <p16:designElem xmlns="" xmlns:p16="http://schemas.microsoft.com/office/powerpoint/2015/main" val="1"/>
               </p:ext>
             </p:extLst>
           </p:nvPr>
@@ -22744,7 +21485,7 @@
           <p:cNvPr id="26" name="Grafik 25">
             <a:extLst>
               <a:ext uri="{FF2B5EF4-FFF2-40B4-BE49-F238E27FC236}">
-                <a16:creationId xmlns:a16="http://schemas.microsoft.com/office/drawing/2014/main" xmlns="" id="{A6292C25-8593-4E6E-BAD9-F9336A667C1C}"/>
+                <a16:creationId xmlns="" xmlns:a16="http://schemas.microsoft.com/office/drawing/2014/main" id="{A6292C25-8593-4E6E-BAD9-F9336A667C1C}"/>
               </a:ext>
             </a:extLst>
           </p:cNvPr>
@@ -22780,7 +21521,7 @@
           <p:cNvPr id="27" name="Grafik 26">
             <a:extLst>
               <a:ext uri="{FF2B5EF4-FFF2-40B4-BE49-F238E27FC236}">
-                <a16:creationId xmlns:a16="http://schemas.microsoft.com/office/drawing/2014/main" xmlns="" id="{34024532-95E4-4F80-9F7B-F9980DB60401}"/>
+                <a16:creationId xmlns="" xmlns:a16="http://schemas.microsoft.com/office/drawing/2014/main" id="{34024532-95E4-4F80-9F7B-F9980DB60401}"/>
               </a:ext>
             </a:extLst>
           </p:cNvPr>
@@ -22816,7 +21557,7 @@
           <p:cNvPr id="28" name="Grafik 27">
             <a:extLst>
               <a:ext uri="{FF2B5EF4-FFF2-40B4-BE49-F238E27FC236}">
-                <a16:creationId xmlns:a16="http://schemas.microsoft.com/office/drawing/2014/main" xmlns="" id="{C50136C2-C223-45B6-9643-1691E8D5C16E}"/>
+                <a16:creationId xmlns="" xmlns:a16="http://schemas.microsoft.com/office/drawing/2014/main" id="{C50136C2-C223-45B6-9643-1691E8D5C16E}"/>
               </a:ext>
             </a:extLst>
           </p:cNvPr>
@@ -22832,7 +21573,7 @@
                 <a14:useLocalDpi xmlns:a14="http://schemas.microsoft.com/office/drawing/2010/main" val="0"/>
               </a:ext>
               <a:ext uri="{96DAC541-7B7A-43D3-8B79-37D633B846F1}">
-                <asvg:svgBlip xmlns:asvg="http://schemas.microsoft.com/office/drawing/2016/SVG/main" xmlns="" r:embed="rId5"/>
+                <asvg:svgBlip xmlns="" xmlns:asvg="http://schemas.microsoft.com/office/drawing/2016/SVG/main" r:embed="rId5"/>
               </a:ext>
             </a:extLst>
           </a:blip>
@@ -22855,7 +21596,7 @@
           <p:cNvPr id="111" name="Inhaltsplatzhalter 2">
             <a:extLst>
               <a:ext uri="{FF2B5EF4-FFF2-40B4-BE49-F238E27FC236}">
-                <a16:creationId xmlns:a16="http://schemas.microsoft.com/office/drawing/2014/main" xmlns="" id="{DFED6985-E05C-5442-8D81-240D91D1C65A}"/>
+                <a16:creationId xmlns="" xmlns:a16="http://schemas.microsoft.com/office/drawing/2014/main" id="{DFED6985-E05C-5442-8D81-240D91D1C65A}"/>
               </a:ext>
             </a:extLst>
           </p:cNvPr>
@@ -23058,7 +21799,7 @@
           <p:cNvPr id="6" name="Titel 5">
             <a:extLst>
               <a:ext uri="{FF2B5EF4-FFF2-40B4-BE49-F238E27FC236}">
-                <a16:creationId xmlns:a16="http://schemas.microsoft.com/office/drawing/2014/main" xmlns="" id="{97D4CC26-A6D9-44D5-BE51-0167991D4E18}"/>
+                <a16:creationId xmlns="" xmlns:a16="http://schemas.microsoft.com/office/drawing/2014/main" id="{97D4CC26-A6D9-44D5-BE51-0167991D4E18}"/>
               </a:ext>
             </a:extLst>
           </p:cNvPr>
@@ -23142,10 +21883,10 @@
           <p:cNvPr id="116" name="Down Arrow 7">
             <a:extLst>
               <a:ext uri="{FF2B5EF4-FFF2-40B4-BE49-F238E27FC236}">
-                <a16:creationId xmlns:a16="http://schemas.microsoft.com/office/drawing/2014/main" xmlns="" id="{B547373F-AF2E-4907-B442-9F902B387FD0}"/>
+                <a16:creationId xmlns="" xmlns:a16="http://schemas.microsoft.com/office/drawing/2014/main" id="{B547373F-AF2E-4907-B442-9F902B387FD0}"/>
               </a:ext>
               <a:ext uri="{C183D7F6-B498-43B3-948B-1728B52AA6E4}">
-                <adec:decorative xmlns:adec="http://schemas.microsoft.com/office/drawing/2017/decorative" xmlns="" val="1"/>
+                <adec:decorative xmlns="" xmlns:adec="http://schemas.microsoft.com/office/drawing/2017/decorative" val="1"/>
               </a:ext>
             </a:extLst>
           </p:cNvPr>
@@ -23155,7 +21896,7 @@
           <p:nvPr>
             <p:extLst>
               <p:ext uri="{386F3935-93C4-4BCD-93E2-E3B085C9AB24}">
-                <p16:designElem xmlns:p16="http://schemas.microsoft.com/office/powerpoint/2015/main" xmlns="" val="1"/>
+                <p16:designElem xmlns="" xmlns:p16="http://schemas.microsoft.com/office/powerpoint/2015/main" val="1"/>
               </p:ext>
             </p:extLst>
           </p:nvPr>
@@ -23211,7 +21952,7 @@
           <p:cNvPr id="111" name="Inhaltsplatzhalter 2">
             <a:extLst>
               <a:ext uri="{FF2B5EF4-FFF2-40B4-BE49-F238E27FC236}">
-                <a16:creationId xmlns:a16="http://schemas.microsoft.com/office/drawing/2014/main" xmlns="" id="{DFED6985-E05C-5442-8D81-240D91D1C65A}"/>
+                <a16:creationId xmlns="" xmlns:a16="http://schemas.microsoft.com/office/drawing/2014/main" id="{DFED6985-E05C-5442-8D81-240D91D1C65A}"/>
               </a:ext>
             </a:extLst>
           </p:cNvPr>
@@ -23414,7 +22155,7 @@
           <p:cNvPr id="7" name="Grafik 6">
             <a:extLst>
               <a:ext uri="{FF2B5EF4-FFF2-40B4-BE49-F238E27FC236}">
-                <a16:creationId xmlns:a16="http://schemas.microsoft.com/office/drawing/2014/main" xmlns="" id="{00BF8B91-1D56-443B-B246-642340977792}"/>
+                <a16:creationId xmlns="" xmlns:a16="http://schemas.microsoft.com/office/drawing/2014/main" id="{00BF8B91-1D56-443B-B246-642340977792}"/>
               </a:ext>
             </a:extLst>
           </p:cNvPr>
@@ -23450,7 +22191,7 @@
           <p:cNvPr id="6" name="Titel 5">
             <a:extLst>
               <a:ext uri="{FF2B5EF4-FFF2-40B4-BE49-F238E27FC236}">
-                <a16:creationId xmlns:a16="http://schemas.microsoft.com/office/drawing/2014/main" xmlns="" id="{97D4CC26-A6D9-44D5-BE51-0167991D4E18}"/>
+                <a16:creationId xmlns="" xmlns:a16="http://schemas.microsoft.com/office/drawing/2014/main" id="{97D4CC26-A6D9-44D5-BE51-0167991D4E18}"/>
               </a:ext>
             </a:extLst>
           </p:cNvPr>
@@ -23496,7 +22237,7 @@
           <p:cNvPr id="2" name="Textfeld 1">
             <a:extLst>
               <a:ext uri="{FF2B5EF4-FFF2-40B4-BE49-F238E27FC236}">
-                <a16:creationId xmlns:a16="http://schemas.microsoft.com/office/drawing/2014/main" xmlns="" id="{08D1EF3A-A1E5-4165-A4F7-6A44A864B653}"/>
+                <a16:creationId xmlns="" xmlns:a16="http://schemas.microsoft.com/office/drawing/2014/main" id="{08D1EF3A-A1E5-4165-A4F7-6A44A864B653}"/>
               </a:ext>
             </a:extLst>
           </p:cNvPr>
@@ -23637,10 +22378,6 @@
               </a:rPr>
               <a:t>https://icons8.com</a:t>
             </a:r>
-            <a:endParaRPr lang="de-DE" dirty="0">
-              <a:ea typeface="Open Sans Light" panose="020B0306030504020204" pitchFamily="34" charset="0"/>
-              <a:cs typeface="Open Sans Light" panose="020B0306030504020204" pitchFamily="34" charset="0"/>
-            </a:endParaRPr>
           </a:p>
           <a:p>
             <a:pPr marL="285750" indent="-285750">
@@ -23708,10 +22445,10 @@
           <p:cNvPr id="115" name="Rectangle 114">
             <a:extLst>
               <a:ext uri="{FF2B5EF4-FFF2-40B4-BE49-F238E27FC236}">
-                <a16:creationId xmlns:a16="http://schemas.microsoft.com/office/drawing/2014/main" xmlns="" id="{B558F58E-93BA-44A3-BCDA-585AFF2E4F3F}"/>
+                <a16:creationId xmlns="" xmlns:a16="http://schemas.microsoft.com/office/drawing/2014/main" id="{B558F58E-93BA-44A3-BCDA-585AFF2E4F3F}"/>
               </a:ext>
               <a:ext uri="{C183D7F6-B498-43B3-948B-1728B52AA6E4}">
-                <adec:decorative xmlns:adec="http://schemas.microsoft.com/office/drawing/2017/decorative" xmlns="" val="1"/>
+                <adec:decorative xmlns="" xmlns:adec="http://schemas.microsoft.com/office/drawing/2017/decorative" val="1"/>
               </a:ext>
             </a:extLst>
           </p:cNvPr>
@@ -23721,7 +22458,7 @@
           <p:nvPr>
             <p:extLst>
               <p:ext uri="{386F3935-93C4-4BCD-93E2-E3B085C9AB24}">
-                <p16:designElem xmlns:p16="http://schemas.microsoft.com/office/powerpoint/2015/main" xmlns="" val="1"/>
+                <p16:designElem xmlns="" xmlns:p16="http://schemas.microsoft.com/office/powerpoint/2015/main" val="1"/>
               </p:ext>
             </p:extLst>
           </p:nvPr>
@@ -23768,10 +22505,10 @@
           <p:cNvPr id="117" name="Straight Arrow Connector 116">
             <a:extLst>
               <a:ext uri="{FF2B5EF4-FFF2-40B4-BE49-F238E27FC236}">
-                <a16:creationId xmlns:a16="http://schemas.microsoft.com/office/drawing/2014/main" xmlns="" id="{BCD0BBC1-A7D4-445D-98AC-95A6A45D8EBB}"/>
+                <a16:creationId xmlns="" xmlns:a16="http://schemas.microsoft.com/office/drawing/2014/main" id="{BCD0BBC1-A7D4-445D-98AC-95A6A45D8EBB}"/>
               </a:ext>
               <a:ext uri="{C183D7F6-B498-43B3-948B-1728B52AA6E4}">
-                <adec:decorative xmlns:adec="http://schemas.microsoft.com/office/drawing/2017/decorative" xmlns="" val="1"/>
+                <adec:decorative xmlns="" xmlns:adec="http://schemas.microsoft.com/office/drawing/2017/decorative" val="1"/>
               </a:ext>
             </a:extLst>
           </p:cNvPr>
@@ -23781,7 +22518,7 @@
           <p:nvPr>
             <p:extLst>
               <p:ext uri="{386F3935-93C4-4BCD-93E2-E3B085C9AB24}">
-                <p16:designElem xmlns:p16="http://schemas.microsoft.com/office/powerpoint/2015/main" xmlns="" val="1"/>
+                <p16:designElem xmlns="" xmlns:p16="http://schemas.microsoft.com/office/powerpoint/2015/main" val="1"/>
               </p:ext>
             </p:extLst>
           </p:nvPr>
@@ -23821,7 +22558,7 @@
           <p:cNvPr id="110" name="Grafik 109">
             <a:extLst>
               <a:ext uri="{FF2B5EF4-FFF2-40B4-BE49-F238E27FC236}">
-                <a16:creationId xmlns:a16="http://schemas.microsoft.com/office/drawing/2014/main" xmlns="" id="{EF74F9AE-6657-4F3E-B73D-942AE06ED09E}"/>
+                <a16:creationId xmlns="" xmlns:a16="http://schemas.microsoft.com/office/drawing/2014/main" id="{EF74F9AE-6657-4F3E-B73D-942AE06ED09E}"/>
               </a:ext>
             </a:extLst>
           </p:cNvPr>
@@ -23927,7 +22664,7 @@
           <p:cNvPr id="2" name="Titel 1">
             <a:extLst>
               <a:ext uri="{FF2B5EF4-FFF2-40B4-BE49-F238E27FC236}">
-                <a16:creationId xmlns:a16="http://schemas.microsoft.com/office/drawing/2014/main" xmlns="" id="{2393025D-41CD-4E54-8421-803CA294757A}"/>
+                <a16:creationId xmlns="" xmlns:a16="http://schemas.microsoft.com/office/drawing/2014/main" id="{2393025D-41CD-4E54-8421-803CA294757A}"/>
               </a:ext>
             </a:extLst>
           </p:cNvPr>
@@ -23965,7 +22702,7 @@
           <p:cNvPr id="111" name="Inhaltsplatzhalter 2">
             <a:extLst>
               <a:ext uri="{FF2B5EF4-FFF2-40B4-BE49-F238E27FC236}">
-                <a16:creationId xmlns:a16="http://schemas.microsoft.com/office/drawing/2014/main" xmlns="" id="{DFED6985-E05C-5442-8D81-240D91D1C65A}"/>
+                <a16:creationId xmlns="" xmlns:a16="http://schemas.microsoft.com/office/drawing/2014/main" id="{DFED6985-E05C-5442-8D81-240D91D1C65A}"/>
               </a:ext>
             </a:extLst>
           </p:cNvPr>
@@ -24160,12 +22897,16 @@
               <a:buAutoNum type="romanUcPeriod"/>
             </a:pPr>
             <a:r>
-              <a:rPr lang="de-DE" dirty="0">
+              <a:rPr lang="de-DE" dirty="0" smtClean="0">
                 <a:ea typeface="Open Sans Light" panose="020B0306030504020204" pitchFamily="34" charset="0"/>
                 <a:cs typeface="Open Sans Light" panose="020B0306030504020204" pitchFamily="34" charset="0"/>
               </a:rPr>
-              <a:t>Ziele</a:t>
+              <a:t>Ziel des Projektes</a:t>
             </a:r>
+            <a:endParaRPr lang="de-DE" dirty="0">
+              <a:ea typeface="Open Sans Light" panose="020B0306030504020204" pitchFamily="34" charset="0"/>
+              <a:cs typeface="Open Sans Light" panose="020B0306030504020204" pitchFamily="34" charset="0"/>
+            </a:endParaRPr>
           </a:p>
           <a:p>
             <a:pPr marL="571500" indent="-571500">
@@ -24294,7 +23035,7 @@
           <p:cNvPr id="113" name="Grafik 112">
             <a:extLst>
               <a:ext uri="{FF2B5EF4-FFF2-40B4-BE49-F238E27FC236}">
-                <a16:creationId xmlns:a16="http://schemas.microsoft.com/office/drawing/2014/main" xmlns="" id="{D5D75B60-54C6-4637-A8C3-A328DF689DE9}"/>
+                <a16:creationId xmlns="" xmlns:a16="http://schemas.microsoft.com/office/drawing/2014/main" id="{D5D75B60-54C6-4637-A8C3-A328DF689DE9}"/>
               </a:ext>
             </a:extLst>
           </p:cNvPr>
@@ -24375,10 +23116,10 @@
           <p:cNvPr id="116" name="Down Arrow 7">
             <a:extLst>
               <a:ext uri="{FF2B5EF4-FFF2-40B4-BE49-F238E27FC236}">
-                <a16:creationId xmlns:a16="http://schemas.microsoft.com/office/drawing/2014/main" xmlns="" id="{B547373F-AF2E-4907-B442-9F902B387FD0}"/>
+                <a16:creationId xmlns="" xmlns:a16="http://schemas.microsoft.com/office/drawing/2014/main" id="{B547373F-AF2E-4907-B442-9F902B387FD0}"/>
               </a:ext>
               <a:ext uri="{C183D7F6-B498-43B3-948B-1728B52AA6E4}">
-                <adec:decorative xmlns:adec="http://schemas.microsoft.com/office/drawing/2017/decorative" xmlns="" val="1"/>
+                <adec:decorative xmlns="" xmlns:adec="http://schemas.microsoft.com/office/drawing/2017/decorative" val="1"/>
               </a:ext>
             </a:extLst>
           </p:cNvPr>
@@ -24388,7 +23129,7 @@
           <p:nvPr>
             <p:extLst>
               <p:ext uri="{386F3935-93C4-4BCD-93E2-E3B085C9AB24}">
-                <p16:designElem xmlns:p16="http://schemas.microsoft.com/office/powerpoint/2015/main" xmlns="" val="1"/>
+                <p16:designElem xmlns="" xmlns:p16="http://schemas.microsoft.com/office/powerpoint/2015/main" val="1"/>
               </p:ext>
             </p:extLst>
           </p:nvPr>
@@ -24444,7 +23185,7 @@
           <p:cNvPr id="111" name="Inhaltsplatzhalter 2">
             <a:extLst>
               <a:ext uri="{FF2B5EF4-FFF2-40B4-BE49-F238E27FC236}">
-                <a16:creationId xmlns:a16="http://schemas.microsoft.com/office/drawing/2014/main" xmlns="" id="{DFED6985-E05C-5442-8D81-240D91D1C65A}"/>
+                <a16:creationId xmlns="" xmlns:a16="http://schemas.microsoft.com/office/drawing/2014/main" id="{DFED6985-E05C-5442-8D81-240D91D1C65A}"/>
               </a:ext>
             </a:extLst>
           </p:cNvPr>
@@ -24647,7 +23388,7 @@
           <p:cNvPr id="15" name="Grafik 14">
             <a:extLst>
               <a:ext uri="{FF2B5EF4-FFF2-40B4-BE49-F238E27FC236}">
-                <a16:creationId xmlns:a16="http://schemas.microsoft.com/office/drawing/2014/main" xmlns="" id="{4E790222-7184-4E46-858C-49DFA0B66F2F}"/>
+                <a16:creationId xmlns="" xmlns:a16="http://schemas.microsoft.com/office/drawing/2014/main" id="{4E790222-7184-4E46-858C-49DFA0B66F2F}"/>
               </a:ext>
             </a:extLst>
           </p:cNvPr>
@@ -24683,7 +23424,7 @@
           <p:cNvPr id="6" name="Titel 5">
             <a:extLst>
               <a:ext uri="{FF2B5EF4-FFF2-40B4-BE49-F238E27FC236}">
-                <a16:creationId xmlns:a16="http://schemas.microsoft.com/office/drawing/2014/main" xmlns="" id="{97D4CC26-A6D9-44D5-BE51-0167991D4E18}"/>
+                <a16:creationId xmlns="" xmlns:a16="http://schemas.microsoft.com/office/drawing/2014/main" id="{97D4CC26-A6D9-44D5-BE51-0167991D4E18}"/>
               </a:ext>
             </a:extLst>
           </p:cNvPr>
@@ -24753,7 +23494,7 @@
           <p:cNvPr id="10" name="Diagramm 9">
             <a:extLst>
               <a:ext uri="{FF2B5EF4-FFF2-40B4-BE49-F238E27FC236}">
-                <a16:creationId xmlns:a16="http://schemas.microsoft.com/office/drawing/2014/main" xmlns="" id="{54999A2C-F4C3-4DB0-AD54-8463A76745D3}"/>
+                <a16:creationId xmlns="" xmlns:a16="http://schemas.microsoft.com/office/drawing/2014/main" id="{54999A2C-F4C3-4DB0-AD54-8463A76745D3}"/>
               </a:ext>
             </a:extLst>
           </p:cNvPr>
@@ -24826,10 +23567,10 @@
           <p:cNvPr id="116" name="Down Arrow 7">
             <a:extLst>
               <a:ext uri="{FF2B5EF4-FFF2-40B4-BE49-F238E27FC236}">
-                <a16:creationId xmlns:a16="http://schemas.microsoft.com/office/drawing/2014/main" xmlns="" id="{B547373F-AF2E-4907-B442-9F902B387FD0}"/>
+                <a16:creationId xmlns="" xmlns:a16="http://schemas.microsoft.com/office/drawing/2014/main" id="{B547373F-AF2E-4907-B442-9F902B387FD0}"/>
               </a:ext>
               <a:ext uri="{C183D7F6-B498-43B3-948B-1728B52AA6E4}">
-                <adec:decorative xmlns:adec="http://schemas.microsoft.com/office/drawing/2017/decorative" xmlns="" val="1"/>
+                <adec:decorative xmlns="" xmlns:adec="http://schemas.microsoft.com/office/drawing/2017/decorative" val="1"/>
               </a:ext>
             </a:extLst>
           </p:cNvPr>
@@ -24839,7 +23580,7 @@
           <p:nvPr>
             <p:extLst>
               <p:ext uri="{386F3935-93C4-4BCD-93E2-E3B085C9AB24}">
-                <p16:designElem xmlns:p16="http://schemas.microsoft.com/office/powerpoint/2015/main" xmlns="" val="1"/>
+                <p16:designElem xmlns="" xmlns:p16="http://schemas.microsoft.com/office/powerpoint/2015/main" val="1"/>
               </p:ext>
             </p:extLst>
           </p:nvPr>
@@ -24895,7 +23636,7 @@
           <p:cNvPr id="111" name="Inhaltsplatzhalter 2">
             <a:extLst>
               <a:ext uri="{FF2B5EF4-FFF2-40B4-BE49-F238E27FC236}">
-                <a16:creationId xmlns:a16="http://schemas.microsoft.com/office/drawing/2014/main" xmlns="" id="{DFED6985-E05C-5442-8D81-240D91D1C65A}"/>
+                <a16:creationId xmlns="" xmlns:a16="http://schemas.microsoft.com/office/drawing/2014/main" id="{DFED6985-E05C-5442-8D81-240D91D1C65A}"/>
               </a:ext>
             </a:extLst>
           </p:cNvPr>
@@ -25098,7 +23839,7 @@
           <p:cNvPr id="15" name="Grafik 14">
             <a:extLst>
               <a:ext uri="{FF2B5EF4-FFF2-40B4-BE49-F238E27FC236}">
-                <a16:creationId xmlns:a16="http://schemas.microsoft.com/office/drawing/2014/main" xmlns="" id="{4E790222-7184-4E46-858C-49DFA0B66F2F}"/>
+                <a16:creationId xmlns="" xmlns:a16="http://schemas.microsoft.com/office/drawing/2014/main" id="{4E790222-7184-4E46-858C-49DFA0B66F2F}"/>
               </a:ext>
             </a:extLst>
           </p:cNvPr>
@@ -25134,7 +23875,7 @@
           <p:cNvPr id="6" name="Titel 5">
             <a:extLst>
               <a:ext uri="{FF2B5EF4-FFF2-40B4-BE49-F238E27FC236}">
-                <a16:creationId xmlns:a16="http://schemas.microsoft.com/office/drawing/2014/main" xmlns="" id="{97D4CC26-A6D9-44D5-BE51-0167991D4E18}"/>
+                <a16:creationId xmlns="" xmlns:a16="http://schemas.microsoft.com/office/drawing/2014/main" id="{97D4CC26-A6D9-44D5-BE51-0167991D4E18}"/>
               </a:ext>
             </a:extLst>
           </p:cNvPr>
@@ -25175,7 +23916,7 @@
           <p:cNvPr id="3" name="Rechteck 2">
             <a:extLst>
               <a:ext uri="{FF2B5EF4-FFF2-40B4-BE49-F238E27FC236}">
-                <a16:creationId xmlns:a16="http://schemas.microsoft.com/office/drawing/2014/main" xmlns="" id="{19A7C4E9-FD6A-48B1-89D8-C2A2C99357D4}"/>
+                <a16:creationId xmlns="" xmlns:a16="http://schemas.microsoft.com/office/drawing/2014/main" id="{19A7C4E9-FD6A-48B1-89D8-C2A2C99357D4}"/>
               </a:ext>
             </a:extLst>
           </p:cNvPr>
@@ -25257,10 +23998,10 @@
           <p:cNvPr id="116" name="Down Arrow 7">
             <a:extLst>
               <a:ext uri="{FF2B5EF4-FFF2-40B4-BE49-F238E27FC236}">
-                <a16:creationId xmlns:a16="http://schemas.microsoft.com/office/drawing/2014/main" xmlns="" id="{B547373F-AF2E-4907-B442-9F902B387FD0}"/>
+                <a16:creationId xmlns="" xmlns:a16="http://schemas.microsoft.com/office/drawing/2014/main" id="{B547373F-AF2E-4907-B442-9F902B387FD0}"/>
               </a:ext>
               <a:ext uri="{C183D7F6-B498-43B3-948B-1728B52AA6E4}">
-                <adec:decorative xmlns:adec="http://schemas.microsoft.com/office/drawing/2017/decorative" xmlns="" val="1"/>
+                <adec:decorative xmlns="" xmlns:adec="http://schemas.microsoft.com/office/drawing/2017/decorative" val="1"/>
               </a:ext>
             </a:extLst>
           </p:cNvPr>
@@ -25270,7 +24011,7 @@
           <p:nvPr>
             <p:extLst>
               <p:ext uri="{386F3935-93C4-4BCD-93E2-E3B085C9AB24}">
-                <p16:designElem xmlns:p16="http://schemas.microsoft.com/office/powerpoint/2015/main" xmlns="" val="1"/>
+                <p16:designElem xmlns="" xmlns:p16="http://schemas.microsoft.com/office/powerpoint/2015/main" val="1"/>
               </p:ext>
             </p:extLst>
           </p:nvPr>
@@ -25326,7 +24067,7 @@
           <p:cNvPr id="111" name="Inhaltsplatzhalter 2">
             <a:extLst>
               <a:ext uri="{FF2B5EF4-FFF2-40B4-BE49-F238E27FC236}">
-                <a16:creationId xmlns:a16="http://schemas.microsoft.com/office/drawing/2014/main" xmlns="" id="{DFED6985-E05C-5442-8D81-240D91D1C65A}"/>
+                <a16:creationId xmlns="" xmlns:a16="http://schemas.microsoft.com/office/drawing/2014/main" id="{DFED6985-E05C-5442-8D81-240D91D1C65A}"/>
               </a:ext>
             </a:extLst>
           </p:cNvPr>
@@ -25529,7 +24270,7 @@
           <p:cNvPr id="7" name="Grafik 6">
             <a:extLst>
               <a:ext uri="{FF2B5EF4-FFF2-40B4-BE49-F238E27FC236}">
-                <a16:creationId xmlns:a16="http://schemas.microsoft.com/office/drawing/2014/main" xmlns="" id="{02DD65C2-4B20-4D5C-AFF8-12C63A2AF6F5}"/>
+                <a16:creationId xmlns="" xmlns:a16="http://schemas.microsoft.com/office/drawing/2014/main" id="{02DD65C2-4B20-4D5C-AFF8-12C63A2AF6F5}"/>
               </a:ext>
             </a:extLst>
           </p:cNvPr>
@@ -25565,7 +24306,7 @@
           <p:cNvPr id="6" name="Titel 5">
             <a:extLst>
               <a:ext uri="{FF2B5EF4-FFF2-40B4-BE49-F238E27FC236}">
-                <a16:creationId xmlns:a16="http://schemas.microsoft.com/office/drawing/2014/main" xmlns="" id="{97D4CC26-A6D9-44D5-BE51-0167991D4E18}"/>
+                <a16:creationId xmlns="" xmlns:a16="http://schemas.microsoft.com/office/drawing/2014/main" id="{97D4CC26-A6D9-44D5-BE51-0167991D4E18}"/>
               </a:ext>
             </a:extLst>
           </p:cNvPr>
@@ -25637,7 +24378,7 @@
           <p:cNvPr id="8" name="Diagramm 7">
             <a:extLst>
               <a:ext uri="{FF2B5EF4-FFF2-40B4-BE49-F238E27FC236}">
-                <a16:creationId xmlns:a16="http://schemas.microsoft.com/office/drawing/2014/main" xmlns="" id="{2BCA650B-8BCC-4BDE-BF12-505EF24ECB0A}"/>
+                <a16:creationId xmlns="" xmlns:a16="http://schemas.microsoft.com/office/drawing/2014/main" id="{2BCA650B-8BCC-4BDE-BF12-505EF24ECB0A}"/>
               </a:ext>
             </a:extLst>
           </p:cNvPr>
@@ -25665,7 +24406,7 @@
           <p:cNvPr id="9" name="Textfeld 8">
             <a:extLst>
               <a:ext uri="{FF2B5EF4-FFF2-40B4-BE49-F238E27FC236}">
-                <a16:creationId xmlns:a16="http://schemas.microsoft.com/office/drawing/2014/main" xmlns="" id="{3AD15615-715B-4D9F-94F6-D4663A63AB4C}"/>
+                <a16:creationId xmlns="" xmlns:a16="http://schemas.microsoft.com/office/drawing/2014/main" id="{3AD15615-715B-4D9F-94F6-D4663A63AB4C}"/>
               </a:ext>
             </a:extLst>
           </p:cNvPr>
@@ -25728,7 +24469,7 @@
           <p:cNvPr id="13" name="Textfeld 12">
             <a:extLst>
               <a:ext uri="{FF2B5EF4-FFF2-40B4-BE49-F238E27FC236}">
-                <a16:creationId xmlns:a16="http://schemas.microsoft.com/office/drawing/2014/main" xmlns="" id="{591888E5-B5CC-424E-A07C-1BB2DB7CAF62}"/>
+                <a16:creationId xmlns="" xmlns:a16="http://schemas.microsoft.com/office/drawing/2014/main" id="{591888E5-B5CC-424E-A07C-1BB2DB7CAF62}"/>
               </a:ext>
             </a:extLst>
           </p:cNvPr>
@@ -25797,7 +24538,7 @@
           <p:cNvPr id="14" name="Textfeld 13">
             <a:extLst>
               <a:ext uri="{FF2B5EF4-FFF2-40B4-BE49-F238E27FC236}">
-                <a16:creationId xmlns:a16="http://schemas.microsoft.com/office/drawing/2014/main" xmlns="" id="{D39FEB12-8483-43CD-85D2-932A3800ADF2}"/>
+                <a16:creationId xmlns="" xmlns:a16="http://schemas.microsoft.com/office/drawing/2014/main" id="{D39FEB12-8483-43CD-85D2-932A3800ADF2}"/>
               </a:ext>
             </a:extLst>
           </p:cNvPr>
@@ -25905,10 +24646,10 @@
           <p:cNvPr id="8" name="Down Arrow 7">
             <a:extLst>
               <a:ext uri="{FF2B5EF4-FFF2-40B4-BE49-F238E27FC236}">
-                <a16:creationId xmlns:a16="http://schemas.microsoft.com/office/drawing/2014/main" xmlns="" id="{B547373F-AF2E-4907-B442-9F902B387FD0}"/>
+                <a16:creationId xmlns="" xmlns:a16="http://schemas.microsoft.com/office/drawing/2014/main" id="{B547373F-AF2E-4907-B442-9F902B387FD0}"/>
               </a:ext>
               <a:ext uri="{C183D7F6-B498-43B3-948B-1728B52AA6E4}">
-                <adec:decorative xmlns:adec="http://schemas.microsoft.com/office/drawing/2017/decorative" xmlns="" val="1"/>
+                <adec:decorative xmlns="" xmlns:adec="http://schemas.microsoft.com/office/drawing/2017/decorative" val="1"/>
               </a:ext>
             </a:extLst>
           </p:cNvPr>
@@ -25918,7 +24659,7 @@
           <p:nvPr>
             <p:extLst>
               <p:ext uri="{386F3935-93C4-4BCD-93E2-E3B085C9AB24}">
-                <p16:designElem xmlns:p16="http://schemas.microsoft.com/office/powerpoint/2015/main" xmlns="" val="1"/>
+                <p16:designElem xmlns="" xmlns:p16="http://schemas.microsoft.com/office/powerpoint/2015/main" val="1"/>
               </p:ext>
             </p:extLst>
           </p:nvPr>
@@ -25974,7 +24715,7 @@
           <p:cNvPr id="3" name="Grafik 2">
             <a:extLst>
               <a:ext uri="{FF2B5EF4-FFF2-40B4-BE49-F238E27FC236}">
-                <a16:creationId xmlns:a16="http://schemas.microsoft.com/office/drawing/2014/main" xmlns="" id="{8B863EA1-EC9E-4D18-8114-CAE5B0861FB0}"/>
+                <a16:creationId xmlns="" xmlns:a16="http://schemas.microsoft.com/office/drawing/2014/main" id="{8B863EA1-EC9E-4D18-8114-CAE5B0861FB0}"/>
               </a:ext>
             </a:extLst>
           </p:cNvPr>
@@ -26010,7 +24751,7 @@
           <p:cNvPr id="2" name="Titel 1">
             <a:extLst>
               <a:ext uri="{FF2B5EF4-FFF2-40B4-BE49-F238E27FC236}">
-                <a16:creationId xmlns:a16="http://schemas.microsoft.com/office/drawing/2014/main" xmlns="" id="{2739BE3E-CAB9-4698-9CD4-9384CBCC5931}"/>
+                <a16:creationId xmlns="" xmlns:a16="http://schemas.microsoft.com/office/drawing/2014/main" id="{2739BE3E-CAB9-4698-9CD4-9384CBCC5931}"/>
               </a:ext>
             </a:extLst>
           </p:cNvPr>
@@ -26051,7 +24792,7 @@
           <p:cNvPr id="5" name="Grafik 4">
             <a:extLst>
               <a:ext uri="{FF2B5EF4-FFF2-40B4-BE49-F238E27FC236}">
-                <a16:creationId xmlns:a16="http://schemas.microsoft.com/office/drawing/2014/main" xmlns="" id="{32ECBE6A-7A06-4927-BCCF-8C3D8BF52C8D}"/>
+                <a16:creationId xmlns="" xmlns:a16="http://schemas.microsoft.com/office/drawing/2014/main" id="{32ECBE6A-7A06-4927-BCCF-8C3D8BF52C8D}"/>
               </a:ext>
             </a:extLst>
           </p:cNvPr>
@@ -26087,7 +24828,7 @@
           <p:cNvPr id="7" name="Grafik 6">
             <a:extLst>
               <a:ext uri="{FF2B5EF4-FFF2-40B4-BE49-F238E27FC236}">
-                <a16:creationId xmlns:a16="http://schemas.microsoft.com/office/drawing/2014/main" xmlns="" id="{8F7E4830-E8F6-44F8-9122-299794812174}"/>
+                <a16:creationId xmlns="" xmlns:a16="http://schemas.microsoft.com/office/drawing/2014/main" id="{8F7E4830-E8F6-44F8-9122-299794812174}"/>
               </a:ext>
             </a:extLst>
           </p:cNvPr>
@@ -26123,7 +24864,7 @@
           <p:cNvPr id="10" name="Grafik 9">
             <a:extLst>
               <a:ext uri="{FF2B5EF4-FFF2-40B4-BE49-F238E27FC236}">
-                <a16:creationId xmlns:a16="http://schemas.microsoft.com/office/drawing/2014/main" xmlns="" id="{5178916D-806C-47BA-89DC-539BF3BF4EDA}"/>
+                <a16:creationId xmlns="" xmlns:a16="http://schemas.microsoft.com/office/drawing/2014/main" id="{5178916D-806C-47BA-89DC-539BF3BF4EDA}"/>
               </a:ext>
             </a:extLst>
           </p:cNvPr>
@@ -26159,7 +24900,7 @@
           <p:cNvPr id="12" name="Grafik 11">
             <a:extLst>
               <a:ext uri="{FF2B5EF4-FFF2-40B4-BE49-F238E27FC236}">
-                <a16:creationId xmlns:a16="http://schemas.microsoft.com/office/drawing/2014/main" xmlns="" id="{FB91FBAE-C7A1-458C-974F-7F81AA8FF59E}"/>
+                <a16:creationId xmlns="" xmlns:a16="http://schemas.microsoft.com/office/drawing/2014/main" id="{FB91FBAE-C7A1-458C-974F-7F81AA8FF59E}"/>
               </a:ext>
             </a:extLst>
           </p:cNvPr>
@@ -26195,7 +24936,7 @@
           <p:cNvPr id="14" name="Grafik 13">
             <a:extLst>
               <a:ext uri="{FF2B5EF4-FFF2-40B4-BE49-F238E27FC236}">
-                <a16:creationId xmlns:a16="http://schemas.microsoft.com/office/drawing/2014/main" xmlns="" id="{56B5F0AE-F5C8-41E2-8A7B-0500501AA60D}"/>
+                <a16:creationId xmlns="" xmlns:a16="http://schemas.microsoft.com/office/drawing/2014/main" id="{56B5F0AE-F5C8-41E2-8A7B-0500501AA60D}"/>
               </a:ext>
             </a:extLst>
           </p:cNvPr>
@@ -26231,7 +24972,7 @@
           <p:cNvPr id="21" name="Grafik 20">
             <a:extLst>
               <a:ext uri="{FF2B5EF4-FFF2-40B4-BE49-F238E27FC236}">
-                <a16:creationId xmlns:a16="http://schemas.microsoft.com/office/drawing/2014/main" xmlns="" id="{56BAACDF-55AC-4B52-9D4B-A127210D7558}"/>
+                <a16:creationId xmlns="" xmlns:a16="http://schemas.microsoft.com/office/drawing/2014/main" id="{56BAACDF-55AC-4B52-9D4B-A127210D7558}"/>
               </a:ext>
             </a:extLst>
           </p:cNvPr>
@@ -26267,7 +25008,7 @@
           <p:cNvPr id="23" name="Grafik 22">
             <a:extLst>
               <a:ext uri="{FF2B5EF4-FFF2-40B4-BE49-F238E27FC236}">
-                <a16:creationId xmlns:a16="http://schemas.microsoft.com/office/drawing/2014/main" xmlns="" id="{2E393EE1-69FA-453E-99C1-EB0A7F376423}"/>
+                <a16:creationId xmlns="" xmlns:a16="http://schemas.microsoft.com/office/drawing/2014/main" id="{2E393EE1-69FA-453E-99C1-EB0A7F376423}"/>
               </a:ext>
             </a:extLst>
           </p:cNvPr>
@@ -26303,7 +25044,7 @@
           <p:cNvPr id="26" name="Grafik 25">
             <a:extLst>
               <a:ext uri="{FF2B5EF4-FFF2-40B4-BE49-F238E27FC236}">
-                <a16:creationId xmlns:a16="http://schemas.microsoft.com/office/drawing/2014/main" xmlns="" id="{8DD9CBBF-BFB2-4104-BF73-DEDFA863E61F}"/>
+                <a16:creationId xmlns="" xmlns:a16="http://schemas.microsoft.com/office/drawing/2014/main" id="{8DD9CBBF-BFB2-4104-BF73-DEDFA863E61F}"/>
               </a:ext>
             </a:extLst>
           </p:cNvPr>
@@ -26319,7 +25060,7 @@
                 <a14:useLocalDpi xmlns:a14="http://schemas.microsoft.com/office/drawing/2010/main" val="0"/>
               </a:ext>
               <a:ext uri="{96DAC541-7B7A-43D3-8B79-37D633B846F1}">
-                <asvg:svgBlip xmlns:asvg="http://schemas.microsoft.com/office/drawing/2016/SVG/main" xmlns="" r:embed="rId12"/>
+                <asvg:svgBlip xmlns="" xmlns:asvg="http://schemas.microsoft.com/office/drawing/2016/SVG/main" r:embed="rId12"/>
               </a:ext>
             </a:extLst>
           </a:blip>
@@ -26342,7 +25083,7 @@
           <p:cNvPr id="27" name="Grafik 26">
             <a:extLst>
               <a:ext uri="{FF2B5EF4-FFF2-40B4-BE49-F238E27FC236}">
-                <a16:creationId xmlns:a16="http://schemas.microsoft.com/office/drawing/2014/main" xmlns="" id="{2164046B-0C86-49B3-9FDB-3FD130BAB91E}"/>
+                <a16:creationId xmlns="" xmlns:a16="http://schemas.microsoft.com/office/drawing/2014/main" id="{2164046B-0C86-49B3-9FDB-3FD130BAB91E}"/>
               </a:ext>
             </a:extLst>
           </p:cNvPr>
@@ -26423,10 +25164,10 @@
           <p:cNvPr id="18" name="Down Arrow 7">
             <a:extLst>
               <a:ext uri="{FF2B5EF4-FFF2-40B4-BE49-F238E27FC236}">
-                <a16:creationId xmlns:a16="http://schemas.microsoft.com/office/drawing/2014/main" xmlns="" id="{B547373F-AF2E-4907-B442-9F902B387FD0}"/>
+                <a16:creationId xmlns="" xmlns:a16="http://schemas.microsoft.com/office/drawing/2014/main" id="{B547373F-AF2E-4907-B442-9F902B387FD0}"/>
               </a:ext>
               <a:ext uri="{C183D7F6-B498-43B3-948B-1728B52AA6E4}">
-                <adec:decorative xmlns:adec="http://schemas.microsoft.com/office/drawing/2017/decorative" xmlns="" val="1"/>
+                <adec:decorative xmlns="" xmlns:adec="http://schemas.microsoft.com/office/drawing/2017/decorative" val="1"/>
               </a:ext>
             </a:extLst>
           </p:cNvPr>
@@ -26436,7 +25177,7 @@
           <p:nvPr>
             <p:extLst>
               <p:ext uri="{386F3935-93C4-4BCD-93E2-E3B085C9AB24}">
-                <p16:designElem xmlns:p16="http://schemas.microsoft.com/office/powerpoint/2015/main" xmlns="" val="1"/>
+                <p16:designElem xmlns="" xmlns:p16="http://schemas.microsoft.com/office/powerpoint/2015/main" val="1"/>
               </p:ext>
             </p:extLst>
           </p:nvPr>
@@ -26492,7 +25233,7 @@
           <p:cNvPr id="13" name="Grafik 12">
             <a:extLst>
               <a:ext uri="{FF2B5EF4-FFF2-40B4-BE49-F238E27FC236}">
-                <a16:creationId xmlns:a16="http://schemas.microsoft.com/office/drawing/2014/main" xmlns="" id="{02F1C736-63AE-4F60-8F61-A3513E043B90}"/>
+                <a16:creationId xmlns="" xmlns:a16="http://schemas.microsoft.com/office/drawing/2014/main" id="{02F1C736-63AE-4F60-8F61-A3513E043B90}"/>
               </a:ext>
             </a:extLst>
           </p:cNvPr>
@@ -26528,7 +25269,7 @@
           <p:cNvPr id="2" name="Titel 1">
             <a:extLst>
               <a:ext uri="{FF2B5EF4-FFF2-40B4-BE49-F238E27FC236}">
-                <a16:creationId xmlns:a16="http://schemas.microsoft.com/office/drawing/2014/main" xmlns="" id="{2739BE3E-CAB9-4698-9CD4-9384CBCC5931}"/>
+                <a16:creationId xmlns="" xmlns:a16="http://schemas.microsoft.com/office/drawing/2014/main" id="{2739BE3E-CAB9-4698-9CD4-9384CBCC5931}"/>
               </a:ext>
             </a:extLst>
           </p:cNvPr>
@@ -26569,7 +25310,7 @@
           <p:cNvPr id="15" name="Inhaltsplatzhalter 2">
             <a:extLst>
               <a:ext uri="{FF2B5EF4-FFF2-40B4-BE49-F238E27FC236}">
-                <a16:creationId xmlns:a16="http://schemas.microsoft.com/office/drawing/2014/main" xmlns="" id="{89328C25-18F8-8142-A5F6-5B72AD373859}"/>
+                <a16:creationId xmlns="" xmlns:a16="http://schemas.microsoft.com/office/drawing/2014/main" id="{89328C25-18F8-8142-A5F6-5B72AD373859}"/>
               </a:ext>
             </a:extLst>
           </p:cNvPr>
@@ -26777,7 +25518,7 @@
           <p:cNvPr id="16" name="Inhaltsplatzhalter 3">
             <a:extLst>
               <a:ext uri="{FF2B5EF4-FFF2-40B4-BE49-F238E27FC236}">
-                <a16:creationId xmlns:a16="http://schemas.microsoft.com/office/drawing/2014/main" xmlns="" id="{FDF25EE8-13FA-EE43-A5CA-42A794804D4D}"/>
+                <a16:creationId xmlns="" xmlns:a16="http://schemas.microsoft.com/office/drawing/2014/main" id="{FDF25EE8-13FA-EE43-A5CA-42A794804D4D}"/>
               </a:ext>
             </a:extLst>
           </p:cNvPr>
@@ -26986,7 +25727,7 @@
           <p:cNvPr id="17" name="Grafik 16">
             <a:extLst>
               <a:ext uri="{FF2B5EF4-FFF2-40B4-BE49-F238E27FC236}">
-                <a16:creationId xmlns:a16="http://schemas.microsoft.com/office/drawing/2014/main" xmlns="" id="{A29152AD-7686-425C-BF18-79A25701FB37}"/>
+                <a16:creationId xmlns="" xmlns:a16="http://schemas.microsoft.com/office/drawing/2014/main" id="{A29152AD-7686-425C-BF18-79A25701FB37}"/>
               </a:ext>
             </a:extLst>
           </p:cNvPr>
@@ -27022,7 +25763,7 @@
           <p:cNvPr id="6" name="Grafik 5">
             <a:extLst>
               <a:ext uri="{FF2B5EF4-FFF2-40B4-BE49-F238E27FC236}">
-                <a16:creationId xmlns:a16="http://schemas.microsoft.com/office/drawing/2014/main" xmlns="" id="{465EA0E6-FE78-41E6-86C3-442BF8FEEA3C}"/>
+                <a16:creationId xmlns="" xmlns:a16="http://schemas.microsoft.com/office/drawing/2014/main" id="{465EA0E6-FE78-41E6-86C3-442BF8FEEA3C}"/>
               </a:ext>
             </a:extLst>
           </p:cNvPr>
@@ -27058,7 +25799,7 @@
           <p:cNvPr id="11" name="Gerader Verbinder 10">
             <a:extLst>
               <a:ext uri="{FF2B5EF4-FFF2-40B4-BE49-F238E27FC236}">
-                <a16:creationId xmlns:a16="http://schemas.microsoft.com/office/drawing/2014/main" xmlns="" id="{A1DDB840-F678-45E8-92E4-4139E5DAAEBB}"/>
+                <a16:creationId xmlns="" xmlns:a16="http://schemas.microsoft.com/office/drawing/2014/main" id="{A1DDB840-F678-45E8-92E4-4139E5DAAEBB}"/>
               </a:ext>
             </a:extLst>
           </p:cNvPr>
@@ -27101,7 +25842,7 @@
           <p:cNvPr id="22" name="Gerader Verbinder 21">
             <a:extLst>
               <a:ext uri="{FF2B5EF4-FFF2-40B4-BE49-F238E27FC236}">
-                <a16:creationId xmlns:a16="http://schemas.microsoft.com/office/drawing/2014/main" xmlns="" id="{CA78EB08-02B4-4F2A-9FD1-844B8C72D4FF}"/>
+                <a16:creationId xmlns="" xmlns:a16="http://schemas.microsoft.com/office/drawing/2014/main" id="{CA78EB08-02B4-4F2A-9FD1-844B8C72D4FF}"/>
               </a:ext>
             </a:extLst>
           </p:cNvPr>
@@ -27145,7 +25886,7 @@
           <p:cNvPr id="20" name="Textfeld 19">
             <a:extLst>
               <a:ext uri="{FF2B5EF4-FFF2-40B4-BE49-F238E27FC236}">
-                <a16:creationId xmlns:a16="http://schemas.microsoft.com/office/drawing/2014/main" xmlns="" id="{4872F49E-A9FC-417D-BCDD-3EB35A157173}"/>
+                <a16:creationId xmlns="" xmlns:a16="http://schemas.microsoft.com/office/drawing/2014/main" id="{4872F49E-A9FC-417D-BCDD-3EB35A157173}"/>
               </a:ext>
             </a:extLst>
           </p:cNvPr>
@@ -27215,7 +25956,7 @@
           <p:cNvPr id="24" name="Textfeld 23">
             <a:extLst>
               <a:ext uri="{FF2B5EF4-FFF2-40B4-BE49-F238E27FC236}">
-                <a16:creationId xmlns:a16="http://schemas.microsoft.com/office/drawing/2014/main" xmlns="" id="{AEF824A0-5E1F-4DDB-9FBA-CE70BED6837E}"/>
+                <a16:creationId xmlns="" xmlns:a16="http://schemas.microsoft.com/office/drawing/2014/main" id="{AEF824A0-5E1F-4DDB-9FBA-CE70BED6837E}"/>
               </a:ext>
             </a:extLst>
           </p:cNvPr>
@@ -27265,7 +26006,7 @@
           <p:cNvPr id="25" name="Textfeld 24">
             <a:extLst>
               <a:ext uri="{FF2B5EF4-FFF2-40B4-BE49-F238E27FC236}">
-                <a16:creationId xmlns:a16="http://schemas.microsoft.com/office/drawing/2014/main" xmlns="" id="{763B1073-583C-4391-8BB7-4A2F84DE7CF5}"/>
+                <a16:creationId xmlns="" xmlns:a16="http://schemas.microsoft.com/office/drawing/2014/main" id="{763B1073-583C-4391-8BB7-4A2F84DE7CF5}"/>
               </a:ext>
             </a:extLst>
           </p:cNvPr>
@@ -27321,7 +26062,7 @@
           <p:cNvPr id="26" name="Textfeld 25">
             <a:extLst>
               <a:ext uri="{FF2B5EF4-FFF2-40B4-BE49-F238E27FC236}">
-                <a16:creationId xmlns:a16="http://schemas.microsoft.com/office/drawing/2014/main" xmlns="" id="{396AF99D-6D7B-4039-A2F9-1632A711FFC7}"/>
+                <a16:creationId xmlns="" xmlns:a16="http://schemas.microsoft.com/office/drawing/2014/main" id="{396AF99D-6D7B-4039-A2F9-1632A711FFC7}"/>
               </a:ext>
             </a:extLst>
           </p:cNvPr>
@@ -27370,11 +26111,7 @@
             </a:pPr>
             <a:r>
               <a:rPr lang="de-DE" dirty="0" smtClean="0"/>
-              <a:t>So gut </a:t>
-            </a:r>
-            <a:r>
-              <a:rPr lang="de-DE" dirty="0" smtClean="0"/>
-              <a:t>wie keine Erfahrung</a:t>
+              <a:t>So gut wie keine Erfahrung</a:t>
             </a:r>
             <a:endParaRPr lang="de-DE" dirty="0"/>
           </a:p>
@@ -27433,10 +26170,10 @@
           <p:cNvPr id="40" name="Freeform: Shape 39">
             <a:extLst>
               <a:ext uri="{FF2B5EF4-FFF2-40B4-BE49-F238E27FC236}">
-                <a16:creationId xmlns:a16="http://schemas.microsoft.com/office/drawing/2014/main" xmlns="" id="{E26B9EF5-5D92-4AC7-BC55-FC5C4C98ED4C}"/>
+                <a16:creationId xmlns="" xmlns:a16="http://schemas.microsoft.com/office/drawing/2014/main" id="{E26B9EF5-5D92-4AC7-BC55-FC5C4C98ED4C}"/>
               </a:ext>
               <a:ext uri="{C183D7F6-B498-43B3-948B-1728B52AA6E4}">
-                <adec:decorative xmlns:adec="http://schemas.microsoft.com/office/drawing/2017/decorative" xmlns="" val="1"/>
+                <adec:decorative xmlns="" xmlns:adec="http://schemas.microsoft.com/office/drawing/2017/decorative" val="1"/>
               </a:ext>
             </a:extLst>
           </p:cNvPr>
@@ -27446,7 +26183,7 @@
           <p:nvPr>
             <p:extLst>
               <p:ext uri="{386F3935-93C4-4BCD-93E2-E3B085C9AB24}">
-                <p16:designElem xmlns:p16="http://schemas.microsoft.com/office/powerpoint/2015/main" xmlns="" val="1"/>
+                <p16:designElem xmlns="" xmlns:p16="http://schemas.microsoft.com/office/powerpoint/2015/main" val="1"/>
               </p:ext>
             </p:extLst>
           </p:nvPr>
@@ -27602,10 +26339,10 @@
           <p:cNvPr id="42" name="Freeform: Shape 41">
             <a:extLst>
               <a:ext uri="{FF2B5EF4-FFF2-40B4-BE49-F238E27FC236}">
-                <a16:creationId xmlns:a16="http://schemas.microsoft.com/office/drawing/2014/main" xmlns="" id="{F05C5575-0F07-43D0-AE78-81EAA8E67152}"/>
+                <a16:creationId xmlns="" xmlns:a16="http://schemas.microsoft.com/office/drawing/2014/main" id="{F05C5575-0F07-43D0-AE78-81EAA8E67152}"/>
               </a:ext>
               <a:ext uri="{C183D7F6-B498-43B3-948B-1728B52AA6E4}">
-                <adec:decorative xmlns:adec="http://schemas.microsoft.com/office/drawing/2017/decorative" xmlns="" val="1"/>
+                <adec:decorative xmlns="" xmlns:adec="http://schemas.microsoft.com/office/drawing/2017/decorative" val="1"/>
               </a:ext>
             </a:extLst>
           </p:cNvPr>
@@ -27615,7 +26352,7 @@
           <p:nvPr>
             <p:extLst>
               <p:ext uri="{386F3935-93C4-4BCD-93E2-E3B085C9AB24}">
-                <p16:designElem xmlns:p16="http://schemas.microsoft.com/office/powerpoint/2015/main" xmlns="" val="1"/>
+                <p16:designElem xmlns="" xmlns:p16="http://schemas.microsoft.com/office/powerpoint/2015/main" val="1"/>
               </p:ext>
             </p:extLst>
           </p:nvPr>
@@ -27777,10 +26514,10 @@
           <p:cNvPr id="44" name="Freeform: Shape 43">
             <a:extLst>
               <a:ext uri="{FF2B5EF4-FFF2-40B4-BE49-F238E27FC236}">
-                <a16:creationId xmlns:a16="http://schemas.microsoft.com/office/drawing/2014/main" xmlns="" id="{CED520D6-8B57-4047-BB5F-2BE1017B2A0D}"/>
+                <a16:creationId xmlns="" xmlns:a16="http://schemas.microsoft.com/office/drawing/2014/main" id="{CED520D6-8B57-4047-BB5F-2BE1017B2A0D}"/>
               </a:ext>
               <a:ext uri="{C183D7F6-B498-43B3-948B-1728B52AA6E4}">
-                <adec:decorative xmlns:adec="http://schemas.microsoft.com/office/drawing/2017/decorative" xmlns="" val="1"/>
+                <adec:decorative xmlns="" xmlns:adec="http://schemas.microsoft.com/office/drawing/2017/decorative" val="1"/>
               </a:ext>
             </a:extLst>
           </p:cNvPr>
@@ -27790,7 +26527,7 @@
           <p:nvPr>
             <p:extLst>
               <p:ext uri="{386F3935-93C4-4BCD-93E2-E3B085C9AB24}">
-                <p16:designElem xmlns:p16="http://schemas.microsoft.com/office/powerpoint/2015/main" xmlns="" val="1"/>
+                <p16:designElem xmlns="" xmlns:p16="http://schemas.microsoft.com/office/powerpoint/2015/main" val="1"/>
               </p:ext>
             </p:extLst>
           </p:nvPr>
@@ -27944,10 +26681,10 @@
           <p:cNvPr id="46" name="Freeform: Shape 45">
             <a:extLst>
               <a:ext uri="{FF2B5EF4-FFF2-40B4-BE49-F238E27FC236}">
-                <a16:creationId xmlns:a16="http://schemas.microsoft.com/office/drawing/2014/main" xmlns="" id="{C7583227-44AB-4ECD-AD51-9EC7A5A3E5F1}"/>
+                <a16:creationId xmlns="" xmlns:a16="http://schemas.microsoft.com/office/drawing/2014/main" id="{C7583227-44AB-4ECD-AD51-9EC7A5A3E5F1}"/>
               </a:ext>
               <a:ext uri="{C183D7F6-B498-43B3-948B-1728B52AA6E4}">
-                <adec:decorative xmlns:adec="http://schemas.microsoft.com/office/drawing/2017/decorative" xmlns="" val="1"/>
+                <adec:decorative xmlns="" xmlns:adec="http://schemas.microsoft.com/office/drawing/2017/decorative" val="1"/>
               </a:ext>
             </a:extLst>
           </p:cNvPr>
@@ -27957,7 +26694,7 @@
           <p:nvPr>
             <p:extLst>
               <p:ext uri="{386F3935-93C4-4BCD-93E2-E3B085C9AB24}">
-                <p16:designElem xmlns:p16="http://schemas.microsoft.com/office/powerpoint/2015/main" xmlns="" val="1"/>
+                <p16:designElem xmlns="" xmlns:p16="http://schemas.microsoft.com/office/powerpoint/2015/main" val="1"/>
               </p:ext>
             </p:extLst>
           </p:nvPr>
@@ -28117,7 +26854,7 @@
           <p:cNvPr id="27" name="Grafik 26">
             <a:extLst>
               <a:ext uri="{FF2B5EF4-FFF2-40B4-BE49-F238E27FC236}">
-                <a16:creationId xmlns:a16="http://schemas.microsoft.com/office/drawing/2014/main" xmlns="" id="{B4331BEA-8EFC-4054-815F-612B45013652}"/>
+                <a16:creationId xmlns="" xmlns:a16="http://schemas.microsoft.com/office/drawing/2014/main" id="{B4331BEA-8EFC-4054-815F-612B45013652}"/>
               </a:ext>
             </a:extLst>
           </p:cNvPr>
@@ -28152,7 +26889,7 @@
           <p:cNvPr id="35" name="Grafik 34">
             <a:extLst>
               <a:ext uri="{FF2B5EF4-FFF2-40B4-BE49-F238E27FC236}">
-                <a16:creationId xmlns:a16="http://schemas.microsoft.com/office/drawing/2014/main" xmlns="" id="{B47371F8-6314-47CB-B661-FC1E02F2A477}"/>
+                <a16:creationId xmlns="" xmlns:a16="http://schemas.microsoft.com/office/drawing/2014/main" id="{B47371F8-6314-47CB-B661-FC1E02F2A477}"/>
               </a:ext>
             </a:extLst>
           </p:cNvPr>
@@ -28188,7 +26925,7 @@
           <p:cNvPr id="3" name="Grafik 2">
             <a:extLst>
               <a:ext uri="{FF2B5EF4-FFF2-40B4-BE49-F238E27FC236}">
-                <a16:creationId xmlns:a16="http://schemas.microsoft.com/office/drawing/2014/main" xmlns="" id="{407975D7-572E-4F68-B98D-313E5A7CEBF1}"/>
+                <a16:creationId xmlns="" xmlns:a16="http://schemas.microsoft.com/office/drawing/2014/main" id="{407975D7-572E-4F68-B98D-313E5A7CEBF1}"/>
               </a:ext>
             </a:extLst>
           </p:cNvPr>
@@ -28224,7 +26961,7 @@
           <p:cNvPr id="2" name="Titel 1">
             <a:extLst>
               <a:ext uri="{FF2B5EF4-FFF2-40B4-BE49-F238E27FC236}">
-                <a16:creationId xmlns:a16="http://schemas.microsoft.com/office/drawing/2014/main" xmlns="" id="{8D58B844-212D-4BF7-8322-79AFF8D0780A}"/>
+                <a16:creationId xmlns="" xmlns:a16="http://schemas.microsoft.com/office/drawing/2014/main" id="{8D58B844-212D-4BF7-8322-79AFF8D0780A}"/>
               </a:ext>
             </a:extLst>
           </p:cNvPr>
@@ -28315,10 +27052,10 @@
           <p:cNvPr id="11" name="Freeform: Shape 10">
             <a:extLst>
               <a:ext uri="{FF2B5EF4-FFF2-40B4-BE49-F238E27FC236}">
-                <a16:creationId xmlns:a16="http://schemas.microsoft.com/office/drawing/2014/main" xmlns="" id="{31103AB2-C090-458F-B752-294F23AFA8AD}"/>
+                <a16:creationId xmlns="" xmlns:a16="http://schemas.microsoft.com/office/drawing/2014/main" id="{31103AB2-C090-458F-B752-294F23AFA8AD}"/>
               </a:ext>
               <a:ext uri="{C183D7F6-B498-43B3-948B-1728B52AA6E4}">
-                <adec:decorative xmlns:adec="http://schemas.microsoft.com/office/drawing/2017/decorative" xmlns="" val="1"/>
+                <adec:decorative xmlns="" xmlns:adec="http://schemas.microsoft.com/office/drawing/2017/decorative" val="1"/>
               </a:ext>
             </a:extLst>
           </p:cNvPr>
@@ -28328,7 +27065,7 @@
           <p:nvPr>
             <p:extLst>
               <p:ext uri="{386F3935-93C4-4BCD-93E2-E3B085C9AB24}">
-                <p16:designElem xmlns:p16="http://schemas.microsoft.com/office/powerpoint/2015/main" xmlns="" val="1"/>
+                <p16:designElem xmlns="" xmlns:p16="http://schemas.microsoft.com/office/powerpoint/2015/main" val="1"/>
               </p:ext>
             </p:extLst>
           </p:nvPr>
@@ -28484,10 +27221,10 @@
           <p:cNvPr id="13" name="Freeform: Shape 12">
             <a:extLst>
               <a:ext uri="{FF2B5EF4-FFF2-40B4-BE49-F238E27FC236}">
-                <a16:creationId xmlns:a16="http://schemas.microsoft.com/office/drawing/2014/main" xmlns="" id="{83D471F3-782A-4BA1-9CAB-FF5CDF0A75E0}"/>
+                <a16:creationId xmlns="" xmlns:a16="http://schemas.microsoft.com/office/drawing/2014/main" id="{83D471F3-782A-4BA1-9CAB-FF5CDF0A75E0}"/>
               </a:ext>
               <a:ext uri="{C183D7F6-B498-43B3-948B-1728B52AA6E4}">
-                <adec:decorative xmlns:adec="http://schemas.microsoft.com/office/drawing/2017/decorative" xmlns="" val="1"/>
+                <adec:decorative xmlns="" xmlns:adec="http://schemas.microsoft.com/office/drawing/2017/decorative" val="1"/>
               </a:ext>
             </a:extLst>
           </p:cNvPr>
@@ -28497,7 +27234,7 @@
           <p:nvPr>
             <p:extLst>
               <p:ext uri="{386F3935-93C4-4BCD-93E2-E3B085C9AB24}">
-                <p16:designElem xmlns:p16="http://schemas.microsoft.com/office/powerpoint/2015/main" xmlns="" val="1"/>
+                <p16:designElem xmlns="" xmlns:p16="http://schemas.microsoft.com/office/powerpoint/2015/main" val="1"/>
               </p:ext>
             </p:extLst>
           </p:nvPr>
@@ -28651,10 +27388,10 @@
           <p:cNvPr id="15" name="Freeform: Shape 14">
             <a:extLst>
               <a:ext uri="{FF2B5EF4-FFF2-40B4-BE49-F238E27FC236}">
-                <a16:creationId xmlns:a16="http://schemas.microsoft.com/office/drawing/2014/main" xmlns="" id="{F6E384F5-137A-40B1-97F0-694CC6ECD59C}"/>
+                <a16:creationId xmlns="" xmlns:a16="http://schemas.microsoft.com/office/drawing/2014/main" id="{F6E384F5-137A-40B1-97F0-694CC6ECD59C}"/>
               </a:ext>
               <a:ext uri="{C183D7F6-B498-43B3-948B-1728B52AA6E4}">
-                <adec:decorative xmlns:adec="http://schemas.microsoft.com/office/drawing/2017/decorative" xmlns="" val="1"/>
+                <adec:decorative xmlns="" xmlns:adec="http://schemas.microsoft.com/office/drawing/2017/decorative" val="1"/>
               </a:ext>
             </a:extLst>
           </p:cNvPr>
@@ -28664,7 +27401,7 @@
           <p:nvPr>
             <p:extLst>
               <p:ext uri="{386F3935-93C4-4BCD-93E2-E3B085C9AB24}">
-                <p16:designElem xmlns:p16="http://schemas.microsoft.com/office/powerpoint/2015/main" xmlns="" val="1"/>
+                <p16:designElem xmlns="" xmlns:p16="http://schemas.microsoft.com/office/powerpoint/2015/main" val="1"/>
               </p:ext>
             </p:extLst>
           </p:nvPr>
@@ -28828,10 +27565,10 @@
           <p:cNvPr id="17" name="Freeform: Shape 16">
             <a:extLst>
               <a:ext uri="{FF2B5EF4-FFF2-40B4-BE49-F238E27FC236}">
-                <a16:creationId xmlns:a16="http://schemas.microsoft.com/office/drawing/2014/main" xmlns="" id="{EBA87361-6D30-46E4-834B-719CF59055EA}"/>
+                <a16:creationId xmlns="" xmlns:a16="http://schemas.microsoft.com/office/drawing/2014/main" id="{EBA87361-6D30-46E4-834B-719CF59055EA}"/>
               </a:ext>
               <a:ext uri="{C183D7F6-B498-43B3-948B-1728B52AA6E4}">
-                <adec:decorative xmlns:adec="http://schemas.microsoft.com/office/drawing/2017/decorative" xmlns="" val="1"/>
+                <adec:decorative xmlns="" xmlns:adec="http://schemas.microsoft.com/office/drawing/2017/decorative" val="1"/>
               </a:ext>
             </a:extLst>
           </p:cNvPr>
@@ -28841,7 +27578,7 @@
           <p:nvPr>
             <p:extLst>
               <p:ext uri="{386F3935-93C4-4BCD-93E2-E3B085C9AB24}">
-                <p16:designElem xmlns:p16="http://schemas.microsoft.com/office/powerpoint/2015/main" xmlns="" val="1"/>
+                <p16:designElem xmlns="" xmlns:p16="http://schemas.microsoft.com/office/powerpoint/2015/main" val="1"/>
               </p:ext>
             </p:extLst>
           </p:nvPr>
@@ -29003,10 +27740,10 @@
           <p:cNvPr id="19" name="Freeform: Shape 18">
             <a:extLst>
               <a:ext uri="{FF2B5EF4-FFF2-40B4-BE49-F238E27FC236}">
-                <a16:creationId xmlns:a16="http://schemas.microsoft.com/office/drawing/2014/main" xmlns="" id="{9DBC4630-03DA-474F-BBCB-BA3AE6B317A4}"/>
+                <a16:creationId xmlns="" xmlns:a16="http://schemas.microsoft.com/office/drawing/2014/main" id="{9DBC4630-03DA-474F-BBCB-BA3AE6B317A4}"/>
               </a:ext>
               <a:ext uri="{C183D7F6-B498-43B3-948B-1728B52AA6E4}">
-                <adec:decorative xmlns:adec="http://schemas.microsoft.com/office/drawing/2017/decorative" xmlns="" val="1"/>
+                <adec:decorative xmlns="" xmlns:adec="http://schemas.microsoft.com/office/drawing/2017/decorative" val="1"/>
               </a:ext>
             </a:extLst>
           </p:cNvPr>
@@ -29016,7 +27753,7 @@
           <p:nvPr>
             <p:extLst>
               <p:ext uri="{386F3935-93C4-4BCD-93E2-E3B085C9AB24}">
-                <p16:designElem xmlns:p16="http://schemas.microsoft.com/office/powerpoint/2015/main" xmlns="" val="1"/>
+                <p16:designElem xmlns="" xmlns:p16="http://schemas.microsoft.com/office/powerpoint/2015/main" val="1"/>
               </p:ext>
             </p:extLst>
           </p:nvPr>
@@ -29174,10 +27911,10 @@
           <p:cNvPr id="21" name="Freeform: Shape 20">
             <a:extLst>
               <a:ext uri="{FF2B5EF4-FFF2-40B4-BE49-F238E27FC236}">
-                <a16:creationId xmlns:a16="http://schemas.microsoft.com/office/drawing/2014/main" xmlns="" id="{D89DB1C0-FEEC-4CB6-88B2-F9C5562E09D1}"/>
+                <a16:creationId xmlns="" xmlns:a16="http://schemas.microsoft.com/office/drawing/2014/main" id="{D89DB1C0-FEEC-4CB6-88B2-F9C5562E09D1}"/>
               </a:ext>
               <a:ext uri="{C183D7F6-B498-43B3-948B-1728B52AA6E4}">
-                <adec:decorative xmlns:adec="http://schemas.microsoft.com/office/drawing/2017/decorative" xmlns="" val="1"/>
+                <adec:decorative xmlns="" xmlns:adec="http://schemas.microsoft.com/office/drawing/2017/decorative" val="1"/>
               </a:ext>
             </a:extLst>
           </p:cNvPr>
@@ -29187,7 +27924,7 @@
           <p:nvPr>
             <p:extLst>
               <p:ext uri="{386F3935-93C4-4BCD-93E2-E3B085C9AB24}">
-                <p16:designElem xmlns:p16="http://schemas.microsoft.com/office/powerpoint/2015/main" xmlns="" val="1"/>
+                <p16:designElem xmlns="" xmlns:p16="http://schemas.microsoft.com/office/powerpoint/2015/main" val="1"/>
               </p:ext>
             </p:extLst>
           </p:nvPr>
@@ -29343,10 +28080,10 @@
           <p:cNvPr id="23" name="Oval 22">
             <a:extLst>
               <a:ext uri="{FF2B5EF4-FFF2-40B4-BE49-F238E27FC236}">
-                <a16:creationId xmlns:a16="http://schemas.microsoft.com/office/drawing/2014/main" xmlns="" id="{78418A25-6EAC-4140-BFE6-284E1925B5EE}"/>
+                <a16:creationId xmlns="" xmlns:a16="http://schemas.microsoft.com/office/drawing/2014/main" id="{78418A25-6EAC-4140-BFE6-284E1925B5EE}"/>
               </a:ext>
               <a:ext uri="{C183D7F6-B498-43B3-948B-1728B52AA6E4}">
-                <adec:decorative xmlns:adec="http://schemas.microsoft.com/office/drawing/2017/decorative" xmlns="" val="1"/>
+                <adec:decorative xmlns="" xmlns:adec="http://schemas.microsoft.com/office/drawing/2017/decorative" val="1"/>
               </a:ext>
             </a:extLst>
           </p:cNvPr>
@@ -29356,7 +28093,7 @@
           <p:nvPr>
             <p:extLst>
               <p:ext uri="{386F3935-93C4-4BCD-93E2-E3B085C9AB24}">
-                <p16:designElem xmlns:p16="http://schemas.microsoft.com/office/powerpoint/2015/main" xmlns="" val="1"/>
+                <p16:designElem xmlns="" xmlns:p16="http://schemas.microsoft.com/office/powerpoint/2015/main" val="1"/>
               </p:ext>
             </p:extLst>
           </p:nvPr>
@@ -29437,10 +28174,10 @@
           <p:cNvPr id="25" name="Oval 24">
             <a:extLst>
               <a:ext uri="{FF2B5EF4-FFF2-40B4-BE49-F238E27FC236}">
-                <a16:creationId xmlns:a16="http://schemas.microsoft.com/office/drawing/2014/main" xmlns="" id="{08163D1C-ED91-4D5F-A33B-CF1256B270D4}"/>
+                <a16:creationId xmlns="" xmlns:a16="http://schemas.microsoft.com/office/drawing/2014/main" id="{08163D1C-ED91-4D5F-A33B-CF1256B270D4}"/>
               </a:ext>
               <a:ext uri="{C183D7F6-B498-43B3-948B-1728B52AA6E4}">
-                <adec:decorative xmlns:adec="http://schemas.microsoft.com/office/drawing/2017/decorative" xmlns="" val="1"/>
+                <adec:decorative xmlns="" xmlns:adec="http://schemas.microsoft.com/office/drawing/2017/decorative" val="1"/>
               </a:ext>
             </a:extLst>
           </p:cNvPr>
@@ -29450,7 +28187,7 @@
           <p:nvPr>
             <p:extLst>
               <p:ext uri="{386F3935-93C4-4BCD-93E2-E3B085C9AB24}">
-                <p16:designElem xmlns:p16="http://schemas.microsoft.com/office/powerpoint/2015/main" xmlns="" val="1"/>
+                <p16:designElem xmlns="" xmlns:p16="http://schemas.microsoft.com/office/powerpoint/2015/main" val="1"/>
               </p:ext>
             </p:extLst>
           </p:nvPr>
@@ -29529,7 +28266,7 @@
           <p:cNvPr id="6" name="Grafik 5">
             <a:extLst>
               <a:ext uri="{FF2B5EF4-FFF2-40B4-BE49-F238E27FC236}">
-                <a16:creationId xmlns:a16="http://schemas.microsoft.com/office/drawing/2014/main" xmlns="" id="{E125DF93-08F3-4350-B7A0-E67EF58A34D8}"/>
+                <a16:creationId xmlns="" xmlns:a16="http://schemas.microsoft.com/office/drawing/2014/main" id="{E125DF93-08F3-4350-B7A0-E67EF58A34D8}"/>
               </a:ext>
             </a:extLst>
           </p:cNvPr>
@@ -29565,7 +28302,7 @@
           <p:cNvPr id="5" name="Grafik 4">
             <a:extLst>
               <a:ext uri="{FF2B5EF4-FFF2-40B4-BE49-F238E27FC236}">
-                <a16:creationId xmlns:a16="http://schemas.microsoft.com/office/drawing/2014/main" xmlns="" id="{133BDCBA-3BF5-4009-BA11-176A5985A809}"/>
+                <a16:creationId xmlns="" xmlns:a16="http://schemas.microsoft.com/office/drawing/2014/main" id="{133BDCBA-3BF5-4009-BA11-176A5985A809}"/>
               </a:ext>
             </a:extLst>
           </p:cNvPr>
@@ -29601,7 +28338,7 @@
           <p:cNvPr id="4" name="Grafik 3">
             <a:extLst>
               <a:ext uri="{FF2B5EF4-FFF2-40B4-BE49-F238E27FC236}">
-                <a16:creationId xmlns:a16="http://schemas.microsoft.com/office/drawing/2014/main" xmlns="" id="{01AD9253-34AD-4597-8ECB-9B7DB87330CC}"/>
+                <a16:creationId xmlns="" xmlns:a16="http://schemas.microsoft.com/office/drawing/2014/main" id="{01AD9253-34AD-4597-8ECB-9B7DB87330CC}"/>
               </a:ext>
             </a:extLst>
           </p:cNvPr>
@@ -29637,7 +28374,7 @@
           <p:cNvPr id="2" name="Titel 1">
             <a:extLst>
               <a:ext uri="{FF2B5EF4-FFF2-40B4-BE49-F238E27FC236}">
-                <a16:creationId xmlns:a16="http://schemas.microsoft.com/office/drawing/2014/main" xmlns="" id="{04D5A00C-43A0-45EC-B8D1-28AB269D40E6}"/>
+                <a16:creationId xmlns="" xmlns:a16="http://schemas.microsoft.com/office/drawing/2014/main" id="{04D5A00C-43A0-45EC-B8D1-28AB269D40E6}"/>
               </a:ext>
             </a:extLst>
           </p:cNvPr>
@@ -29687,7 +28424,7 @@
           <p:cNvPr id="16" name="Grafik 15">
             <a:extLst>
               <a:ext uri="{FF2B5EF4-FFF2-40B4-BE49-F238E27FC236}">
-                <a16:creationId xmlns:a16="http://schemas.microsoft.com/office/drawing/2014/main" xmlns="" id="{BBFA6C1C-5288-44DD-ADC3-6308CC8489D3}"/>
+                <a16:creationId xmlns="" xmlns:a16="http://schemas.microsoft.com/office/drawing/2014/main" id="{BBFA6C1C-5288-44DD-ADC3-6308CC8489D3}"/>
               </a:ext>
             </a:extLst>
           </p:cNvPr>

</xml_diff>